<commit_message>
update bao cao va slide
</commit_message>
<xml_diff>
--- a/documents/20210111_NguyenTuanAnh_ppt.pptx
+++ b/documents/20210111_NguyenTuanAnh_ppt.pptx
@@ -5,7 +5,7 @@
     <p:sldMasterId id="2147483648" r:id="rId4"/>
   </p:sldMasterIdLst>
   <p:notesMasterIdLst>
-    <p:notesMasterId r:id="rId28"/>
+    <p:notesMasterId r:id="rId31"/>
   </p:notesMasterIdLst>
   <p:sldIdLst>
     <p:sldId id="256" r:id="rId5"/>
@@ -23,14 +23,17 @@
     <p:sldId id="280" r:id="rId17"/>
     <p:sldId id="272" r:id="rId18"/>
     <p:sldId id="275" r:id="rId19"/>
-    <p:sldId id="269" r:id="rId20"/>
-    <p:sldId id="276" r:id="rId21"/>
-    <p:sldId id="281" r:id="rId22"/>
-    <p:sldId id="271" r:id="rId23"/>
-    <p:sldId id="261" r:id="rId24"/>
-    <p:sldId id="274" r:id="rId25"/>
-    <p:sldId id="278" r:id="rId26"/>
-    <p:sldId id="264" r:id="rId27"/>
+    <p:sldId id="282" r:id="rId20"/>
+    <p:sldId id="284" r:id="rId21"/>
+    <p:sldId id="285" r:id="rId22"/>
+    <p:sldId id="286" r:id="rId23"/>
+    <p:sldId id="269" r:id="rId24"/>
+    <p:sldId id="276" r:id="rId25"/>
+    <p:sldId id="281" r:id="rId26"/>
+    <p:sldId id="261" r:id="rId27"/>
+    <p:sldId id="274" r:id="rId28"/>
+    <p:sldId id="278" r:id="rId29"/>
+    <p:sldId id="264" r:id="rId30"/>
   </p:sldIdLst>
   <p:sldSz cx="12192000" cy="6858000"/>
   <p:notesSz cx="6858000" cy="9144000"/>
@@ -149,10 +152,13 @@
             <p14:sldId id="280"/>
             <p14:sldId id="272"/>
             <p14:sldId id="275"/>
+            <p14:sldId id="282"/>
+            <p14:sldId id="284"/>
+            <p14:sldId id="285"/>
+            <p14:sldId id="286"/>
             <p14:sldId id="269"/>
             <p14:sldId id="276"/>
             <p14:sldId id="281"/>
-            <p14:sldId id="271"/>
             <p14:sldId id="261"/>
             <p14:sldId id="274"/>
             <p14:sldId id="278"/>
@@ -250,7 +256,7 @@
           <a:p>
             <a:fld id="{C8EC4C12-44DC-4AF1-91BC-D6BFF5E34312}" type="datetimeFigureOut">
               <a:rPr lang="vi-VN" smtClean="0"/>
-              <a:t>13/01/2021</a:t>
+              <a:t>14/01/2021</a:t>
             </a:fld>
             <a:endParaRPr lang="vi-VN"/>
           </a:p>
@@ -667,7 +673,343 @@
           <a:p>
             <a:fld id="{E2C07920-3A74-449B-970D-FA3232CC8EC0}" type="slidenum">
               <a:rPr lang="vi-VN" smtClean="0"/>
-              <a:t>22</a:t>
+              <a:t>16</a:t>
+            </a:fld>
+            <a:endParaRPr lang="vi-VN"/>
+          </a:p>
+        </p:txBody>
+      </p:sp>
+    </p:spTree>
+    <p:extLst>
+      <p:ext uri="{BB962C8B-B14F-4D97-AF65-F5344CB8AC3E}">
+        <p14:creationId xmlns:p14="http://schemas.microsoft.com/office/powerpoint/2010/main" val="677645430"/>
+      </p:ext>
+    </p:extLst>
+  </p:cSld>
+  <p:clrMapOvr>
+    <a:masterClrMapping/>
+  </p:clrMapOvr>
+</p:notes>
+</file>
+
+<file path=ppt/notesSlides/notesSlide3.xml><?xml version="1.0" encoding="utf-8"?>
+<p:notes xmlns:a="http://schemas.openxmlformats.org/drawingml/2006/main" xmlns:r="http://schemas.openxmlformats.org/officeDocument/2006/relationships" xmlns:p="http://schemas.openxmlformats.org/presentationml/2006/main">
+  <p:cSld>
+    <p:spTree>
+      <p:nvGrpSpPr>
+        <p:cNvPr id="1" name=""/>
+        <p:cNvGrpSpPr/>
+        <p:nvPr/>
+      </p:nvGrpSpPr>
+      <p:grpSpPr>
+        <a:xfrm>
+          <a:off x="0" y="0"/>
+          <a:ext cx="0" cy="0"/>
+          <a:chOff x="0" y="0"/>
+          <a:chExt cx="0" cy="0"/>
+        </a:xfrm>
+      </p:grpSpPr>
+      <p:sp>
+        <p:nvSpPr>
+          <p:cNvPr id="2" name="Slide Image Placeholder 1"/>
+          <p:cNvSpPr>
+            <a:spLocks noGrp="1" noRot="1" noChangeAspect="1"/>
+          </p:cNvSpPr>
+          <p:nvPr>
+            <p:ph type="sldImg"/>
+          </p:nvPr>
+        </p:nvSpPr>
+        <p:spPr/>
+      </p:sp>
+      <p:sp>
+        <p:nvSpPr>
+          <p:cNvPr id="3" name="Notes Placeholder 2"/>
+          <p:cNvSpPr>
+            <a:spLocks noGrp="1"/>
+          </p:cNvSpPr>
+          <p:nvPr>
+            <p:ph type="body" idx="1"/>
+          </p:nvPr>
+        </p:nvSpPr>
+        <p:spPr/>
+        <p:txBody>
+          <a:bodyPr/>
+          <a:lstStyle/>
+          <a:p>
+            <a:endParaRPr lang="vi-VN"/>
+          </a:p>
+        </p:txBody>
+      </p:sp>
+      <p:sp>
+        <p:nvSpPr>
+          <p:cNvPr id="4" name="Slide Number Placeholder 3"/>
+          <p:cNvSpPr>
+            <a:spLocks noGrp="1"/>
+          </p:cNvSpPr>
+          <p:nvPr>
+            <p:ph type="sldNum" sz="quarter" idx="5"/>
+          </p:nvPr>
+        </p:nvSpPr>
+        <p:spPr/>
+        <p:txBody>
+          <a:bodyPr/>
+          <a:lstStyle/>
+          <a:p>
+            <a:fld id="{E2C07920-3A74-449B-970D-FA3232CC8EC0}" type="slidenum">
+              <a:rPr lang="vi-VN" smtClean="0"/>
+              <a:t>17</a:t>
+            </a:fld>
+            <a:endParaRPr lang="vi-VN"/>
+          </a:p>
+        </p:txBody>
+      </p:sp>
+    </p:spTree>
+    <p:extLst>
+      <p:ext uri="{BB962C8B-B14F-4D97-AF65-F5344CB8AC3E}">
+        <p14:creationId xmlns:p14="http://schemas.microsoft.com/office/powerpoint/2010/main" val="2684378409"/>
+      </p:ext>
+    </p:extLst>
+  </p:cSld>
+  <p:clrMapOvr>
+    <a:masterClrMapping/>
+  </p:clrMapOvr>
+</p:notes>
+</file>
+
+<file path=ppt/notesSlides/notesSlide4.xml><?xml version="1.0" encoding="utf-8"?>
+<p:notes xmlns:a="http://schemas.openxmlformats.org/drawingml/2006/main" xmlns:r="http://schemas.openxmlformats.org/officeDocument/2006/relationships" xmlns:p="http://schemas.openxmlformats.org/presentationml/2006/main">
+  <p:cSld>
+    <p:spTree>
+      <p:nvGrpSpPr>
+        <p:cNvPr id="1" name=""/>
+        <p:cNvGrpSpPr/>
+        <p:nvPr/>
+      </p:nvGrpSpPr>
+      <p:grpSpPr>
+        <a:xfrm>
+          <a:off x="0" y="0"/>
+          <a:ext cx="0" cy="0"/>
+          <a:chOff x="0" y="0"/>
+          <a:chExt cx="0" cy="0"/>
+        </a:xfrm>
+      </p:grpSpPr>
+      <p:sp>
+        <p:nvSpPr>
+          <p:cNvPr id="2" name="Slide Image Placeholder 1"/>
+          <p:cNvSpPr>
+            <a:spLocks noGrp="1" noRot="1" noChangeAspect="1"/>
+          </p:cNvSpPr>
+          <p:nvPr>
+            <p:ph type="sldImg"/>
+          </p:nvPr>
+        </p:nvSpPr>
+        <p:spPr/>
+      </p:sp>
+      <p:sp>
+        <p:nvSpPr>
+          <p:cNvPr id="3" name="Notes Placeholder 2"/>
+          <p:cNvSpPr>
+            <a:spLocks noGrp="1"/>
+          </p:cNvSpPr>
+          <p:nvPr>
+            <p:ph type="body" idx="1"/>
+          </p:nvPr>
+        </p:nvSpPr>
+        <p:spPr/>
+        <p:txBody>
+          <a:bodyPr/>
+          <a:lstStyle/>
+          <a:p>
+            <a:endParaRPr lang="vi-VN"/>
+          </a:p>
+        </p:txBody>
+      </p:sp>
+      <p:sp>
+        <p:nvSpPr>
+          <p:cNvPr id="4" name="Slide Number Placeholder 3"/>
+          <p:cNvSpPr>
+            <a:spLocks noGrp="1"/>
+          </p:cNvSpPr>
+          <p:nvPr>
+            <p:ph type="sldNum" sz="quarter" idx="5"/>
+          </p:nvPr>
+        </p:nvSpPr>
+        <p:spPr/>
+        <p:txBody>
+          <a:bodyPr/>
+          <a:lstStyle/>
+          <a:p>
+            <a:fld id="{E2C07920-3A74-449B-970D-FA3232CC8EC0}" type="slidenum">
+              <a:rPr lang="vi-VN" smtClean="0"/>
+              <a:t>18</a:t>
+            </a:fld>
+            <a:endParaRPr lang="vi-VN"/>
+          </a:p>
+        </p:txBody>
+      </p:sp>
+    </p:spTree>
+    <p:extLst>
+      <p:ext uri="{BB962C8B-B14F-4D97-AF65-F5344CB8AC3E}">
+        <p14:creationId xmlns:p14="http://schemas.microsoft.com/office/powerpoint/2010/main" val="3502043541"/>
+      </p:ext>
+    </p:extLst>
+  </p:cSld>
+  <p:clrMapOvr>
+    <a:masterClrMapping/>
+  </p:clrMapOvr>
+</p:notes>
+</file>
+
+<file path=ppt/notesSlides/notesSlide5.xml><?xml version="1.0" encoding="utf-8"?>
+<p:notes xmlns:a="http://schemas.openxmlformats.org/drawingml/2006/main" xmlns:r="http://schemas.openxmlformats.org/officeDocument/2006/relationships" xmlns:p="http://schemas.openxmlformats.org/presentationml/2006/main">
+  <p:cSld>
+    <p:spTree>
+      <p:nvGrpSpPr>
+        <p:cNvPr id="1" name=""/>
+        <p:cNvGrpSpPr/>
+        <p:nvPr/>
+      </p:nvGrpSpPr>
+      <p:grpSpPr>
+        <a:xfrm>
+          <a:off x="0" y="0"/>
+          <a:ext cx="0" cy="0"/>
+          <a:chOff x="0" y="0"/>
+          <a:chExt cx="0" cy="0"/>
+        </a:xfrm>
+      </p:grpSpPr>
+      <p:sp>
+        <p:nvSpPr>
+          <p:cNvPr id="2" name="Slide Image Placeholder 1"/>
+          <p:cNvSpPr>
+            <a:spLocks noGrp="1" noRot="1" noChangeAspect="1"/>
+          </p:cNvSpPr>
+          <p:nvPr>
+            <p:ph type="sldImg"/>
+          </p:nvPr>
+        </p:nvSpPr>
+        <p:spPr/>
+      </p:sp>
+      <p:sp>
+        <p:nvSpPr>
+          <p:cNvPr id="3" name="Notes Placeholder 2"/>
+          <p:cNvSpPr>
+            <a:spLocks noGrp="1"/>
+          </p:cNvSpPr>
+          <p:nvPr>
+            <p:ph type="body" idx="1"/>
+          </p:nvPr>
+        </p:nvSpPr>
+        <p:spPr/>
+        <p:txBody>
+          <a:bodyPr/>
+          <a:lstStyle/>
+          <a:p>
+            <a:endParaRPr lang="vi-VN"/>
+          </a:p>
+        </p:txBody>
+      </p:sp>
+      <p:sp>
+        <p:nvSpPr>
+          <p:cNvPr id="4" name="Slide Number Placeholder 3"/>
+          <p:cNvSpPr>
+            <a:spLocks noGrp="1"/>
+          </p:cNvSpPr>
+          <p:nvPr>
+            <p:ph type="sldNum" sz="quarter" idx="5"/>
+          </p:nvPr>
+        </p:nvSpPr>
+        <p:spPr/>
+        <p:txBody>
+          <a:bodyPr/>
+          <a:lstStyle/>
+          <a:p>
+            <a:fld id="{E2C07920-3A74-449B-970D-FA3232CC8EC0}" type="slidenum">
+              <a:rPr lang="vi-VN" smtClean="0"/>
+              <a:t>19</a:t>
+            </a:fld>
+            <a:endParaRPr lang="vi-VN"/>
+          </a:p>
+        </p:txBody>
+      </p:sp>
+    </p:spTree>
+    <p:extLst>
+      <p:ext uri="{BB962C8B-B14F-4D97-AF65-F5344CB8AC3E}">
+        <p14:creationId xmlns:p14="http://schemas.microsoft.com/office/powerpoint/2010/main" val="2275861806"/>
+      </p:ext>
+    </p:extLst>
+  </p:cSld>
+  <p:clrMapOvr>
+    <a:masterClrMapping/>
+  </p:clrMapOvr>
+</p:notes>
+</file>
+
+<file path=ppt/notesSlides/notesSlide6.xml><?xml version="1.0" encoding="utf-8"?>
+<p:notes xmlns:a="http://schemas.openxmlformats.org/drawingml/2006/main" xmlns:r="http://schemas.openxmlformats.org/officeDocument/2006/relationships" xmlns:p="http://schemas.openxmlformats.org/presentationml/2006/main">
+  <p:cSld>
+    <p:spTree>
+      <p:nvGrpSpPr>
+        <p:cNvPr id="1" name=""/>
+        <p:cNvGrpSpPr/>
+        <p:nvPr/>
+      </p:nvGrpSpPr>
+      <p:grpSpPr>
+        <a:xfrm>
+          <a:off x="0" y="0"/>
+          <a:ext cx="0" cy="0"/>
+          <a:chOff x="0" y="0"/>
+          <a:chExt cx="0" cy="0"/>
+        </a:xfrm>
+      </p:grpSpPr>
+      <p:sp>
+        <p:nvSpPr>
+          <p:cNvPr id="2" name="Slide Image Placeholder 1"/>
+          <p:cNvSpPr>
+            <a:spLocks noGrp="1" noRot="1" noChangeAspect="1"/>
+          </p:cNvSpPr>
+          <p:nvPr>
+            <p:ph type="sldImg"/>
+          </p:nvPr>
+        </p:nvSpPr>
+        <p:spPr/>
+      </p:sp>
+      <p:sp>
+        <p:nvSpPr>
+          <p:cNvPr id="3" name="Notes Placeholder 2"/>
+          <p:cNvSpPr>
+            <a:spLocks noGrp="1"/>
+          </p:cNvSpPr>
+          <p:nvPr>
+            <p:ph type="body" idx="1"/>
+          </p:nvPr>
+        </p:nvSpPr>
+        <p:spPr/>
+        <p:txBody>
+          <a:bodyPr/>
+          <a:lstStyle/>
+          <a:p>
+            <a:endParaRPr lang="vi-VN"/>
+          </a:p>
+        </p:txBody>
+      </p:sp>
+      <p:sp>
+        <p:nvSpPr>
+          <p:cNvPr id="4" name="Slide Number Placeholder 3"/>
+          <p:cNvSpPr>
+            <a:spLocks noGrp="1"/>
+          </p:cNvSpPr>
+          <p:nvPr>
+            <p:ph type="sldNum" sz="quarter" idx="5"/>
+          </p:nvPr>
+        </p:nvSpPr>
+        <p:spPr/>
+        <p:txBody>
+          <a:bodyPr/>
+          <a:lstStyle/>
+          <a:p>
+            <a:fld id="{E2C07920-3A74-449B-970D-FA3232CC8EC0}" type="slidenum">
+              <a:rPr lang="vi-VN" smtClean="0"/>
+              <a:t>25</a:t>
             </a:fld>
             <a:endParaRPr lang="vi-VN"/>
           </a:p>
@@ -3311,6 +3653,36 @@
           </a:p>
         </p:txBody>
       </p:sp>
+      <p:pic>
+        <p:nvPicPr>
+          <p:cNvPr id="3" name="Picture 2">
+            <a:extLst>
+              <a:ext uri="{FF2B5EF4-FFF2-40B4-BE49-F238E27FC236}">
+                <a16:creationId xmlns:a16="http://schemas.microsoft.com/office/drawing/2014/main" id="{CF3798BA-839A-4135-A58A-705137FDFEA2}"/>
+              </a:ext>
+            </a:extLst>
+          </p:cNvPr>
+          <p:cNvPicPr>
+            <a:picLocks noChangeAspect="1"/>
+          </p:cNvPicPr>
+          <p:nvPr/>
+        </p:nvPicPr>
+        <p:blipFill>
+          <a:blip r:embed="rId2"/>
+          <a:stretch>
+            <a:fillRect/>
+          </a:stretch>
+        </p:blipFill>
+        <p:spPr>
+          <a:xfrm>
+            <a:off x="1793483" y="2260135"/>
+            <a:ext cx="8605034" cy="2872301"/>
+          </a:xfrm>
+          <a:prstGeom prst="rect">
+            <a:avLst/>
+          </a:prstGeom>
+        </p:spPr>
+      </p:pic>
     </p:spTree>
     <p:extLst>
       <p:ext uri="{BB962C8B-B14F-4D97-AF65-F5344CB8AC3E}">
@@ -3512,6 +3884,36 @@
           </a:p>
         </p:txBody>
       </p:sp>
+      <p:pic>
+        <p:nvPicPr>
+          <p:cNvPr id="3" name="Picture 2">
+            <a:extLst>
+              <a:ext uri="{FF2B5EF4-FFF2-40B4-BE49-F238E27FC236}">
+                <a16:creationId xmlns:a16="http://schemas.microsoft.com/office/drawing/2014/main" id="{15A8A20D-2DB2-4835-9F1E-EB306AB19F9A}"/>
+              </a:ext>
+            </a:extLst>
+          </p:cNvPr>
+          <p:cNvPicPr>
+            <a:picLocks noChangeAspect="1"/>
+          </p:cNvPicPr>
+          <p:nvPr/>
+        </p:nvPicPr>
+        <p:blipFill>
+          <a:blip r:embed="rId2"/>
+          <a:stretch>
+            <a:fillRect/>
+          </a:stretch>
+        </p:blipFill>
+        <p:spPr>
+          <a:xfrm>
+            <a:off x="2899181" y="1947166"/>
+            <a:ext cx="6393637" cy="3470105"/>
+          </a:xfrm>
+          <a:prstGeom prst="rect">
+            <a:avLst/>
+          </a:prstGeom>
+        </p:spPr>
+      </p:pic>
     </p:spTree>
     <p:extLst>
       <p:ext uri="{BB962C8B-B14F-4D97-AF65-F5344CB8AC3E}">
@@ -4044,7 +4446,7 @@
                 <a:latin typeface="Times New Roman" panose="02020603050405020304" pitchFamily="18" charset="0"/>
                 <a:cs typeface="Times New Roman" panose="02020603050405020304" pitchFamily="18" charset="0"/>
               </a:rPr>
-              <a:t>triac</a:t>
+              <a:t>Triac</a:t>
             </a:r>
             <a:r>
               <a:rPr lang="en-US" dirty="0">
@@ -4204,18 +4606,39 @@
               <a:t> </a:t>
             </a:r>
             <a:r>
-              <a:rPr lang="en-US" err="1">
+              <a:rPr lang="en-US" dirty="0" err="1">
                 <a:latin typeface="Times New Roman" panose="02020603050405020304" pitchFamily="18" charset="0"/>
                 <a:cs typeface="Times New Roman" panose="02020603050405020304" pitchFamily="18" charset="0"/>
               </a:rPr>
               <a:t>theo</a:t>
             </a:r>
             <a:r>
-              <a:rPr lang="en-US">
-                <a:latin typeface="Times New Roman" panose="02020603050405020304" pitchFamily="18" charset="0"/>
-                <a:cs typeface="Times New Roman" panose="02020603050405020304" pitchFamily="18" charset="0"/>
-              </a:rPr>
-              <a:t> hẹn giờ</a:t>
+              <a:rPr lang="en-US" dirty="0">
+                <a:latin typeface="Times New Roman" panose="02020603050405020304" pitchFamily="18" charset="0"/>
+                <a:cs typeface="Times New Roman" panose="02020603050405020304" pitchFamily="18" charset="0"/>
+              </a:rPr>
+              <a:t> </a:t>
+            </a:r>
+            <a:r>
+              <a:rPr lang="en-US" dirty="0" err="1">
+                <a:latin typeface="Times New Roman" panose="02020603050405020304" pitchFamily="18" charset="0"/>
+                <a:cs typeface="Times New Roman" panose="02020603050405020304" pitchFamily="18" charset="0"/>
+              </a:rPr>
+              <a:t>hẹn</a:t>
+            </a:r>
+            <a:r>
+              <a:rPr lang="en-US" dirty="0">
+                <a:latin typeface="Times New Roman" panose="02020603050405020304" pitchFamily="18" charset="0"/>
+                <a:cs typeface="Times New Roman" panose="02020603050405020304" pitchFamily="18" charset="0"/>
+              </a:rPr>
+              <a:t> </a:t>
+            </a:r>
+            <a:r>
+              <a:rPr lang="en-US" dirty="0" err="1">
+                <a:latin typeface="Times New Roman" panose="02020603050405020304" pitchFamily="18" charset="0"/>
+                <a:cs typeface="Times New Roman" panose="02020603050405020304" pitchFamily="18" charset="0"/>
+              </a:rPr>
+              <a:t>giờ</a:t>
             </a:r>
             <a:endParaRPr lang="en-US" dirty="0">
               <a:latin typeface="Times New Roman" panose="02020603050405020304" pitchFamily="18" charset="0"/>
@@ -4637,7 +5060,7 @@
                 <a:latin typeface="Times New Roman" panose="02020603050405020304" pitchFamily="18" charset="0"/>
                 <a:cs typeface="Times New Roman" panose="02020603050405020304" pitchFamily="18" charset="0"/>
               </a:rPr>
-              <a:t>2.4. </a:t>
+              <a:t>2.3. </a:t>
             </a:r>
             <a:r>
               <a:rPr lang="en-US" dirty="0" err="1">
@@ -4693,35 +5116,7 @@
                 <a:latin typeface="Times New Roman" panose="02020603050405020304" pitchFamily="18" charset="0"/>
                 <a:cs typeface="Times New Roman" panose="02020603050405020304" pitchFamily="18" charset="0"/>
               </a:rPr>
-              <a:t> </a:t>
-            </a:r>
-            <a:r>
-              <a:rPr lang="en-US" dirty="0" err="1">
-                <a:latin typeface="Times New Roman" panose="02020603050405020304" pitchFamily="18" charset="0"/>
-                <a:cs typeface="Times New Roman" panose="02020603050405020304" pitchFamily="18" charset="0"/>
-              </a:rPr>
-              <a:t>ứng</a:t>
-            </a:r>
-            <a:r>
-              <a:rPr lang="en-US" dirty="0">
-                <a:latin typeface="Times New Roman" panose="02020603050405020304" pitchFamily="18" charset="0"/>
-                <a:cs typeface="Times New Roman" panose="02020603050405020304" pitchFamily="18" charset="0"/>
-              </a:rPr>
-              <a:t> </a:t>
-            </a:r>
-            <a:r>
-              <a:rPr lang="en-US" dirty="0" err="1">
-                <a:latin typeface="Times New Roman" panose="02020603050405020304" pitchFamily="18" charset="0"/>
-                <a:cs typeface="Times New Roman" panose="02020603050405020304" pitchFamily="18" charset="0"/>
-              </a:rPr>
-              <a:t>dụng</a:t>
-            </a:r>
-            <a:r>
-              <a:rPr lang="en-US" dirty="0">
-                <a:latin typeface="Times New Roman" panose="02020603050405020304" pitchFamily="18" charset="0"/>
-                <a:cs typeface="Times New Roman" panose="02020603050405020304" pitchFamily="18" charset="0"/>
-              </a:rPr>
-              <a:t> </a:t>
+              <a:t> vi </a:t>
             </a:r>
             <a:r>
               <a:rPr lang="en-US" dirty="0" err="1">
@@ -4755,21 +5150,49 @@
                 <a:latin typeface="Times New Roman" panose="02020603050405020304" pitchFamily="18" charset="0"/>
                 <a:cs typeface="Times New Roman" panose="02020603050405020304" pitchFamily="18" charset="0"/>
               </a:rPr>
-              <a:t>Yêu</a:t>
-            </a:r>
-            <a:r>
-              <a:rPr lang="en-US" dirty="0">
-                <a:latin typeface="Times New Roman" panose="02020603050405020304" pitchFamily="18" charset="0"/>
-                <a:cs typeface="Times New Roman" panose="02020603050405020304" pitchFamily="18" charset="0"/>
-              </a:rPr>
-              <a:t> </a:t>
-            </a:r>
-            <a:r>
-              <a:rPr lang="en-US" dirty="0" err="1">
-                <a:latin typeface="Times New Roman" panose="02020603050405020304" pitchFamily="18" charset="0"/>
-                <a:cs typeface="Times New Roman" panose="02020603050405020304" pitchFamily="18" charset="0"/>
-              </a:rPr>
-              <a:t>cầu</a:t>
+              <a:t>Lưu</a:t>
+            </a:r>
+            <a:r>
+              <a:rPr lang="en-US" dirty="0">
+                <a:latin typeface="Times New Roman" panose="02020603050405020304" pitchFamily="18" charset="0"/>
+                <a:cs typeface="Times New Roman" panose="02020603050405020304" pitchFamily="18" charset="0"/>
+              </a:rPr>
+              <a:t> </a:t>
+            </a:r>
+            <a:r>
+              <a:rPr lang="en-US" dirty="0" err="1">
+                <a:latin typeface="Times New Roman" panose="02020603050405020304" pitchFamily="18" charset="0"/>
+                <a:cs typeface="Times New Roman" panose="02020603050405020304" pitchFamily="18" charset="0"/>
+              </a:rPr>
+              <a:t>đồ</a:t>
+            </a:r>
+            <a:r>
+              <a:rPr lang="en-US" dirty="0">
+                <a:latin typeface="Times New Roman" panose="02020603050405020304" pitchFamily="18" charset="0"/>
+                <a:cs typeface="Times New Roman" panose="02020603050405020304" pitchFamily="18" charset="0"/>
+              </a:rPr>
+              <a:t> </a:t>
+            </a:r>
+            <a:r>
+              <a:rPr lang="en-US" dirty="0" err="1">
+                <a:latin typeface="Times New Roman" panose="02020603050405020304" pitchFamily="18" charset="0"/>
+                <a:cs typeface="Times New Roman" panose="02020603050405020304" pitchFamily="18" charset="0"/>
+              </a:rPr>
+              <a:t>thuật</a:t>
+            </a:r>
+            <a:r>
+              <a:rPr lang="en-US" dirty="0">
+                <a:latin typeface="Times New Roman" panose="02020603050405020304" pitchFamily="18" charset="0"/>
+                <a:cs typeface="Times New Roman" panose="02020603050405020304" pitchFamily="18" charset="0"/>
+              </a:rPr>
+              <a:t> </a:t>
+            </a:r>
+            <a:r>
+              <a:rPr lang="en-US" dirty="0" err="1">
+                <a:latin typeface="Times New Roman" panose="02020603050405020304" pitchFamily="18" charset="0"/>
+                <a:cs typeface="Times New Roman" panose="02020603050405020304" pitchFamily="18" charset="0"/>
+              </a:rPr>
+              <a:t>toán</a:t>
             </a:r>
             <a:r>
               <a:rPr lang="en-US" dirty="0">
@@ -4780,576 +5203,29 @@
             </a:r>
           </a:p>
           <a:p>
-            <a:pPr lvl="1">
-              <a:buFont typeface="Courier New" panose="02070309020205020404" pitchFamily="49" charset="0"/>
-              <a:buChar char="o"/>
+            <a:pPr marL="0" indent="0">
+              <a:buNone/>
             </a:pPr>
             <a:r>
-              <a:rPr lang="en-US" dirty="0">
-                <a:latin typeface="Times New Roman" panose="02020603050405020304" pitchFamily="18" charset="0"/>
-                <a:cs typeface="Times New Roman" panose="02020603050405020304" pitchFamily="18" charset="0"/>
-              </a:rPr>
-              <a:t> </a:t>
-            </a:r>
-            <a:r>
-              <a:rPr lang="en-US" dirty="0" err="1">
-                <a:latin typeface="Times New Roman" panose="02020603050405020304" pitchFamily="18" charset="0"/>
-                <a:cs typeface="Times New Roman" panose="02020603050405020304" pitchFamily="18" charset="0"/>
-              </a:rPr>
-              <a:t>Nhận</a:t>
-            </a:r>
-            <a:r>
-              <a:rPr lang="en-US" dirty="0">
-                <a:latin typeface="Times New Roman" panose="02020603050405020304" pitchFamily="18" charset="0"/>
-                <a:cs typeface="Times New Roman" panose="02020603050405020304" pitchFamily="18" charset="0"/>
-              </a:rPr>
-              <a:t> </a:t>
-            </a:r>
-            <a:r>
-              <a:rPr lang="en-US" dirty="0" err="1">
-                <a:latin typeface="Times New Roman" panose="02020603050405020304" pitchFamily="18" charset="0"/>
-                <a:cs typeface="Times New Roman" panose="02020603050405020304" pitchFamily="18" charset="0"/>
-              </a:rPr>
-              <a:t>và</a:t>
-            </a:r>
-            <a:r>
-              <a:rPr lang="en-US" dirty="0">
-                <a:latin typeface="Times New Roman" panose="02020603050405020304" pitchFamily="18" charset="0"/>
-                <a:cs typeface="Times New Roman" panose="02020603050405020304" pitchFamily="18" charset="0"/>
-              </a:rPr>
-              <a:t> </a:t>
-            </a:r>
-            <a:r>
-              <a:rPr lang="en-US" dirty="0" err="1">
-                <a:latin typeface="Times New Roman" panose="02020603050405020304" pitchFamily="18" charset="0"/>
-                <a:cs typeface="Times New Roman" panose="02020603050405020304" pitchFamily="18" charset="0"/>
-              </a:rPr>
-              <a:t>hiển</a:t>
-            </a:r>
-            <a:r>
-              <a:rPr lang="en-US" dirty="0">
-                <a:latin typeface="Times New Roman" panose="02020603050405020304" pitchFamily="18" charset="0"/>
-                <a:cs typeface="Times New Roman" panose="02020603050405020304" pitchFamily="18" charset="0"/>
-              </a:rPr>
-              <a:t> </a:t>
-            </a:r>
-            <a:r>
-              <a:rPr lang="en-US" dirty="0" err="1">
-                <a:latin typeface="Times New Roman" panose="02020603050405020304" pitchFamily="18" charset="0"/>
-                <a:cs typeface="Times New Roman" panose="02020603050405020304" pitchFamily="18" charset="0"/>
-              </a:rPr>
-              <a:t>thị</a:t>
-            </a:r>
-            <a:r>
-              <a:rPr lang="en-US" dirty="0">
-                <a:latin typeface="Times New Roman" panose="02020603050405020304" pitchFamily="18" charset="0"/>
-                <a:cs typeface="Times New Roman" panose="02020603050405020304" pitchFamily="18" charset="0"/>
-              </a:rPr>
-              <a:t> </a:t>
-            </a:r>
-            <a:r>
-              <a:rPr lang="en-US" dirty="0" err="1">
-                <a:latin typeface="Times New Roman" panose="02020603050405020304" pitchFamily="18" charset="0"/>
-                <a:cs typeface="Times New Roman" panose="02020603050405020304" pitchFamily="18" charset="0"/>
-              </a:rPr>
-              <a:t>trạng</a:t>
-            </a:r>
-            <a:r>
-              <a:rPr lang="en-US" dirty="0">
-                <a:latin typeface="Times New Roman" panose="02020603050405020304" pitchFamily="18" charset="0"/>
-                <a:cs typeface="Times New Roman" panose="02020603050405020304" pitchFamily="18" charset="0"/>
-              </a:rPr>
-              <a:t> </a:t>
-            </a:r>
-            <a:r>
-              <a:rPr lang="en-US" dirty="0" err="1">
-                <a:latin typeface="Times New Roman" panose="02020603050405020304" pitchFamily="18" charset="0"/>
-                <a:cs typeface="Times New Roman" panose="02020603050405020304" pitchFamily="18" charset="0"/>
-              </a:rPr>
-              <a:t>thái</a:t>
-            </a:r>
-            <a:r>
-              <a:rPr lang="en-US" dirty="0">
-                <a:latin typeface="Times New Roman" panose="02020603050405020304" pitchFamily="18" charset="0"/>
-                <a:cs typeface="Times New Roman" panose="02020603050405020304" pitchFamily="18" charset="0"/>
-              </a:rPr>
-              <a:t> </a:t>
-            </a:r>
-            <a:r>
-              <a:rPr lang="en-US" dirty="0" err="1">
-                <a:latin typeface="Times New Roman" panose="02020603050405020304" pitchFamily="18" charset="0"/>
-                <a:cs typeface="Times New Roman" panose="02020603050405020304" pitchFamily="18" charset="0"/>
-              </a:rPr>
-              <a:t>đóng</a:t>
-            </a:r>
-            <a:r>
-              <a:rPr lang="en-US" dirty="0">
-                <a:latin typeface="Times New Roman" panose="02020603050405020304" pitchFamily="18" charset="0"/>
-                <a:cs typeface="Times New Roman" panose="02020603050405020304" pitchFamily="18" charset="0"/>
-              </a:rPr>
-              <a:t> </a:t>
-            </a:r>
-            <a:r>
-              <a:rPr lang="en-US" dirty="0" err="1">
-                <a:latin typeface="Times New Roman" panose="02020603050405020304" pitchFamily="18" charset="0"/>
-                <a:cs typeface="Times New Roman" panose="02020603050405020304" pitchFamily="18" charset="0"/>
-              </a:rPr>
-              <a:t>cắt</a:t>
-            </a:r>
-            <a:r>
-              <a:rPr lang="en-US" dirty="0">
-                <a:latin typeface="Times New Roman" panose="02020603050405020304" pitchFamily="18" charset="0"/>
-                <a:cs typeface="Times New Roman" panose="02020603050405020304" pitchFamily="18" charset="0"/>
-              </a:rPr>
-              <a:t> </a:t>
-            </a:r>
-            <a:r>
-              <a:rPr lang="en-US" dirty="0" err="1">
-                <a:latin typeface="Times New Roman" panose="02020603050405020304" pitchFamily="18" charset="0"/>
-                <a:cs typeface="Times New Roman" panose="02020603050405020304" pitchFamily="18" charset="0"/>
-              </a:rPr>
-              <a:t>của</a:t>
-            </a:r>
-            <a:r>
-              <a:rPr lang="en-US" dirty="0">
-                <a:latin typeface="Times New Roman" panose="02020603050405020304" pitchFamily="18" charset="0"/>
-                <a:cs typeface="Times New Roman" panose="02020603050405020304" pitchFamily="18" charset="0"/>
-              </a:rPr>
-              <a:t> </a:t>
-            </a:r>
-            <a:r>
-              <a:rPr lang="en-US" dirty="0" err="1">
-                <a:latin typeface="Times New Roman" panose="02020603050405020304" pitchFamily="18" charset="0"/>
-                <a:cs typeface="Times New Roman" panose="02020603050405020304" pitchFamily="18" charset="0"/>
-              </a:rPr>
-              <a:t>các</a:t>
-            </a:r>
-            <a:r>
-              <a:rPr lang="en-US" dirty="0">
-                <a:latin typeface="Times New Roman" panose="02020603050405020304" pitchFamily="18" charset="0"/>
-                <a:cs typeface="Times New Roman" panose="02020603050405020304" pitchFamily="18" charset="0"/>
-              </a:rPr>
-              <a:t> </a:t>
-            </a:r>
-            <a:r>
-              <a:rPr lang="en-US" dirty="0" err="1">
-                <a:latin typeface="Times New Roman" panose="02020603050405020304" pitchFamily="18" charset="0"/>
-                <a:cs typeface="Times New Roman" panose="02020603050405020304" pitchFamily="18" charset="0"/>
-              </a:rPr>
-              <a:t>triac</a:t>
-            </a:r>
-            <a:endParaRPr lang="en-US" dirty="0">
-              <a:latin typeface="Times New Roman" panose="02020603050405020304" pitchFamily="18" charset="0"/>
-              <a:cs typeface="Times New Roman" panose="02020603050405020304" pitchFamily="18" charset="0"/>
-            </a:endParaRPr>
-          </a:p>
-          <a:p>
-            <a:pPr lvl="1">
-              <a:buFont typeface="Courier New" panose="02070309020205020404" pitchFamily="49" charset="0"/>
-              <a:buChar char="o"/>
+              <a:rPr lang="en-US" dirty="0" err="1">
+                <a:latin typeface="Times New Roman" panose="02020603050405020304" pitchFamily="18" charset="0"/>
+                <a:cs typeface="Times New Roman" panose="02020603050405020304" pitchFamily="18" charset="0"/>
+              </a:rPr>
+              <a:t>Hàm</a:t>
+            </a:r>
+            <a:r>
+              <a:rPr lang="en-US" dirty="0">
+                <a:latin typeface="Times New Roman" panose="02020603050405020304" pitchFamily="18" charset="0"/>
+                <a:cs typeface="Times New Roman" panose="02020603050405020304" pitchFamily="18" charset="0"/>
+              </a:rPr>
+              <a:t> setup()</a:t>
+            </a:r>
+          </a:p>
+          <a:p>
+            <a:pPr marL="0" indent="0">
+              <a:buNone/>
             </a:pPr>
-            <a:r>
-              <a:rPr lang="en-US" dirty="0">
-                <a:latin typeface="Times New Roman" panose="02020603050405020304" pitchFamily="18" charset="0"/>
-                <a:cs typeface="Times New Roman" panose="02020603050405020304" pitchFamily="18" charset="0"/>
-              </a:rPr>
-              <a:t> </a:t>
-            </a:r>
-            <a:r>
-              <a:rPr lang="en-US" dirty="0" err="1">
-                <a:latin typeface="Times New Roman" panose="02020603050405020304" pitchFamily="18" charset="0"/>
-                <a:cs typeface="Times New Roman" panose="02020603050405020304" pitchFamily="18" charset="0"/>
-              </a:rPr>
-              <a:t>Nhận</a:t>
-            </a:r>
-            <a:r>
-              <a:rPr lang="en-US" dirty="0">
-                <a:latin typeface="Times New Roman" panose="02020603050405020304" pitchFamily="18" charset="0"/>
-                <a:cs typeface="Times New Roman" panose="02020603050405020304" pitchFamily="18" charset="0"/>
-              </a:rPr>
-              <a:t> </a:t>
-            </a:r>
-            <a:r>
-              <a:rPr lang="en-US" dirty="0" err="1">
-                <a:latin typeface="Times New Roman" panose="02020603050405020304" pitchFamily="18" charset="0"/>
-                <a:cs typeface="Times New Roman" panose="02020603050405020304" pitchFamily="18" charset="0"/>
-              </a:rPr>
-              <a:t>lệnh</a:t>
-            </a:r>
-            <a:r>
-              <a:rPr lang="en-US" dirty="0">
-                <a:latin typeface="Times New Roman" panose="02020603050405020304" pitchFamily="18" charset="0"/>
-                <a:cs typeface="Times New Roman" panose="02020603050405020304" pitchFamily="18" charset="0"/>
-              </a:rPr>
-              <a:t> </a:t>
-            </a:r>
-            <a:r>
-              <a:rPr lang="en-US" dirty="0" err="1">
-                <a:latin typeface="Times New Roman" panose="02020603050405020304" pitchFamily="18" charset="0"/>
-                <a:cs typeface="Times New Roman" panose="02020603050405020304" pitchFamily="18" charset="0"/>
-              </a:rPr>
-              <a:t>điều</a:t>
-            </a:r>
-            <a:r>
-              <a:rPr lang="en-US" dirty="0">
-                <a:latin typeface="Times New Roman" panose="02020603050405020304" pitchFamily="18" charset="0"/>
-                <a:cs typeface="Times New Roman" panose="02020603050405020304" pitchFamily="18" charset="0"/>
-              </a:rPr>
-              <a:t> </a:t>
-            </a:r>
-            <a:r>
-              <a:rPr lang="en-US" dirty="0" err="1">
-                <a:latin typeface="Times New Roman" panose="02020603050405020304" pitchFamily="18" charset="0"/>
-                <a:cs typeface="Times New Roman" panose="02020603050405020304" pitchFamily="18" charset="0"/>
-              </a:rPr>
-              <a:t>khiển</a:t>
-            </a:r>
-            <a:r>
-              <a:rPr lang="en-US" dirty="0">
-                <a:latin typeface="Times New Roman" panose="02020603050405020304" pitchFamily="18" charset="0"/>
-                <a:cs typeface="Times New Roman" panose="02020603050405020304" pitchFamily="18" charset="0"/>
-              </a:rPr>
-              <a:t> </a:t>
-            </a:r>
-            <a:r>
-              <a:rPr lang="en-US" dirty="0" err="1">
-                <a:latin typeface="Times New Roman" panose="02020603050405020304" pitchFamily="18" charset="0"/>
-                <a:cs typeface="Times New Roman" panose="02020603050405020304" pitchFamily="18" charset="0"/>
-              </a:rPr>
-              <a:t>từ</a:t>
-            </a:r>
-            <a:r>
-              <a:rPr lang="en-US" dirty="0">
-                <a:latin typeface="Times New Roman" panose="02020603050405020304" pitchFamily="18" charset="0"/>
-                <a:cs typeface="Times New Roman" panose="02020603050405020304" pitchFamily="18" charset="0"/>
-              </a:rPr>
-              <a:t> </a:t>
-            </a:r>
-            <a:r>
-              <a:rPr lang="en-US" dirty="0" err="1">
-                <a:latin typeface="Times New Roman" panose="02020603050405020304" pitchFamily="18" charset="0"/>
-                <a:cs typeface="Times New Roman" panose="02020603050405020304" pitchFamily="18" charset="0"/>
-              </a:rPr>
-              <a:t>người</a:t>
-            </a:r>
-            <a:r>
-              <a:rPr lang="en-US" dirty="0">
-                <a:latin typeface="Times New Roman" panose="02020603050405020304" pitchFamily="18" charset="0"/>
-                <a:cs typeface="Times New Roman" panose="02020603050405020304" pitchFamily="18" charset="0"/>
-              </a:rPr>
-              <a:t> </a:t>
-            </a:r>
-            <a:r>
-              <a:rPr lang="en-US" dirty="0" err="1">
-                <a:latin typeface="Times New Roman" panose="02020603050405020304" pitchFamily="18" charset="0"/>
-                <a:cs typeface="Times New Roman" panose="02020603050405020304" pitchFamily="18" charset="0"/>
-              </a:rPr>
-              <a:t>dùng</a:t>
-            </a:r>
-            <a:r>
-              <a:rPr lang="en-US" dirty="0">
-                <a:latin typeface="Times New Roman" panose="02020603050405020304" pitchFamily="18" charset="0"/>
-                <a:cs typeface="Times New Roman" panose="02020603050405020304" pitchFamily="18" charset="0"/>
-              </a:rPr>
-              <a:t> </a:t>
-            </a:r>
-            <a:r>
-              <a:rPr lang="en-US" dirty="0" err="1">
-                <a:latin typeface="Times New Roman" panose="02020603050405020304" pitchFamily="18" charset="0"/>
-                <a:cs typeface="Times New Roman" panose="02020603050405020304" pitchFamily="18" charset="0"/>
-              </a:rPr>
-              <a:t>và</a:t>
-            </a:r>
-            <a:r>
-              <a:rPr lang="en-US" dirty="0">
-                <a:latin typeface="Times New Roman" panose="02020603050405020304" pitchFamily="18" charset="0"/>
-                <a:cs typeface="Times New Roman" panose="02020603050405020304" pitchFamily="18" charset="0"/>
-              </a:rPr>
-              <a:t> </a:t>
-            </a:r>
-            <a:r>
-              <a:rPr lang="en-US" dirty="0" err="1">
-                <a:latin typeface="Times New Roman" panose="02020603050405020304" pitchFamily="18" charset="0"/>
-                <a:cs typeface="Times New Roman" panose="02020603050405020304" pitchFamily="18" charset="0"/>
-              </a:rPr>
-              <a:t>gửi</a:t>
-            </a:r>
-            <a:r>
-              <a:rPr lang="en-US" dirty="0">
-                <a:latin typeface="Times New Roman" panose="02020603050405020304" pitchFamily="18" charset="0"/>
-                <a:cs typeface="Times New Roman" panose="02020603050405020304" pitchFamily="18" charset="0"/>
-              </a:rPr>
-              <a:t> </a:t>
-            </a:r>
-            <a:r>
-              <a:rPr lang="en-US" dirty="0" err="1">
-                <a:latin typeface="Times New Roman" panose="02020603050405020304" pitchFamily="18" charset="0"/>
-                <a:cs typeface="Times New Roman" panose="02020603050405020304" pitchFamily="18" charset="0"/>
-              </a:rPr>
-              <a:t>lệnh</a:t>
-            </a:r>
-            <a:r>
-              <a:rPr lang="en-US" dirty="0">
-                <a:latin typeface="Times New Roman" panose="02020603050405020304" pitchFamily="18" charset="0"/>
-                <a:cs typeface="Times New Roman" panose="02020603050405020304" pitchFamily="18" charset="0"/>
-              </a:rPr>
-              <a:t> </a:t>
-            </a:r>
-            <a:r>
-              <a:rPr lang="en-US" dirty="0" err="1">
-                <a:latin typeface="Times New Roman" panose="02020603050405020304" pitchFamily="18" charset="0"/>
-                <a:cs typeface="Times New Roman" panose="02020603050405020304" pitchFamily="18" charset="0"/>
-              </a:rPr>
-              <a:t>điều</a:t>
-            </a:r>
-            <a:r>
-              <a:rPr lang="en-US" dirty="0">
-                <a:latin typeface="Times New Roman" panose="02020603050405020304" pitchFamily="18" charset="0"/>
-                <a:cs typeface="Times New Roman" panose="02020603050405020304" pitchFamily="18" charset="0"/>
-              </a:rPr>
-              <a:t> </a:t>
-            </a:r>
-            <a:r>
-              <a:rPr lang="en-US" dirty="0" err="1">
-                <a:latin typeface="Times New Roman" panose="02020603050405020304" pitchFamily="18" charset="0"/>
-                <a:cs typeface="Times New Roman" panose="02020603050405020304" pitchFamily="18" charset="0"/>
-              </a:rPr>
-              <a:t>khiển</a:t>
-            </a:r>
-            <a:r>
-              <a:rPr lang="en-US" dirty="0">
-                <a:latin typeface="Times New Roman" panose="02020603050405020304" pitchFamily="18" charset="0"/>
-                <a:cs typeface="Times New Roman" panose="02020603050405020304" pitchFamily="18" charset="0"/>
-              </a:rPr>
-              <a:t> </a:t>
-            </a:r>
-            <a:r>
-              <a:rPr lang="en-US" dirty="0" err="1">
-                <a:latin typeface="Times New Roman" panose="02020603050405020304" pitchFamily="18" charset="0"/>
-                <a:cs typeface="Times New Roman" panose="02020603050405020304" pitchFamily="18" charset="0"/>
-              </a:rPr>
-              <a:t>đến</a:t>
-            </a:r>
-            <a:r>
-              <a:rPr lang="en-US" dirty="0">
-                <a:latin typeface="Times New Roman" panose="02020603050405020304" pitchFamily="18" charset="0"/>
-                <a:cs typeface="Times New Roman" panose="02020603050405020304" pitchFamily="18" charset="0"/>
-              </a:rPr>
-              <a:t> </a:t>
-            </a:r>
-            <a:r>
-              <a:rPr lang="en-US" dirty="0" err="1">
-                <a:latin typeface="Times New Roman" panose="02020603050405020304" pitchFamily="18" charset="0"/>
-                <a:cs typeface="Times New Roman" panose="02020603050405020304" pitchFamily="18" charset="0"/>
-              </a:rPr>
-              <a:t>thiết</a:t>
-            </a:r>
-            <a:r>
-              <a:rPr lang="en-US" dirty="0">
-                <a:latin typeface="Times New Roman" panose="02020603050405020304" pitchFamily="18" charset="0"/>
-                <a:cs typeface="Times New Roman" panose="02020603050405020304" pitchFamily="18" charset="0"/>
-              </a:rPr>
-              <a:t> </a:t>
-            </a:r>
-            <a:r>
-              <a:rPr lang="en-US" dirty="0" err="1">
-                <a:latin typeface="Times New Roman" panose="02020603050405020304" pitchFamily="18" charset="0"/>
-                <a:cs typeface="Times New Roman" panose="02020603050405020304" pitchFamily="18" charset="0"/>
-              </a:rPr>
-              <a:t>bị</a:t>
-            </a:r>
-            <a:r>
-              <a:rPr lang="en-US" dirty="0">
-                <a:latin typeface="Times New Roman" panose="02020603050405020304" pitchFamily="18" charset="0"/>
-                <a:cs typeface="Times New Roman" panose="02020603050405020304" pitchFamily="18" charset="0"/>
-              </a:rPr>
-              <a:t> </a:t>
-            </a:r>
-            <a:r>
-              <a:rPr lang="en-US" dirty="0" err="1">
-                <a:latin typeface="Times New Roman" panose="02020603050405020304" pitchFamily="18" charset="0"/>
-                <a:cs typeface="Times New Roman" panose="02020603050405020304" pitchFamily="18" charset="0"/>
-              </a:rPr>
-              <a:t>đóng</a:t>
-            </a:r>
-            <a:r>
-              <a:rPr lang="en-US" dirty="0">
-                <a:latin typeface="Times New Roman" panose="02020603050405020304" pitchFamily="18" charset="0"/>
-                <a:cs typeface="Times New Roman" panose="02020603050405020304" pitchFamily="18" charset="0"/>
-              </a:rPr>
-              <a:t> </a:t>
-            </a:r>
-            <a:r>
-              <a:rPr lang="en-US" dirty="0" err="1">
-                <a:latin typeface="Times New Roman" panose="02020603050405020304" pitchFamily="18" charset="0"/>
-                <a:cs typeface="Times New Roman" panose="02020603050405020304" pitchFamily="18" charset="0"/>
-              </a:rPr>
-              <a:t>cắt</a:t>
-            </a:r>
-            <a:r>
-              <a:rPr lang="en-US" dirty="0">
-                <a:latin typeface="Times New Roman" panose="02020603050405020304" pitchFamily="18" charset="0"/>
-                <a:cs typeface="Times New Roman" panose="02020603050405020304" pitchFamily="18" charset="0"/>
-              </a:rPr>
-              <a:t> </a:t>
-            </a:r>
-            <a:r>
-              <a:rPr lang="en-US" dirty="0" err="1">
-                <a:latin typeface="Times New Roman" panose="02020603050405020304" pitchFamily="18" charset="0"/>
-                <a:cs typeface="Times New Roman" panose="02020603050405020304" pitchFamily="18" charset="0"/>
-              </a:rPr>
-              <a:t>theo</a:t>
-            </a:r>
-            <a:r>
-              <a:rPr lang="en-US" dirty="0">
-                <a:latin typeface="Times New Roman" panose="02020603050405020304" pitchFamily="18" charset="0"/>
-                <a:cs typeface="Times New Roman" panose="02020603050405020304" pitchFamily="18" charset="0"/>
-              </a:rPr>
-              <a:t> </a:t>
-            </a:r>
-            <a:r>
-              <a:rPr lang="en-US" dirty="0" err="1">
-                <a:latin typeface="Times New Roman" panose="02020603050405020304" pitchFamily="18" charset="0"/>
-                <a:cs typeface="Times New Roman" panose="02020603050405020304" pitchFamily="18" charset="0"/>
-              </a:rPr>
-              <a:t>cấu</a:t>
-            </a:r>
-            <a:r>
-              <a:rPr lang="en-US" dirty="0">
-                <a:latin typeface="Times New Roman" panose="02020603050405020304" pitchFamily="18" charset="0"/>
-                <a:cs typeface="Times New Roman" panose="02020603050405020304" pitchFamily="18" charset="0"/>
-              </a:rPr>
-              <a:t> </a:t>
-            </a:r>
-            <a:r>
-              <a:rPr lang="en-US" dirty="0" err="1">
-                <a:latin typeface="Times New Roman" panose="02020603050405020304" pitchFamily="18" charset="0"/>
-                <a:cs typeface="Times New Roman" panose="02020603050405020304" pitchFamily="18" charset="0"/>
-              </a:rPr>
-              <a:t>trúc</a:t>
-            </a:r>
-            <a:r>
-              <a:rPr lang="en-US" dirty="0">
-                <a:latin typeface="Times New Roman" panose="02020603050405020304" pitchFamily="18" charset="0"/>
-                <a:cs typeface="Times New Roman" panose="02020603050405020304" pitchFamily="18" charset="0"/>
-              </a:rPr>
-              <a:t> </a:t>
-            </a:r>
-            <a:r>
-              <a:rPr lang="en-US" dirty="0" err="1">
-                <a:latin typeface="Times New Roman" panose="02020603050405020304" pitchFamily="18" charset="0"/>
-                <a:cs typeface="Times New Roman" panose="02020603050405020304" pitchFamily="18" charset="0"/>
-              </a:rPr>
-              <a:t>bản</a:t>
-            </a:r>
-            <a:r>
-              <a:rPr lang="en-US" dirty="0">
-                <a:latin typeface="Times New Roman" panose="02020603050405020304" pitchFamily="18" charset="0"/>
-                <a:cs typeface="Times New Roman" panose="02020603050405020304" pitchFamily="18" charset="0"/>
-              </a:rPr>
-              <a:t> tin</a:t>
-            </a:r>
-          </a:p>
-          <a:p>
-            <a:pPr lvl="1">
-              <a:buFont typeface="Courier New" panose="02070309020205020404" pitchFamily="49" charset="0"/>
-              <a:buChar char="o"/>
-            </a:pPr>
-            <a:r>
-              <a:rPr lang="en-US" dirty="0">
-                <a:latin typeface="Times New Roman" panose="02020603050405020304" pitchFamily="18" charset="0"/>
-                <a:cs typeface="Times New Roman" panose="02020603050405020304" pitchFamily="18" charset="0"/>
-              </a:rPr>
-              <a:t> </a:t>
-            </a:r>
-            <a:r>
-              <a:rPr lang="en-US" dirty="0" err="1">
-                <a:latin typeface="Times New Roman" panose="02020603050405020304" pitchFamily="18" charset="0"/>
-                <a:cs typeface="Times New Roman" panose="02020603050405020304" pitchFamily="18" charset="0"/>
-              </a:rPr>
-              <a:t>Cấu</a:t>
-            </a:r>
-            <a:r>
-              <a:rPr lang="en-US" dirty="0">
-                <a:latin typeface="Times New Roman" panose="02020603050405020304" pitchFamily="18" charset="0"/>
-                <a:cs typeface="Times New Roman" panose="02020603050405020304" pitchFamily="18" charset="0"/>
-              </a:rPr>
-              <a:t> </a:t>
-            </a:r>
-            <a:r>
-              <a:rPr lang="en-US" dirty="0" err="1">
-                <a:latin typeface="Times New Roman" panose="02020603050405020304" pitchFamily="18" charset="0"/>
-                <a:cs typeface="Times New Roman" panose="02020603050405020304" pitchFamily="18" charset="0"/>
-              </a:rPr>
-              <a:t>hình</a:t>
-            </a:r>
-            <a:r>
-              <a:rPr lang="en-US" dirty="0">
-                <a:latin typeface="Times New Roman" panose="02020603050405020304" pitchFamily="18" charset="0"/>
-                <a:cs typeface="Times New Roman" panose="02020603050405020304" pitchFamily="18" charset="0"/>
-              </a:rPr>
-              <a:t> </a:t>
-            </a:r>
-            <a:r>
-              <a:rPr lang="en-US" dirty="0" err="1">
-                <a:latin typeface="Times New Roman" panose="02020603050405020304" pitchFamily="18" charset="0"/>
-                <a:cs typeface="Times New Roman" panose="02020603050405020304" pitchFamily="18" charset="0"/>
-              </a:rPr>
-              <a:t>WiFi</a:t>
-            </a:r>
-            <a:r>
-              <a:rPr lang="en-US" dirty="0">
-                <a:latin typeface="Times New Roman" panose="02020603050405020304" pitchFamily="18" charset="0"/>
-                <a:cs typeface="Times New Roman" panose="02020603050405020304" pitchFamily="18" charset="0"/>
-              </a:rPr>
-              <a:t> </a:t>
-            </a:r>
-            <a:r>
-              <a:rPr lang="en-US" dirty="0" err="1">
-                <a:latin typeface="Times New Roman" panose="02020603050405020304" pitchFamily="18" charset="0"/>
-                <a:cs typeface="Times New Roman" panose="02020603050405020304" pitchFamily="18" charset="0"/>
-              </a:rPr>
-              <a:t>cho</a:t>
-            </a:r>
-            <a:r>
-              <a:rPr lang="en-US" dirty="0">
-                <a:latin typeface="Times New Roman" panose="02020603050405020304" pitchFamily="18" charset="0"/>
-                <a:cs typeface="Times New Roman" panose="02020603050405020304" pitchFamily="18" charset="0"/>
-              </a:rPr>
-              <a:t> </a:t>
-            </a:r>
-            <a:r>
-              <a:rPr lang="en-US" dirty="0" err="1">
-                <a:latin typeface="Times New Roman" panose="02020603050405020304" pitchFamily="18" charset="0"/>
-                <a:cs typeface="Times New Roman" panose="02020603050405020304" pitchFamily="18" charset="0"/>
-              </a:rPr>
-              <a:t>thiết</a:t>
-            </a:r>
-            <a:r>
-              <a:rPr lang="en-US" dirty="0">
-                <a:latin typeface="Times New Roman" panose="02020603050405020304" pitchFamily="18" charset="0"/>
-                <a:cs typeface="Times New Roman" panose="02020603050405020304" pitchFamily="18" charset="0"/>
-              </a:rPr>
-              <a:t> </a:t>
-            </a:r>
-            <a:r>
-              <a:rPr lang="en-US" dirty="0" err="1">
-                <a:latin typeface="Times New Roman" panose="02020603050405020304" pitchFamily="18" charset="0"/>
-                <a:cs typeface="Times New Roman" panose="02020603050405020304" pitchFamily="18" charset="0"/>
-              </a:rPr>
-              <a:t>bị</a:t>
-            </a:r>
-            <a:endParaRPr lang="en-US" dirty="0">
-              <a:latin typeface="Times New Roman" panose="02020603050405020304" pitchFamily="18" charset="0"/>
-              <a:cs typeface="Times New Roman" panose="02020603050405020304" pitchFamily="18" charset="0"/>
-            </a:endParaRPr>
-          </a:p>
-          <a:p>
-            <a:pPr>
-              <a:buFontTx/>
-              <a:buChar char="-"/>
-            </a:pPr>
-            <a:endParaRPr lang="en-US" dirty="0">
+            <a:endParaRPr lang="vi-VN" dirty="0">
               <a:latin typeface="Times New Roman" panose="02020603050405020304" pitchFamily="18" charset="0"/>
               <a:cs typeface="Times New Roman" panose="02020603050405020304" pitchFamily="18" charset="0"/>
             </a:endParaRPr>
@@ -5387,10 +5263,40 @@
           </a:p>
         </p:txBody>
       </p:sp>
+      <p:pic>
+        <p:nvPicPr>
+          <p:cNvPr id="7" name="Picture 6">
+            <a:extLst>
+              <a:ext uri="{FF2B5EF4-FFF2-40B4-BE49-F238E27FC236}">
+                <a16:creationId xmlns:a16="http://schemas.microsoft.com/office/drawing/2014/main" id="{2EE5DA20-A0DF-447F-8A3A-6CEA9D39009A}"/>
+              </a:ext>
+            </a:extLst>
+          </p:cNvPr>
+          <p:cNvPicPr>
+            <a:picLocks noChangeAspect="1"/>
+          </p:cNvPicPr>
+          <p:nvPr/>
+        </p:nvPicPr>
+        <p:blipFill>
+          <a:blip r:embed="rId3"/>
+          <a:stretch>
+            <a:fillRect/>
+          </a:stretch>
+        </p:blipFill>
+        <p:spPr>
+          <a:xfrm>
+            <a:off x="4323251" y="1542015"/>
+            <a:ext cx="6072773" cy="4751237"/>
+          </a:xfrm>
+          <a:prstGeom prst="rect">
+            <a:avLst/>
+          </a:prstGeom>
+        </p:spPr>
+      </p:pic>
     </p:spTree>
     <p:extLst>
       <p:ext uri="{BB962C8B-B14F-4D97-AF65-F5344CB8AC3E}">
-        <p14:creationId xmlns:p14="http://schemas.microsoft.com/office/powerpoint/2010/main" val="1680069254"/>
+        <p14:creationId xmlns:p14="http://schemas.microsoft.com/office/powerpoint/2010/main" val="2379372365"/>
       </p:ext>
     </p:extLst>
   </p:cSld>
@@ -5442,25 +5348,221 @@
               <a:buNone/>
             </a:pPr>
             <a:r>
-              <a:rPr lang="en-US">
-                <a:latin typeface="Times New Roman" panose="02020603050405020304" pitchFamily="18" charset="0"/>
-                <a:cs typeface="Times New Roman" panose="02020603050405020304" pitchFamily="18" charset="0"/>
-              </a:rPr>
-              <a:t>2.4. Thiết kế chương trình ứng dụng điều khiển</a:t>
-            </a:r>
-          </a:p>
-          <a:p>
-            <a:pPr>
-              <a:buFontTx/>
-              <a:buChar char="-"/>
+              <a:rPr lang="en-US" dirty="0">
+                <a:latin typeface="Times New Roman" panose="02020603050405020304" pitchFamily="18" charset="0"/>
+                <a:cs typeface="Times New Roman" panose="02020603050405020304" pitchFamily="18" charset="0"/>
+              </a:rPr>
+              <a:t>2.3. </a:t>
+            </a:r>
+            <a:r>
+              <a:rPr lang="en-US" dirty="0" err="1">
+                <a:latin typeface="Times New Roman" panose="02020603050405020304" pitchFamily="18" charset="0"/>
+                <a:cs typeface="Times New Roman" panose="02020603050405020304" pitchFamily="18" charset="0"/>
+              </a:rPr>
+              <a:t>Thiết</a:t>
+            </a:r>
+            <a:r>
+              <a:rPr lang="en-US" dirty="0">
+                <a:latin typeface="Times New Roman" panose="02020603050405020304" pitchFamily="18" charset="0"/>
+                <a:cs typeface="Times New Roman" panose="02020603050405020304" pitchFamily="18" charset="0"/>
+              </a:rPr>
+              <a:t> </a:t>
+            </a:r>
+            <a:r>
+              <a:rPr lang="en-US" dirty="0" err="1">
+                <a:latin typeface="Times New Roman" panose="02020603050405020304" pitchFamily="18" charset="0"/>
+                <a:cs typeface="Times New Roman" panose="02020603050405020304" pitchFamily="18" charset="0"/>
+              </a:rPr>
+              <a:t>kế</a:t>
+            </a:r>
+            <a:r>
+              <a:rPr lang="en-US" dirty="0">
+                <a:latin typeface="Times New Roman" panose="02020603050405020304" pitchFamily="18" charset="0"/>
+                <a:cs typeface="Times New Roman" panose="02020603050405020304" pitchFamily="18" charset="0"/>
+              </a:rPr>
+              <a:t> </a:t>
+            </a:r>
+            <a:r>
+              <a:rPr lang="en-US" dirty="0" err="1">
+                <a:latin typeface="Times New Roman" panose="02020603050405020304" pitchFamily="18" charset="0"/>
+                <a:cs typeface="Times New Roman" panose="02020603050405020304" pitchFamily="18" charset="0"/>
+              </a:rPr>
+              <a:t>chương</a:t>
+            </a:r>
+            <a:r>
+              <a:rPr lang="en-US" dirty="0">
+                <a:latin typeface="Times New Roman" panose="02020603050405020304" pitchFamily="18" charset="0"/>
+                <a:cs typeface="Times New Roman" panose="02020603050405020304" pitchFamily="18" charset="0"/>
+              </a:rPr>
+              <a:t> </a:t>
+            </a:r>
+            <a:r>
+              <a:rPr lang="en-US" dirty="0" err="1">
+                <a:latin typeface="Times New Roman" panose="02020603050405020304" pitchFamily="18" charset="0"/>
+                <a:cs typeface="Times New Roman" panose="02020603050405020304" pitchFamily="18" charset="0"/>
+              </a:rPr>
+              <a:t>trình</a:t>
+            </a:r>
+            <a:r>
+              <a:rPr lang="en-US" dirty="0">
+                <a:latin typeface="Times New Roman" panose="02020603050405020304" pitchFamily="18" charset="0"/>
+                <a:cs typeface="Times New Roman" panose="02020603050405020304" pitchFamily="18" charset="0"/>
+              </a:rPr>
+              <a:t> vi </a:t>
+            </a:r>
+            <a:r>
+              <a:rPr lang="en-US" dirty="0" err="1">
+                <a:latin typeface="Times New Roman" panose="02020603050405020304" pitchFamily="18" charset="0"/>
+                <a:cs typeface="Times New Roman" panose="02020603050405020304" pitchFamily="18" charset="0"/>
+              </a:rPr>
+              <a:t>điều</a:t>
+            </a:r>
+            <a:r>
+              <a:rPr lang="en-US" dirty="0">
+                <a:latin typeface="Times New Roman" panose="02020603050405020304" pitchFamily="18" charset="0"/>
+                <a:cs typeface="Times New Roman" panose="02020603050405020304" pitchFamily="18" charset="0"/>
+              </a:rPr>
+              <a:t> </a:t>
+            </a:r>
+            <a:r>
+              <a:rPr lang="en-US" dirty="0" err="1">
+                <a:latin typeface="Times New Roman" panose="02020603050405020304" pitchFamily="18" charset="0"/>
+                <a:cs typeface="Times New Roman" panose="02020603050405020304" pitchFamily="18" charset="0"/>
+              </a:rPr>
+              <a:t>khiển</a:t>
+            </a:r>
+            <a:endParaRPr lang="en-US" dirty="0">
+              <a:latin typeface="Times New Roman" panose="02020603050405020304" pitchFamily="18" charset="0"/>
+              <a:cs typeface="Times New Roman" panose="02020603050405020304" pitchFamily="18" charset="0"/>
+            </a:endParaRPr>
+          </a:p>
+          <a:p>
+            <a:r>
+              <a:rPr lang="en-US" dirty="0" err="1">
+                <a:latin typeface="Times New Roman" panose="02020603050405020304" pitchFamily="18" charset="0"/>
+                <a:cs typeface="Times New Roman" panose="02020603050405020304" pitchFamily="18" charset="0"/>
+              </a:rPr>
+              <a:t>Lưu</a:t>
+            </a:r>
+            <a:r>
+              <a:rPr lang="en-US" dirty="0">
+                <a:latin typeface="Times New Roman" panose="02020603050405020304" pitchFamily="18" charset="0"/>
+                <a:cs typeface="Times New Roman" panose="02020603050405020304" pitchFamily="18" charset="0"/>
+              </a:rPr>
+              <a:t> </a:t>
+            </a:r>
+            <a:r>
+              <a:rPr lang="en-US" dirty="0" err="1">
+                <a:latin typeface="Times New Roman" panose="02020603050405020304" pitchFamily="18" charset="0"/>
+                <a:cs typeface="Times New Roman" panose="02020603050405020304" pitchFamily="18" charset="0"/>
+              </a:rPr>
+              <a:t>đồ</a:t>
+            </a:r>
+            <a:r>
+              <a:rPr lang="en-US" dirty="0">
+                <a:latin typeface="Times New Roman" panose="02020603050405020304" pitchFamily="18" charset="0"/>
+                <a:cs typeface="Times New Roman" panose="02020603050405020304" pitchFamily="18" charset="0"/>
+              </a:rPr>
+              <a:t> </a:t>
+            </a:r>
+            <a:r>
+              <a:rPr lang="en-US" dirty="0" err="1">
+                <a:latin typeface="Times New Roman" panose="02020603050405020304" pitchFamily="18" charset="0"/>
+                <a:cs typeface="Times New Roman" panose="02020603050405020304" pitchFamily="18" charset="0"/>
+              </a:rPr>
+              <a:t>thuật</a:t>
+            </a:r>
+            <a:r>
+              <a:rPr lang="en-US" dirty="0">
+                <a:latin typeface="Times New Roman" panose="02020603050405020304" pitchFamily="18" charset="0"/>
+                <a:cs typeface="Times New Roman" panose="02020603050405020304" pitchFamily="18" charset="0"/>
+              </a:rPr>
+              <a:t> </a:t>
+            </a:r>
+            <a:r>
+              <a:rPr lang="en-US" dirty="0" err="1">
+                <a:latin typeface="Times New Roman" panose="02020603050405020304" pitchFamily="18" charset="0"/>
+                <a:cs typeface="Times New Roman" panose="02020603050405020304" pitchFamily="18" charset="0"/>
+              </a:rPr>
+              <a:t>toán</a:t>
+            </a:r>
+            <a:r>
+              <a:rPr lang="en-US" dirty="0">
+                <a:latin typeface="Times New Roman" panose="02020603050405020304" pitchFamily="18" charset="0"/>
+                <a:cs typeface="Times New Roman" panose="02020603050405020304" pitchFamily="18" charset="0"/>
+              </a:rPr>
+              <a:t>:</a:t>
+            </a:r>
+          </a:p>
+          <a:p>
+            <a:pPr marL="0" indent="0">
+              <a:buNone/>
             </a:pPr>
             <a:r>
-              <a:rPr lang="en-US">
-                <a:latin typeface="Times New Roman" panose="02020603050405020304" pitchFamily="18" charset="0"/>
-                <a:cs typeface="Times New Roman" panose="02020603050405020304" pitchFamily="18" charset="0"/>
-              </a:rPr>
-              <a:t>Lưu đồ thuật toán:</a:t>
-            </a:r>
+              <a:rPr lang="en-US" dirty="0" err="1">
+                <a:latin typeface="Times New Roman" panose="02020603050405020304" pitchFamily="18" charset="0"/>
+                <a:cs typeface="Times New Roman" panose="02020603050405020304" pitchFamily="18" charset="0"/>
+              </a:rPr>
+              <a:t>Hàm</a:t>
+            </a:r>
+            <a:r>
+              <a:rPr lang="en-US" dirty="0">
+                <a:latin typeface="Times New Roman" panose="02020603050405020304" pitchFamily="18" charset="0"/>
+                <a:cs typeface="Times New Roman" panose="02020603050405020304" pitchFamily="18" charset="0"/>
+              </a:rPr>
+              <a:t> </a:t>
+            </a:r>
+            <a:r>
+              <a:rPr lang="en-US" dirty="0" err="1">
+                <a:latin typeface="Times New Roman" panose="02020603050405020304" pitchFamily="18" charset="0"/>
+                <a:cs typeface="Times New Roman" panose="02020603050405020304" pitchFamily="18" charset="0"/>
+              </a:rPr>
+              <a:t>ngắt</a:t>
+            </a:r>
+            <a:r>
+              <a:rPr lang="en-US" dirty="0">
+                <a:latin typeface="Times New Roman" panose="02020603050405020304" pitchFamily="18" charset="0"/>
+                <a:cs typeface="Times New Roman" panose="02020603050405020304" pitchFamily="18" charset="0"/>
+              </a:rPr>
+              <a:t> </a:t>
+            </a:r>
+            <a:r>
+              <a:rPr lang="en-US" dirty="0" err="1">
+                <a:latin typeface="Times New Roman" panose="02020603050405020304" pitchFamily="18" charset="0"/>
+                <a:cs typeface="Times New Roman" panose="02020603050405020304" pitchFamily="18" charset="0"/>
+              </a:rPr>
+              <a:t>nút</a:t>
+            </a:r>
+            <a:r>
+              <a:rPr lang="en-US" dirty="0">
+                <a:latin typeface="Times New Roman" panose="02020603050405020304" pitchFamily="18" charset="0"/>
+                <a:cs typeface="Times New Roman" panose="02020603050405020304" pitchFamily="18" charset="0"/>
+              </a:rPr>
+              <a:t> </a:t>
+            </a:r>
+            <a:r>
+              <a:rPr lang="en-US" dirty="0" err="1">
+                <a:latin typeface="Times New Roman" panose="02020603050405020304" pitchFamily="18" charset="0"/>
+                <a:cs typeface="Times New Roman" panose="02020603050405020304" pitchFamily="18" charset="0"/>
+              </a:rPr>
+              <a:t>nhấn</a:t>
+            </a:r>
+            <a:r>
+              <a:rPr lang="en-US" dirty="0">
+                <a:latin typeface="Times New Roman" panose="02020603050405020304" pitchFamily="18" charset="0"/>
+                <a:cs typeface="Times New Roman" panose="02020603050405020304" pitchFamily="18" charset="0"/>
+              </a:rPr>
+              <a:t>:</a:t>
+            </a:r>
+          </a:p>
+          <a:p>
+            <a:pPr marL="0" indent="0">
+              <a:buNone/>
+            </a:pPr>
+            <a:endParaRPr lang="vi-VN" dirty="0">
+              <a:latin typeface="Times New Roman" panose="02020603050405020304" pitchFamily="18" charset="0"/>
+              <a:cs typeface="Times New Roman" panose="02020603050405020304" pitchFamily="18" charset="0"/>
+            </a:endParaRPr>
           </a:p>
         </p:txBody>
       </p:sp>
@@ -5498,7 +5600,7 @@
     </p:spTree>
     <p:extLst>
       <p:ext uri="{BB962C8B-B14F-4D97-AF65-F5344CB8AC3E}">
-        <p14:creationId xmlns:p14="http://schemas.microsoft.com/office/powerpoint/2010/main" val="1150083193"/>
+        <p14:creationId xmlns:p14="http://schemas.microsoft.com/office/powerpoint/2010/main" val="34602749"/>
       </p:ext>
     </p:extLst>
   </p:cSld>
@@ -5550,25 +5652,235 @@
               <a:buNone/>
             </a:pPr>
             <a:r>
-              <a:rPr lang="en-US">
-                <a:latin typeface="Times New Roman" panose="02020603050405020304" pitchFamily="18" charset="0"/>
-                <a:cs typeface="Times New Roman" panose="02020603050405020304" pitchFamily="18" charset="0"/>
-              </a:rPr>
-              <a:t>2.4. Thiết kế chương trình ứng dụng điều khiển</a:t>
-            </a:r>
-          </a:p>
-          <a:p>
-            <a:pPr>
-              <a:buFontTx/>
-              <a:buChar char="-"/>
+              <a:rPr lang="en-US" dirty="0">
+                <a:latin typeface="Times New Roman" panose="02020603050405020304" pitchFamily="18" charset="0"/>
+                <a:cs typeface="Times New Roman" panose="02020603050405020304" pitchFamily="18" charset="0"/>
+              </a:rPr>
+              <a:t>2.3. </a:t>
+            </a:r>
+            <a:r>
+              <a:rPr lang="en-US" dirty="0" err="1">
+                <a:latin typeface="Times New Roman" panose="02020603050405020304" pitchFamily="18" charset="0"/>
+                <a:cs typeface="Times New Roman" panose="02020603050405020304" pitchFamily="18" charset="0"/>
+              </a:rPr>
+              <a:t>Thiết</a:t>
+            </a:r>
+            <a:r>
+              <a:rPr lang="en-US" dirty="0">
+                <a:latin typeface="Times New Roman" panose="02020603050405020304" pitchFamily="18" charset="0"/>
+                <a:cs typeface="Times New Roman" panose="02020603050405020304" pitchFamily="18" charset="0"/>
+              </a:rPr>
+              <a:t> </a:t>
+            </a:r>
+            <a:r>
+              <a:rPr lang="en-US" dirty="0" err="1">
+                <a:latin typeface="Times New Roman" panose="02020603050405020304" pitchFamily="18" charset="0"/>
+                <a:cs typeface="Times New Roman" panose="02020603050405020304" pitchFamily="18" charset="0"/>
+              </a:rPr>
+              <a:t>kế</a:t>
+            </a:r>
+            <a:r>
+              <a:rPr lang="en-US" dirty="0">
+                <a:latin typeface="Times New Roman" panose="02020603050405020304" pitchFamily="18" charset="0"/>
+                <a:cs typeface="Times New Roman" panose="02020603050405020304" pitchFamily="18" charset="0"/>
+              </a:rPr>
+              <a:t> </a:t>
+            </a:r>
+            <a:r>
+              <a:rPr lang="en-US" dirty="0" err="1">
+                <a:latin typeface="Times New Roman" panose="02020603050405020304" pitchFamily="18" charset="0"/>
+                <a:cs typeface="Times New Roman" panose="02020603050405020304" pitchFamily="18" charset="0"/>
+              </a:rPr>
+              <a:t>chương</a:t>
+            </a:r>
+            <a:r>
+              <a:rPr lang="en-US" dirty="0">
+                <a:latin typeface="Times New Roman" panose="02020603050405020304" pitchFamily="18" charset="0"/>
+                <a:cs typeface="Times New Roman" panose="02020603050405020304" pitchFamily="18" charset="0"/>
+              </a:rPr>
+              <a:t> </a:t>
+            </a:r>
+            <a:r>
+              <a:rPr lang="en-US" dirty="0" err="1">
+                <a:latin typeface="Times New Roman" panose="02020603050405020304" pitchFamily="18" charset="0"/>
+                <a:cs typeface="Times New Roman" panose="02020603050405020304" pitchFamily="18" charset="0"/>
+              </a:rPr>
+              <a:t>trình</a:t>
+            </a:r>
+            <a:r>
+              <a:rPr lang="en-US" dirty="0">
+                <a:latin typeface="Times New Roman" panose="02020603050405020304" pitchFamily="18" charset="0"/>
+                <a:cs typeface="Times New Roman" panose="02020603050405020304" pitchFamily="18" charset="0"/>
+              </a:rPr>
+              <a:t> vi </a:t>
+            </a:r>
+            <a:r>
+              <a:rPr lang="en-US" dirty="0" err="1">
+                <a:latin typeface="Times New Roman" panose="02020603050405020304" pitchFamily="18" charset="0"/>
+                <a:cs typeface="Times New Roman" panose="02020603050405020304" pitchFamily="18" charset="0"/>
+              </a:rPr>
+              <a:t>điều</a:t>
+            </a:r>
+            <a:r>
+              <a:rPr lang="en-US" dirty="0">
+                <a:latin typeface="Times New Roman" panose="02020603050405020304" pitchFamily="18" charset="0"/>
+                <a:cs typeface="Times New Roman" panose="02020603050405020304" pitchFamily="18" charset="0"/>
+              </a:rPr>
+              <a:t> </a:t>
+            </a:r>
+            <a:r>
+              <a:rPr lang="en-US" dirty="0" err="1">
+                <a:latin typeface="Times New Roman" panose="02020603050405020304" pitchFamily="18" charset="0"/>
+                <a:cs typeface="Times New Roman" panose="02020603050405020304" pitchFamily="18" charset="0"/>
+              </a:rPr>
+              <a:t>khiển</a:t>
+            </a:r>
+            <a:endParaRPr lang="en-US" dirty="0">
+              <a:latin typeface="Times New Roman" panose="02020603050405020304" pitchFamily="18" charset="0"/>
+              <a:cs typeface="Times New Roman" panose="02020603050405020304" pitchFamily="18" charset="0"/>
+            </a:endParaRPr>
+          </a:p>
+          <a:p>
+            <a:r>
+              <a:rPr lang="en-US" dirty="0" err="1">
+                <a:latin typeface="Times New Roman" panose="02020603050405020304" pitchFamily="18" charset="0"/>
+                <a:cs typeface="Times New Roman" panose="02020603050405020304" pitchFamily="18" charset="0"/>
+              </a:rPr>
+              <a:t>Lưu</a:t>
+            </a:r>
+            <a:r>
+              <a:rPr lang="en-US" dirty="0">
+                <a:latin typeface="Times New Roman" panose="02020603050405020304" pitchFamily="18" charset="0"/>
+                <a:cs typeface="Times New Roman" panose="02020603050405020304" pitchFamily="18" charset="0"/>
+              </a:rPr>
+              <a:t> </a:t>
+            </a:r>
+            <a:r>
+              <a:rPr lang="en-US" dirty="0" err="1">
+                <a:latin typeface="Times New Roman" panose="02020603050405020304" pitchFamily="18" charset="0"/>
+                <a:cs typeface="Times New Roman" panose="02020603050405020304" pitchFamily="18" charset="0"/>
+              </a:rPr>
+              <a:t>đồ</a:t>
+            </a:r>
+            <a:r>
+              <a:rPr lang="en-US" dirty="0">
+                <a:latin typeface="Times New Roman" panose="02020603050405020304" pitchFamily="18" charset="0"/>
+                <a:cs typeface="Times New Roman" panose="02020603050405020304" pitchFamily="18" charset="0"/>
+              </a:rPr>
+              <a:t> </a:t>
+            </a:r>
+            <a:r>
+              <a:rPr lang="en-US" dirty="0" err="1">
+                <a:latin typeface="Times New Roman" panose="02020603050405020304" pitchFamily="18" charset="0"/>
+                <a:cs typeface="Times New Roman" panose="02020603050405020304" pitchFamily="18" charset="0"/>
+              </a:rPr>
+              <a:t>thuật</a:t>
+            </a:r>
+            <a:r>
+              <a:rPr lang="en-US" dirty="0">
+                <a:latin typeface="Times New Roman" panose="02020603050405020304" pitchFamily="18" charset="0"/>
+                <a:cs typeface="Times New Roman" panose="02020603050405020304" pitchFamily="18" charset="0"/>
+              </a:rPr>
+              <a:t> </a:t>
+            </a:r>
+            <a:r>
+              <a:rPr lang="en-US" dirty="0" err="1">
+                <a:latin typeface="Times New Roman" panose="02020603050405020304" pitchFamily="18" charset="0"/>
+                <a:cs typeface="Times New Roman" panose="02020603050405020304" pitchFamily="18" charset="0"/>
+              </a:rPr>
+              <a:t>toán</a:t>
+            </a:r>
+            <a:r>
+              <a:rPr lang="en-US" dirty="0">
+                <a:latin typeface="Times New Roman" panose="02020603050405020304" pitchFamily="18" charset="0"/>
+                <a:cs typeface="Times New Roman" panose="02020603050405020304" pitchFamily="18" charset="0"/>
+              </a:rPr>
+              <a:t>:</a:t>
+            </a:r>
+          </a:p>
+          <a:p>
+            <a:pPr marL="0" indent="0">
+              <a:buNone/>
             </a:pPr>
             <a:r>
-              <a:rPr lang="en-US">
-                <a:latin typeface="Times New Roman" panose="02020603050405020304" pitchFamily="18" charset="0"/>
-                <a:cs typeface="Times New Roman" panose="02020603050405020304" pitchFamily="18" charset="0"/>
-              </a:rPr>
-              <a:t>Xây dựng giao diện cho chương trình:</a:t>
-            </a:r>
+              <a:rPr lang="en-US" dirty="0" err="1">
+                <a:latin typeface="Times New Roman" panose="02020603050405020304" pitchFamily="18" charset="0"/>
+                <a:cs typeface="Times New Roman" panose="02020603050405020304" pitchFamily="18" charset="0"/>
+              </a:rPr>
+              <a:t>Hàm</a:t>
+            </a:r>
+            <a:r>
+              <a:rPr lang="en-US" dirty="0">
+                <a:latin typeface="Times New Roman" panose="02020603050405020304" pitchFamily="18" charset="0"/>
+                <a:cs typeface="Times New Roman" panose="02020603050405020304" pitchFamily="18" charset="0"/>
+              </a:rPr>
+              <a:t> </a:t>
+            </a:r>
+            <a:r>
+              <a:rPr lang="en-US" dirty="0" err="1">
+                <a:latin typeface="Times New Roman" panose="02020603050405020304" pitchFamily="18" charset="0"/>
+                <a:cs typeface="Times New Roman" panose="02020603050405020304" pitchFamily="18" charset="0"/>
+              </a:rPr>
+              <a:t>xử</a:t>
+            </a:r>
+            <a:r>
+              <a:rPr lang="en-US" dirty="0">
+                <a:latin typeface="Times New Roman" panose="02020603050405020304" pitchFamily="18" charset="0"/>
+                <a:cs typeface="Times New Roman" panose="02020603050405020304" pitchFamily="18" charset="0"/>
+              </a:rPr>
+              <a:t> </a:t>
+            </a:r>
+            <a:r>
+              <a:rPr lang="en-US" dirty="0" err="1">
+                <a:latin typeface="Times New Roman" panose="02020603050405020304" pitchFamily="18" charset="0"/>
+                <a:cs typeface="Times New Roman" panose="02020603050405020304" pitchFamily="18" charset="0"/>
+              </a:rPr>
+              <a:t>lý</a:t>
+            </a:r>
+            <a:r>
+              <a:rPr lang="en-US" dirty="0">
+                <a:latin typeface="Times New Roman" panose="02020603050405020304" pitchFamily="18" charset="0"/>
+                <a:cs typeface="Times New Roman" panose="02020603050405020304" pitchFamily="18" charset="0"/>
+              </a:rPr>
+              <a:t> </a:t>
+            </a:r>
+            <a:r>
+              <a:rPr lang="en-US" dirty="0" err="1">
+                <a:latin typeface="Times New Roman" panose="02020603050405020304" pitchFamily="18" charset="0"/>
+                <a:cs typeface="Times New Roman" panose="02020603050405020304" pitchFamily="18" charset="0"/>
+              </a:rPr>
+              <a:t>nhấn</a:t>
+            </a:r>
+            <a:r>
+              <a:rPr lang="en-US" dirty="0">
+                <a:latin typeface="Times New Roman" panose="02020603050405020304" pitchFamily="18" charset="0"/>
+                <a:cs typeface="Times New Roman" panose="02020603050405020304" pitchFamily="18" charset="0"/>
+              </a:rPr>
+              <a:t> </a:t>
+            </a:r>
+            <a:r>
+              <a:rPr lang="en-US" dirty="0" err="1">
+                <a:latin typeface="Times New Roman" panose="02020603050405020304" pitchFamily="18" charset="0"/>
+                <a:cs typeface="Times New Roman" panose="02020603050405020304" pitchFamily="18" charset="0"/>
+              </a:rPr>
+              <a:t>giữ</a:t>
+            </a:r>
+            <a:r>
+              <a:rPr lang="en-US" dirty="0">
+                <a:latin typeface="Times New Roman" panose="02020603050405020304" pitchFamily="18" charset="0"/>
+                <a:cs typeface="Times New Roman" panose="02020603050405020304" pitchFamily="18" charset="0"/>
+              </a:rPr>
+              <a:t>:</a:t>
+            </a:r>
+          </a:p>
+          <a:p>
+            <a:pPr marL="0" indent="0">
+              <a:buNone/>
+            </a:pPr>
+            <a:endParaRPr lang="vi-VN" dirty="0">
+              <a:latin typeface="Times New Roman" panose="02020603050405020304" pitchFamily="18" charset="0"/>
+              <a:cs typeface="Times New Roman" panose="02020603050405020304" pitchFamily="18" charset="0"/>
+            </a:endParaRPr>
           </a:p>
         </p:txBody>
       </p:sp>
@@ -5603,10 +5915,40 @@
           </a:p>
         </p:txBody>
       </p:sp>
+      <p:pic>
+        <p:nvPicPr>
+          <p:cNvPr id="7" name="Picture 6">
+            <a:extLst>
+              <a:ext uri="{FF2B5EF4-FFF2-40B4-BE49-F238E27FC236}">
+                <a16:creationId xmlns:a16="http://schemas.microsoft.com/office/drawing/2014/main" id="{5BD8F7A2-72C5-4316-89CD-EFBAD7E55A86}"/>
+              </a:ext>
+            </a:extLst>
+          </p:cNvPr>
+          <p:cNvPicPr>
+            <a:picLocks noChangeAspect="1"/>
+          </p:cNvPicPr>
+          <p:nvPr/>
+        </p:nvPicPr>
+        <p:blipFill>
+          <a:blip r:embed="rId3"/>
+          <a:stretch>
+            <a:fillRect/>
+          </a:stretch>
+        </p:blipFill>
+        <p:spPr>
+          <a:xfrm>
+            <a:off x="3689691" y="1744394"/>
+            <a:ext cx="8191029" cy="3817453"/>
+          </a:xfrm>
+          <a:prstGeom prst="rect">
+            <a:avLst/>
+          </a:prstGeom>
+        </p:spPr>
+      </p:pic>
     </p:spTree>
     <p:extLst>
       <p:ext uri="{BB962C8B-B14F-4D97-AF65-F5344CB8AC3E}">
-        <p14:creationId xmlns:p14="http://schemas.microsoft.com/office/powerpoint/2010/main" val="2258938354"/>
+        <p14:creationId xmlns:p14="http://schemas.microsoft.com/office/powerpoint/2010/main" val="204686227"/>
       </p:ext>
     </p:extLst>
   </p:cSld>
@@ -5658,13 +6000,218 @@
               <a:buNone/>
             </a:pPr>
             <a:r>
-              <a:rPr lang="en-US">
-                <a:latin typeface="Times New Roman" panose="02020603050405020304" pitchFamily="18" charset="0"/>
-                <a:cs typeface="Times New Roman" panose="02020603050405020304" pitchFamily="18" charset="0"/>
-              </a:rPr>
-              <a:t>Mô hình hệ thống</a:t>
-            </a:r>
-            <a:endParaRPr lang="vi-VN">
+              <a:rPr lang="en-US" dirty="0">
+                <a:latin typeface="Times New Roman" panose="02020603050405020304" pitchFamily="18" charset="0"/>
+                <a:cs typeface="Times New Roman" panose="02020603050405020304" pitchFamily="18" charset="0"/>
+              </a:rPr>
+              <a:t>2.3. </a:t>
+            </a:r>
+            <a:r>
+              <a:rPr lang="en-US" dirty="0" err="1">
+                <a:latin typeface="Times New Roman" panose="02020603050405020304" pitchFamily="18" charset="0"/>
+                <a:cs typeface="Times New Roman" panose="02020603050405020304" pitchFamily="18" charset="0"/>
+              </a:rPr>
+              <a:t>Thiết</a:t>
+            </a:r>
+            <a:r>
+              <a:rPr lang="en-US" dirty="0">
+                <a:latin typeface="Times New Roman" panose="02020603050405020304" pitchFamily="18" charset="0"/>
+                <a:cs typeface="Times New Roman" panose="02020603050405020304" pitchFamily="18" charset="0"/>
+              </a:rPr>
+              <a:t> </a:t>
+            </a:r>
+            <a:r>
+              <a:rPr lang="en-US" dirty="0" err="1">
+                <a:latin typeface="Times New Roman" panose="02020603050405020304" pitchFamily="18" charset="0"/>
+                <a:cs typeface="Times New Roman" panose="02020603050405020304" pitchFamily="18" charset="0"/>
+              </a:rPr>
+              <a:t>kế</a:t>
+            </a:r>
+            <a:r>
+              <a:rPr lang="en-US" dirty="0">
+                <a:latin typeface="Times New Roman" panose="02020603050405020304" pitchFamily="18" charset="0"/>
+                <a:cs typeface="Times New Roman" panose="02020603050405020304" pitchFamily="18" charset="0"/>
+              </a:rPr>
+              <a:t> </a:t>
+            </a:r>
+            <a:r>
+              <a:rPr lang="en-US" dirty="0" err="1">
+                <a:latin typeface="Times New Roman" panose="02020603050405020304" pitchFamily="18" charset="0"/>
+                <a:cs typeface="Times New Roman" panose="02020603050405020304" pitchFamily="18" charset="0"/>
+              </a:rPr>
+              <a:t>chương</a:t>
+            </a:r>
+            <a:r>
+              <a:rPr lang="en-US" dirty="0">
+                <a:latin typeface="Times New Roman" panose="02020603050405020304" pitchFamily="18" charset="0"/>
+                <a:cs typeface="Times New Roman" panose="02020603050405020304" pitchFamily="18" charset="0"/>
+              </a:rPr>
+              <a:t> </a:t>
+            </a:r>
+            <a:r>
+              <a:rPr lang="en-US" dirty="0" err="1">
+                <a:latin typeface="Times New Roman" panose="02020603050405020304" pitchFamily="18" charset="0"/>
+                <a:cs typeface="Times New Roman" panose="02020603050405020304" pitchFamily="18" charset="0"/>
+              </a:rPr>
+              <a:t>trình</a:t>
+            </a:r>
+            <a:r>
+              <a:rPr lang="en-US" dirty="0">
+                <a:latin typeface="Times New Roman" panose="02020603050405020304" pitchFamily="18" charset="0"/>
+                <a:cs typeface="Times New Roman" panose="02020603050405020304" pitchFamily="18" charset="0"/>
+              </a:rPr>
+              <a:t> vi </a:t>
+            </a:r>
+            <a:r>
+              <a:rPr lang="en-US" dirty="0" err="1">
+                <a:latin typeface="Times New Roman" panose="02020603050405020304" pitchFamily="18" charset="0"/>
+                <a:cs typeface="Times New Roman" panose="02020603050405020304" pitchFamily="18" charset="0"/>
+              </a:rPr>
+              <a:t>điều</a:t>
+            </a:r>
+            <a:r>
+              <a:rPr lang="en-US" dirty="0">
+                <a:latin typeface="Times New Roman" panose="02020603050405020304" pitchFamily="18" charset="0"/>
+                <a:cs typeface="Times New Roman" panose="02020603050405020304" pitchFamily="18" charset="0"/>
+              </a:rPr>
+              <a:t> </a:t>
+            </a:r>
+            <a:r>
+              <a:rPr lang="en-US" dirty="0" err="1">
+                <a:latin typeface="Times New Roman" panose="02020603050405020304" pitchFamily="18" charset="0"/>
+                <a:cs typeface="Times New Roman" panose="02020603050405020304" pitchFamily="18" charset="0"/>
+              </a:rPr>
+              <a:t>khiển</a:t>
+            </a:r>
+            <a:endParaRPr lang="en-US" dirty="0">
+              <a:latin typeface="Times New Roman" panose="02020603050405020304" pitchFamily="18" charset="0"/>
+              <a:cs typeface="Times New Roman" panose="02020603050405020304" pitchFamily="18" charset="0"/>
+            </a:endParaRPr>
+          </a:p>
+          <a:p>
+            <a:r>
+              <a:rPr lang="en-US" dirty="0" err="1">
+                <a:latin typeface="Times New Roman" panose="02020603050405020304" pitchFamily="18" charset="0"/>
+                <a:cs typeface="Times New Roman" panose="02020603050405020304" pitchFamily="18" charset="0"/>
+              </a:rPr>
+              <a:t>Lưu</a:t>
+            </a:r>
+            <a:r>
+              <a:rPr lang="en-US" dirty="0">
+                <a:latin typeface="Times New Roman" panose="02020603050405020304" pitchFamily="18" charset="0"/>
+                <a:cs typeface="Times New Roman" panose="02020603050405020304" pitchFamily="18" charset="0"/>
+              </a:rPr>
+              <a:t> </a:t>
+            </a:r>
+            <a:r>
+              <a:rPr lang="en-US" dirty="0" err="1">
+                <a:latin typeface="Times New Roman" panose="02020603050405020304" pitchFamily="18" charset="0"/>
+                <a:cs typeface="Times New Roman" panose="02020603050405020304" pitchFamily="18" charset="0"/>
+              </a:rPr>
+              <a:t>đồ</a:t>
+            </a:r>
+            <a:r>
+              <a:rPr lang="en-US" dirty="0">
+                <a:latin typeface="Times New Roman" panose="02020603050405020304" pitchFamily="18" charset="0"/>
+                <a:cs typeface="Times New Roman" panose="02020603050405020304" pitchFamily="18" charset="0"/>
+              </a:rPr>
+              <a:t> </a:t>
+            </a:r>
+            <a:r>
+              <a:rPr lang="en-US" dirty="0" err="1">
+                <a:latin typeface="Times New Roman" panose="02020603050405020304" pitchFamily="18" charset="0"/>
+                <a:cs typeface="Times New Roman" panose="02020603050405020304" pitchFamily="18" charset="0"/>
+              </a:rPr>
+              <a:t>thuật</a:t>
+            </a:r>
+            <a:r>
+              <a:rPr lang="en-US" dirty="0">
+                <a:latin typeface="Times New Roman" panose="02020603050405020304" pitchFamily="18" charset="0"/>
+                <a:cs typeface="Times New Roman" panose="02020603050405020304" pitchFamily="18" charset="0"/>
+              </a:rPr>
+              <a:t> </a:t>
+            </a:r>
+            <a:r>
+              <a:rPr lang="en-US" dirty="0" err="1">
+                <a:latin typeface="Times New Roman" panose="02020603050405020304" pitchFamily="18" charset="0"/>
+                <a:cs typeface="Times New Roman" panose="02020603050405020304" pitchFamily="18" charset="0"/>
+              </a:rPr>
+              <a:t>toán</a:t>
+            </a:r>
+            <a:r>
+              <a:rPr lang="en-US" dirty="0">
+                <a:latin typeface="Times New Roman" panose="02020603050405020304" pitchFamily="18" charset="0"/>
+                <a:cs typeface="Times New Roman" panose="02020603050405020304" pitchFamily="18" charset="0"/>
+              </a:rPr>
+              <a:t>:</a:t>
+            </a:r>
+          </a:p>
+          <a:p>
+            <a:pPr marL="0" indent="0">
+              <a:buNone/>
+            </a:pPr>
+            <a:r>
+              <a:rPr lang="en-US" dirty="0" err="1">
+                <a:latin typeface="Times New Roman" panose="02020603050405020304" pitchFamily="18" charset="0"/>
+                <a:cs typeface="Times New Roman" panose="02020603050405020304" pitchFamily="18" charset="0"/>
+              </a:rPr>
+              <a:t>Hàm</a:t>
+            </a:r>
+            <a:r>
+              <a:rPr lang="en-US" dirty="0">
+                <a:latin typeface="Times New Roman" panose="02020603050405020304" pitchFamily="18" charset="0"/>
+                <a:cs typeface="Times New Roman" panose="02020603050405020304" pitchFamily="18" charset="0"/>
+              </a:rPr>
+              <a:t> </a:t>
+            </a:r>
+            <a:r>
+              <a:rPr lang="en-US" dirty="0" err="1">
+                <a:latin typeface="Times New Roman" panose="02020603050405020304" pitchFamily="18" charset="0"/>
+                <a:cs typeface="Times New Roman" panose="02020603050405020304" pitchFamily="18" charset="0"/>
+              </a:rPr>
+              <a:t>hàm</a:t>
+            </a:r>
+            <a:r>
+              <a:rPr lang="en-US" dirty="0">
+                <a:latin typeface="Times New Roman" panose="02020603050405020304" pitchFamily="18" charset="0"/>
+                <a:cs typeface="Times New Roman" panose="02020603050405020304" pitchFamily="18" charset="0"/>
+              </a:rPr>
+              <a:t> </a:t>
+            </a:r>
+            <a:r>
+              <a:rPr lang="en-US" dirty="0" err="1">
+                <a:latin typeface="Times New Roman" panose="02020603050405020304" pitchFamily="18" charset="0"/>
+                <a:cs typeface="Times New Roman" panose="02020603050405020304" pitchFamily="18" charset="0"/>
+              </a:rPr>
+              <a:t>truyền</a:t>
+            </a:r>
+            <a:r>
+              <a:rPr lang="en-US" dirty="0">
+                <a:latin typeface="Times New Roman" panose="02020603050405020304" pitchFamily="18" charset="0"/>
+                <a:cs typeface="Times New Roman" panose="02020603050405020304" pitchFamily="18" charset="0"/>
+              </a:rPr>
+              <a:t> </a:t>
+            </a:r>
+            <a:r>
+              <a:rPr lang="en-US" dirty="0" err="1">
+                <a:latin typeface="Times New Roman" panose="02020603050405020304" pitchFamily="18" charset="0"/>
+                <a:cs typeface="Times New Roman" panose="02020603050405020304" pitchFamily="18" charset="0"/>
+              </a:rPr>
+              <a:t>thông</a:t>
+            </a:r>
+            <a:r>
+              <a:rPr lang="en-US" dirty="0">
+                <a:latin typeface="Times New Roman" panose="02020603050405020304" pitchFamily="18" charset="0"/>
+                <a:cs typeface="Times New Roman" panose="02020603050405020304" pitchFamily="18" charset="0"/>
+              </a:rPr>
+              <a:t> MQTT:</a:t>
+            </a:r>
+          </a:p>
+          <a:p>
+            <a:pPr marL="0" indent="0">
+              <a:buNone/>
+            </a:pPr>
+            <a:endParaRPr lang="vi-VN" dirty="0">
               <a:latin typeface="Times New Roman" panose="02020603050405020304" pitchFamily="18" charset="0"/>
               <a:cs typeface="Times New Roman" panose="02020603050405020304" pitchFamily="18" charset="0"/>
             </a:endParaRPr>
@@ -5705,7 +6252,7 @@
     </p:spTree>
     <p:extLst>
       <p:ext uri="{BB962C8B-B14F-4D97-AF65-F5344CB8AC3E}">
-        <p14:creationId xmlns:p14="http://schemas.microsoft.com/office/powerpoint/2010/main" val="2597279358"/>
+        <p14:creationId xmlns:p14="http://schemas.microsoft.com/office/powerpoint/2010/main" val="700323723"/>
       </p:ext>
     </p:extLst>
   </p:cSld>
@@ -6306,10 +6853,758 @@
       </p:grpSpPr>
       <p:sp>
         <p:nvSpPr>
-          <p:cNvPr id="2" name="Title 1">
+          <p:cNvPr id="5" name="Content Placeholder 4">
             <a:extLst>
               <a:ext uri="{FF2B5EF4-FFF2-40B4-BE49-F238E27FC236}">
-                <a16:creationId xmlns:a16="http://schemas.microsoft.com/office/drawing/2014/main" id="{8B65ABA9-3A9F-4099-8578-57D4D650E31B}"/>
+                <a16:creationId xmlns:a16="http://schemas.microsoft.com/office/drawing/2014/main" id="{82AD3B8F-023F-4D30-80AA-BE5F44F41593}"/>
+              </a:ext>
+            </a:extLst>
+          </p:cNvPr>
+          <p:cNvSpPr>
+            <a:spLocks noGrp="1"/>
+          </p:cNvSpPr>
+          <p:nvPr>
+            <p:ph sz="quarter" idx="10"/>
+          </p:nvPr>
+        </p:nvSpPr>
+        <p:spPr/>
+        <p:txBody>
+          <a:bodyPr/>
+          <a:lstStyle/>
+          <a:p>
+            <a:pPr marL="0" indent="0">
+              <a:buNone/>
+            </a:pPr>
+            <a:r>
+              <a:rPr lang="en-US" dirty="0">
+                <a:latin typeface="Times New Roman" panose="02020603050405020304" pitchFamily="18" charset="0"/>
+                <a:cs typeface="Times New Roman" panose="02020603050405020304" pitchFamily="18" charset="0"/>
+              </a:rPr>
+              <a:t>2.4. </a:t>
+            </a:r>
+            <a:r>
+              <a:rPr lang="en-US" dirty="0" err="1">
+                <a:latin typeface="Times New Roman" panose="02020603050405020304" pitchFamily="18" charset="0"/>
+                <a:cs typeface="Times New Roman" panose="02020603050405020304" pitchFamily="18" charset="0"/>
+              </a:rPr>
+              <a:t>Thiết</a:t>
+            </a:r>
+            <a:r>
+              <a:rPr lang="en-US" dirty="0">
+                <a:latin typeface="Times New Roman" panose="02020603050405020304" pitchFamily="18" charset="0"/>
+                <a:cs typeface="Times New Roman" panose="02020603050405020304" pitchFamily="18" charset="0"/>
+              </a:rPr>
+              <a:t> </a:t>
+            </a:r>
+            <a:r>
+              <a:rPr lang="en-US" dirty="0" err="1">
+                <a:latin typeface="Times New Roman" panose="02020603050405020304" pitchFamily="18" charset="0"/>
+                <a:cs typeface="Times New Roman" panose="02020603050405020304" pitchFamily="18" charset="0"/>
+              </a:rPr>
+              <a:t>kế</a:t>
+            </a:r>
+            <a:r>
+              <a:rPr lang="en-US" dirty="0">
+                <a:latin typeface="Times New Roman" panose="02020603050405020304" pitchFamily="18" charset="0"/>
+                <a:cs typeface="Times New Roman" panose="02020603050405020304" pitchFamily="18" charset="0"/>
+              </a:rPr>
+              <a:t> </a:t>
+            </a:r>
+            <a:r>
+              <a:rPr lang="en-US" dirty="0" err="1">
+                <a:latin typeface="Times New Roman" panose="02020603050405020304" pitchFamily="18" charset="0"/>
+                <a:cs typeface="Times New Roman" panose="02020603050405020304" pitchFamily="18" charset="0"/>
+              </a:rPr>
+              <a:t>chương</a:t>
+            </a:r>
+            <a:r>
+              <a:rPr lang="en-US" dirty="0">
+                <a:latin typeface="Times New Roman" panose="02020603050405020304" pitchFamily="18" charset="0"/>
+                <a:cs typeface="Times New Roman" panose="02020603050405020304" pitchFamily="18" charset="0"/>
+              </a:rPr>
+              <a:t> </a:t>
+            </a:r>
+            <a:r>
+              <a:rPr lang="en-US" dirty="0" err="1">
+                <a:latin typeface="Times New Roman" panose="02020603050405020304" pitchFamily="18" charset="0"/>
+                <a:cs typeface="Times New Roman" panose="02020603050405020304" pitchFamily="18" charset="0"/>
+              </a:rPr>
+              <a:t>trình</a:t>
+            </a:r>
+            <a:r>
+              <a:rPr lang="en-US" dirty="0">
+                <a:latin typeface="Times New Roman" panose="02020603050405020304" pitchFamily="18" charset="0"/>
+                <a:cs typeface="Times New Roman" panose="02020603050405020304" pitchFamily="18" charset="0"/>
+              </a:rPr>
+              <a:t> </a:t>
+            </a:r>
+            <a:r>
+              <a:rPr lang="en-US" dirty="0" err="1">
+                <a:latin typeface="Times New Roman" panose="02020603050405020304" pitchFamily="18" charset="0"/>
+                <a:cs typeface="Times New Roman" panose="02020603050405020304" pitchFamily="18" charset="0"/>
+              </a:rPr>
+              <a:t>ứng</a:t>
+            </a:r>
+            <a:r>
+              <a:rPr lang="en-US" dirty="0">
+                <a:latin typeface="Times New Roman" panose="02020603050405020304" pitchFamily="18" charset="0"/>
+                <a:cs typeface="Times New Roman" panose="02020603050405020304" pitchFamily="18" charset="0"/>
+              </a:rPr>
+              <a:t> </a:t>
+            </a:r>
+            <a:r>
+              <a:rPr lang="en-US" dirty="0" err="1">
+                <a:latin typeface="Times New Roman" panose="02020603050405020304" pitchFamily="18" charset="0"/>
+                <a:cs typeface="Times New Roman" panose="02020603050405020304" pitchFamily="18" charset="0"/>
+              </a:rPr>
+              <a:t>dụng</a:t>
+            </a:r>
+            <a:r>
+              <a:rPr lang="en-US" dirty="0">
+                <a:latin typeface="Times New Roman" panose="02020603050405020304" pitchFamily="18" charset="0"/>
+                <a:cs typeface="Times New Roman" panose="02020603050405020304" pitchFamily="18" charset="0"/>
+              </a:rPr>
+              <a:t> </a:t>
+            </a:r>
+            <a:r>
+              <a:rPr lang="en-US" dirty="0" err="1">
+                <a:latin typeface="Times New Roman" panose="02020603050405020304" pitchFamily="18" charset="0"/>
+                <a:cs typeface="Times New Roman" panose="02020603050405020304" pitchFamily="18" charset="0"/>
+              </a:rPr>
+              <a:t>điều</a:t>
+            </a:r>
+            <a:r>
+              <a:rPr lang="en-US" dirty="0">
+                <a:latin typeface="Times New Roman" panose="02020603050405020304" pitchFamily="18" charset="0"/>
+                <a:cs typeface="Times New Roman" panose="02020603050405020304" pitchFamily="18" charset="0"/>
+              </a:rPr>
+              <a:t> </a:t>
+            </a:r>
+            <a:r>
+              <a:rPr lang="en-US" dirty="0" err="1">
+                <a:latin typeface="Times New Roman" panose="02020603050405020304" pitchFamily="18" charset="0"/>
+                <a:cs typeface="Times New Roman" panose="02020603050405020304" pitchFamily="18" charset="0"/>
+              </a:rPr>
+              <a:t>khiển</a:t>
+            </a:r>
+            <a:endParaRPr lang="en-US" dirty="0">
+              <a:latin typeface="Times New Roman" panose="02020603050405020304" pitchFamily="18" charset="0"/>
+              <a:cs typeface="Times New Roman" panose="02020603050405020304" pitchFamily="18" charset="0"/>
+            </a:endParaRPr>
+          </a:p>
+          <a:p>
+            <a:r>
+              <a:rPr lang="en-US" dirty="0" err="1">
+                <a:latin typeface="Times New Roman" panose="02020603050405020304" pitchFamily="18" charset="0"/>
+                <a:cs typeface="Times New Roman" panose="02020603050405020304" pitchFamily="18" charset="0"/>
+              </a:rPr>
+              <a:t>Yêu</a:t>
+            </a:r>
+            <a:r>
+              <a:rPr lang="en-US" dirty="0">
+                <a:latin typeface="Times New Roman" panose="02020603050405020304" pitchFamily="18" charset="0"/>
+                <a:cs typeface="Times New Roman" panose="02020603050405020304" pitchFamily="18" charset="0"/>
+              </a:rPr>
+              <a:t> </a:t>
+            </a:r>
+            <a:r>
+              <a:rPr lang="en-US" dirty="0" err="1">
+                <a:latin typeface="Times New Roman" panose="02020603050405020304" pitchFamily="18" charset="0"/>
+                <a:cs typeface="Times New Roman" panose="02020603050405020304" pitchFamily="18" charset="0"/>
+              </a:rPr>
+              <a:t>cầu</a:t>
+            </a:r>
+            <a:r>
+              <a:rPr lang="en-US" dirty="0">
+                <a:latin typeface="Times New Roman" panose="02020603050405020304" pitchFamily="18" charset="0"/>
+                <a:cs typeface="Times New Roman" panose="02020603050405020304" pitchFamily="18" charset="0"/>
+              </a:rPr>
+              <a:t>:</a:t>
+            </a:r>
+          </a:p>
+          <a:p>
+            <a:pPr lvl="1">
+              <a:buFont typeface="Courier New" panose="02070309020205020404" pitchFamily="49" charset="0"/>
+              <a:buChar char="o"/>
+            </a:pPr>
+            <a:r>
+              <a:rPr lang="en-US" dirty="0">
+                <a:latin typeface="Times New Roman" panose="02020603050405020304" pitchFamily="18" charset="0"/>
+                <a:cs typeface="Times New Roman" panose="02020603050405020304" pitchFamily="18" charset="0"/>
+              </a:rPr>
+              <a:t> </a:t>
+            </a:r>
+            <a:r>
+              <a:rPr lang="en-US" dirty="0" err="1">
+                <a:latin typeface="Times New Roman" panose="02020603050405020304" pitchFamily="18" charset="0"/>
+                <a:cs typeface="Times New Roman" panose="02020603050405020304" pitchFamily="18" charset="0"/>
+              </a:rPr>
+              <a:t>Nhận</a:t>
+            </a:r>
+            <a:r>
+              <a:rPr lang="en-US" dirty="0">
+                <a:latin typeface="Times New Roman" panose="02020603050405020304" pitchFamily="18" charset="0"/>
+                <a:cs typeface="Times New Roman" panose="02020603050405020304" pitchFamily="18" charset="0"/>
+              </a:rPr>
+              <a:t> </a:t>
+            </a:r>
+            <a:r>
+              <a:rPr lang="en-US" dirty="0" err="1">
+                <a:latin typeface="Times New Roman" panose="02020603050405020304" pitchFamily="18" charset="0"/>
+                <a:cs typeface="Times New Roman" panose="02020603050405020304" pitchFamily="18" charset="0"/>
+              </a:rPr>
+              <a:t>và</a:t>
+            </a:r>
+            <a:r>
+              <a:rPr lang="en-US" dirty="0">
+                <a:latin typeface="Times New Roman" panose="02020603050405020304" pitchFamily="18" charset="0"/>
+                <a:cs typeface="Times New Roman" panose="02020603050405020304" pitchFamily="18" charset="0"/>
+              </a:rPr>
+              <a:t> </a:t>
+            </a:r>
+            <a:r>
+              <a:rPr lang="en-US" dirty="0" err="1">
+                <a:latin typeface="Times New Roman" panose="02020603050405020304" pitchFamily="18" charset="0"/>
+                <a:cs typeface="Times New Roman" panose="02020603050405020304" pitchFamily="18" charset="0"/>
+              </a:rPr>
+              <a:t>hiển</a:t>
+            </a:r>
+            <a:r>
+              <a:rPr lang="en-US" dirty="0">
+                <a:latin typeface="Times New Roman" panose="02020603050405020304" pitchFamily="18" charset="0"/>
+                <a:cs typeface="Times New Roman" panose="02020603050405020304" pitchFamily="18" charset="0"/>
+              </a:rPr>
+              <a:t> </a:t>
+            </a:r>
+            <a:r>
+              <a:rPr lang="en-US" dirty="0" err="1">
+                <a:latin typeface="Times New Roman" panose="02020603050405020304" pitchFamily="18" charset="0"/>
+                <a:cs typeface="Times New Roman" panose="02020603050405020304" pitchFamily="18" charset="0"/>
+              </a:rPr>
+              <a:t>thị</a:t>
+            </a:r>
+            <a:r>
+              <a:rPr lang="en-US" dirty="0">
+                <a:latin typeface="Times New Roman" panose="02020603050405020304" pitchFamily="18" charset="0"/>
+                <a:cs typeface="Times New Roman" panose="02020603050405020304" pitchFamily="18" charset="0"/>
+              </a:rPr>
+              <a:t> </a:t>
+            </a:r>
+            <a:r>
+              <a:rPr lang="en-US" dirty="0" err="1">
+                <a:latin typeface="Times New Roman" panose="02020603050405020304" pitchFamily="18" charset="0"/>
+                <a:cs typeface="Times New Roman" panose="02020603050405020304" pitchFamily="18" charset="0"/>
+              </a:rPr>
+              <a:t>trạng</a:t>
+            </a:r>
+            <a:r>
+              <a:rPr lang="en-US" dirty="0">
+                <a:latin typeface="Times New Roman" panose="02020603050405020304" pitchFamily="18" charset="0"/>
+                <a:cs typeface="Times New Roman" panose="02020603050405020304" pitchFamily="18" charset="0"/>
+              </a:rPr>
+              <a:t> </a:t>
+            </a:r>
+            <a:r>
+              <a:rPr lang="en-US" dirty="0" err="1">
+                <a:latin typeface="Times New Roman" panose="02020603050405020304" pitchFamily="18" charset="0"/>
+                <a:cs typeface="Times New Roman" panose="02020603050405020304" pitchFamily="18" charset="0"/>
+              </a:rPr>
+              <a:t>thái</a:t>
+            </a:r>
+            <a:r>
+              <a:rPr lang="en-US" dirty="0">
+                <a:latin typeface="Times New Roman" panose="02020603050405020304" pitchFamily="18" charset="0"/>
+                <a:cs typeface="Times New Roman" panose="02020603050405020304" pitchFamily="18" charset="0"/>
+              </a:rPr>
+              <a:t> </a:t>
+            </a:r>
+            <a:r>
+              <a:rPr lang="en-US" dirty="0" err="1">
+                <a:latin typeface="Times New Roman" panose="02020603050405020304" pitchFamily="18" charset="0"/>
+                <a:cs typeface="Times New Roman" panose="02020603050405020304" pitchFamily="18" charset="0"/>
+              </a:rPr>
+              <a:t>đóng</a:t>
+            </a:r>
+            <a:r>
+              <a:rPr lang="en-US" dirty="0">
+                <a:latin typeface="Times New Roman" panose="02020603050405020304" pitchFamily="18" charset="0"/>
+                <a:cs typeface="Times New Roman" panose="02020603050405020304" pitchFamily="18" charset="0"/>
+              </a:rPr>
+              <a:t> </a:t>
+            </a:r>
+            <a:r>
+              <a:rPr lang="en-US" dirty="0" err="1">
+                <a:latin typeface="Times New Roman" panose="02020603050405020304" pitchFamily="18" charset="0"/>
+                <a:cs typeface="Times New Roman" panose="02020603050405020304" pitchFamily="18" charset="0"/>
+              </a:rPr>
+              <a:t>cắt</a:t>
+            </a:r>
+            <a:r>
+              <a:rPr lang="en-US" dirty="0">
+                <a:latin typeface="Times New Roman" panose="02020603050405020304" pitchFamily="18" charset="0"/>
+                <a:cs typeface="Times New Roman" panose="02020603050405020304" pitchFamily="18" charset="0"/>
+              </a:rPr>
+              <a:t> </a:t>
+            </a:r>
+            <a:r>
+              <a:rPr lang="en-US" dirty="0" err="1">
+                <a:latin typeface="Times New Roman" panose="02020603050405020304" pitchFamily="18" charset="0"/>
+                <a:cs typeface="Times New Roman" panose="02020603050405020304" pitchFamily="18" charset="0"/>
+              </a:rPr>
+              <a:t>của</a:t>
+            </a:r>
+            <a:r>
+              <a:rPr lang="en-US" dirty="0">
+                <a:latin typeface="Times New Roman" panose="02020603050405020304" pitchFamily="18" charset="0"/>
+                <a:cs typeface="Times New Roman" panose="02020603050405020304" pitchFamily="18" charset="0"/>
+              </a:rPr>
+              <a:t> </a:t>
+            </a:r>
+            <a:r>
+              <a:rPr lang="en-US" dirty="0" err="1">
+                <a:latin typeface="Times New Roman" panose="02020603050405020304" pitchFamily="18" charset="0"/>
+                <a:cs typeface="Times New Roman" panose="02020603050405020304" pitchFamily="18" charset="0"/>
+              </a:rPr>
+              <a:t>các</a:t>
+            </a:r>
+            <a:r>
+              <a:rPr lang="en-US" dirty="0">
+                <a:latin typeface="Times New Roman" panose="02020603050405020304" pitchFamily="18" charset="0"/>
+                <a:cs typeface="Times New Roman" panose="02020603050405020304" pitchFamily="18" charset="0"/>
+              </a:rPr>
+              <a:t> </a:t>
+            </a:r>
+            <a:r>
+              <a:rPr lang="en-US" dirty="0" err="1">
+                <a:latin typeface="Times New Roman" panose="02020603050405020304" pitchFamily="18" charset="0"/>
+                <a:cs typeface="Times New Roman" panose="02020603050405020304" pitchFamily="18" charset="0"/>
+              </a:rPr>
+              <a:t>triac</a:t>
+            </a:r>
+            <a:endParaRPr lang="en-US" dirty="0">
+              <a:latin typeface="Times New Roman" panose="02020603050405020304" pitchFamily="18" charset="0"/>
+              <a:cs typeface="Times New Roman" panose="02020603050405020304" pitchFamily="18" charset="0"/>
+            </a:endParaRPr>
+          </a:p>
+          <a:p>
+            <a:pPr lvl="1">
+              <a:buFont typeface="Courier New" panose="02070309020205020404" pitchFamily="49" charset="0"/>
+              <a:buChar char="o"/>
+            </a:pPr>
+            <a:r>
+              <a:rPr lang="en-US" dirty="0">
+                <a:latin typeface="Times New Roman" panose="02020603050405020304" pitchFamily="18" charset="0"/>
+                <a:cs typeface="Times New Roman" panose="02020603050405020304" pitchFamily="18" charset="0"/>
+              </a:rPr>
+              <a:t> </a:t>
+            </a:r>
+            <a:r>
+              <a:rPr lang="en-US" dirty="0" err="1">
+                <a:latin typeface="Times New Roman" panose="02020603050405020304" pitchFamily="18" charset="0"/>
+                <a:cs typeface="Times New Roman" panose="02020603050405020304" pitchFamily="18" charset="0"/>
+              </a:rPr>
+              <a:t>Nhận</a:t>
+            </a:r>
+            <a:r>
+              <a:rPr lang="en-US" dirty="0">
+                <a:latin typeface="Times New Roman" panose="02020603050405020304" pitchFamily="18" charset="0"/>
+                <a:cs typeface="Times New Roman" panose="02020603050405020304" pitchFamily="18" charset="0"/>
+              </a:rPr>
+              <a:t> </a:t>
+            </a:r>
+            <a:r>
+              <a:rPr lang="en-US" dirty="0" err="1">
+                <a:latin typeface="Times New Roman" panose="02020603050405020304" pitchFamily="18" charset="0"/>
+                <a:cs typeface="Times New Roman" panose="02020603050405020304" pitchFamily="18" charset="0"/>
+              </a:rPr>
+              <a:t>lệnh</a:t>
+            </a:r>
+            <a:r>
+              <a:rPr lang="en-US" dirty="0">
+                <a:latin typeface="Times New Roman" panose="02020603050405020304" pitchFamily="18" charset="0"/>
+                <a:cs typeface="Times New Roman" panose="02020603050405020304" pitchFamily="18" charset="0"/>
+              </a:rPr>
+              <a:t> </a:t>
+            </a:r>
+            <a:r>
+              <a:rPr lang="en-US" dirty="0" err="1">
+                <a:latin typeface="Times New Roman" panose="02020603050405020304" pitchFamily="18" charset="0"/>
+                <a:cs typeface="Times New Roman" panose="02020603050405020304" pitchFamily="18" charset="0"/>
+              </a:rPr>
+              <a:t>điều</a:t>
+            </a:r>
+            <a:r>
+              <a:rPr lang="en-US" dirty="0">
+                <a:latin typeface="Times New Roman" panose="02020603050405020304" pitchFamily="18" charset="0"/>
+                <a:cs typeface="Times New Roman" panose="02020603050405020304" pitchFamily="18" charset="0"/>
+              </a:rPr>
+              <a:t> </a:t>
+            </a:r>
+            <a:r>
+              <a:rPr lang="en-US" dirty="0" err="1">
+                <a:latin typeface="Times New Roman" panose="02020603050405020304" pitchFamily="18" charset="0"/>
+                <a:cs typeface="Times New Roman" panose="02020603050405020304" pitchFamily="18" charset="0"/>
+              </a:rPr>
+              <a:t>khiển</a:t>
+            </a:r>
+            <a:r>
+              <a:rPr lang="en-US" dirty="0">
+                <a:latin typeface="Times New Roman" panose="02020603050405020304" pitchFamily="18" charset="0"/>
+                <a:cs typeface="Times New Roman" panose="02020603050405020304" pitchFamily="18" charset="0"/>
+              </a:rPr>
+              <a:t> </a:t>
+            </a:r>
+            <a:r>
+              <a:rPr lang="en-US" dirty="0" err="1">
+                <a:latin typeface="Times New Roman" panose="02020603050405020304" pitchFamily="18" charset="0"/>
+                <a:cs typeface="Times New Roman" panose="02020603050405020304" pitchFamily="18" charset="0"/>
+              </a:rPr>
+              <a:t>từ</a:t>
+            </a:r>
+            <a:r>
+              <a:rPr lang="en-US" dirty="0">
+                <a:latin typeface="Times New Roman" panose="02020603050405020304" pitchFamily="18" charset="0"/>
+                <a:cs typeface="Times New Roman" panose="02020603050405020304" pitchFamily="18" charset="0"/>
+              </a:rPr>
+              <a:t> </a:t>
+            </a:r>
+            <a:r>
+              <a:rPr lang="en-US" dirty="0" err="1">
+                <a:latin typeface="Times New Roman" panose="02020603050405020304" pitchFamily="18" charset="0"/>
+                <a:cs typeface="Times New Roman" panose="02020603050405020304" pitchFamily="18" charset="0"/>
+              </a:rPr>
+              <a:t>người</a:t>
+            </a:r>
+            <a:r>
+              <a:rPr lang="en-US" dirty="0">
+                <a:latin typeface="Times New Roman" panose="02020603050405020304" pitchFamily="18" charset="0"/>
+                <a:cs typeface="Times New Roman" panose="02020603050405020304" pitchFamily="18" charset="0"/>
+              </a:rPr>
+              <a:t> </a:t>
+            </a:r>
+            <a:r>
+              <a:rPr lang="en-US" dirty="0" err="1">
+                <a:latin typeface="Times New Roman" panose="02020603050405020304" pitchFamily="18" charset="0"/>
+                <a:cs typeface="Times New Roman" panose="02020603050405020304" pitchFamily="18" charset="0"/>
+              </a:rPr>
+              <a:t>dùng</a:t>
+            </a:r>
+            <a:r>
+              <a:rPr lang="en-US" dirty="0">
+                <a:latin typeface="Times New Roman" panose="02020603050405020304" pitchFamily="18" charset="0"/>
+                <a:cs typeface="Times New Roman" panose="02020603050405020304" pitchFamily="18" charset="0"/>
+              </a:rPr>
+              <a:t> </a:t>
+            </a:r>
+            <a:r>
+              <a:rPr lang="en-US" dirty="0" err="1">
+                <a:latin typeface="Times New Roman" panose="02020603050405020304" pitchFamily="18" charset="0"/>
+                <a:cs typeface="Times New Roman" panose="02020603050405020304" pitchFamily="18" charset="0"/>
+              </a:rPr>
+              <a:t>và</a:t>
+            </a:r>
+            <a:r>
+              <a:rPr lang="en-US" dirty="0">
+                <a:latin typeface="Times New Roman" panose="02020603050405020304" pitchFamily="18" charset="0"/>
+                <a:cs typeface="Times New Roman" panose="02020603050405020304" pitchFamily="18" charset="0"/>
+              </a:rPr>
+              <a:t> </a:t>
+            </a:r>
+            <a:r>
+              <a:rPr lang="en-US" dirty="0" err="1">
+                <a:latin typeface="Times New Roman" panose="02020603050405020304" pitchFamily="18" charset="0"/>
+                <a:cs typeface="Times New Roman" panose="02020603050405020304" pitchFamily="18" charset="0"/>
+              </a:rPr>
+              <a:t>gửi</a:t>
+            </a:r>
+            <a:r>
+              <a:rPr lang="en-US" dirty="0">
+                <a:latin typeface="Times New Roman" panose="02020603050405020304" pitchFamily="18" charset="0"/>
+                <a:cs typeface="Times New Roman" panose="02020603050405020304" pitchFamily="18" charset="0"/>
+              </a:rPr>
+              <a:t> </a:t>
+            </a:r>
+            <a:r>
+              <a:rPr lang="en-US" dirty="0" err="1">
+                <a:latin typeface="Times New Roman" panose="02020603050405020304" pitchFamily="18" charset="0"/>
+                <a:cs typeface="Times New Roman" panose="02020603050405020304" pitchFamily="18" charset="0"/>
+              </a:rPr>
+              <a:t>lệnh</a:t>
+            </a:r>
+            <a:r>
+              <a:rPr lang="en-US" dirty="0">
+                <a:latin typeface="Times New Roman" panose="02020603050405020304" pitchFamily="18" charset="0"/>
+                <a:cs typeface="Times New Roman" panose="02020603050405020304" pitchFamily="18" charset="0"/>
+              </a:rPr>
+              <a:t> </a:t>
+            </a:r>
+            <a:r>
+              <a:rPr lang="en-US" dirty="0" err="1">
+                <a:latin typeface="Times New Roman" panose="02020603050405020304" pitchFamily="18" charset="0"/>
+                <a:cs typeface="Times New Roman" panose="02020603050405020304" pitchFamily="18" charset="0"/>
+              </a:rPr>
+              <a:t>điều</a:t>
+            </a:r>
+            <a:r>
+              <a:rPr lang="en-US" dirty="0">
+                <a:latin typeface="Times New Roman" panose="02020603050405020304" pitchFamily="18" charset="0"/>
+                <a:cs typeface="Times New Roman" panose="02020603050405020304" pitchFamily="18" charset="0"/>
+              </a:rPr>
+              <a:t> </a:t>
+            </a:r>
+            <a:r>
+              <a:rPr lang="en-US" dirty="0" err="1">
+                <a:latin typeface="Times New Roman" panose="02020603050405020304" pitchFamily="18" charset="0"/>
+                <a:cs typeface="Times New Roman" panose="02020603050405020304" pitchFamily="18" charset="0"/>
+              </a:rPr>
+              <a:t>khiển</a:t>
+            </a:r>
+            <a:r>
+              <a:rPr lang="en-US" dirty="0">
+                <a:latin typeface="Times New Roman" panose="02020603050405020304" pitchFamily="18" charset="0"/>
+                <a:cs typeface="Times New Roman" panose="02020603050405020304" pitchFamily="18" charset="0"/>
+              </a:rPr>
+              <a:t> </a:t>
+            </a:r>
+            <a:r>
+              <a:rPr lang="en-US" dirty="0" err="1">
+                <a:latin typeface="Times New Roman" panose="02020603050405020304" pitchFamily="18" charset="0"/>
+                <a:cs typeface="Times New Roman" panose="02020603050405020304" pitchFamily="18" charset="0"/>
+              </a:rPr>
+              <a:t>đến</a:t>
+            </a:r>
+            <a:r>
+              <a:rPr lang="en-US" dirty="0">
+                <a:latin typeface="Times New Roman" panose="02020603050405020304" pitchFamily="18" charset="0"/>
+                <a:cs typeface="Times New Roman" panose="02020603050405020304" pitchFamily="18" charset="0"/>
+              </a:rPr>
+              <a:t> </a:t>
+            </a:r>
+            <a:r>
+              <a:rPr lang="en-US" dirty="0" err="1">
+                <a:latin typeface="Times New Roman" panose="02020603050405020304" pitchFamily="18" charset="0"/>
+                <a:cs typeface="Times New Roman" panose="02020603050405020304" pitchFamily="18" charset="0"/>
+              </a:rPr>
+              <a:t>thiết</a:t>
+            </a:r>
+            <a:r>
+              <a:rPr lang="en-US" dirty="0">
+                <a:latin typeface="Times New Roman" panose="02020603050405020304" pitchFamily="18" charset="0"/>
+                <a:cs typeface="Times New Roman" panose="02020603050405020304" pitchFamily="18" charset="0"/>
+              </a:rPr>
+              <a:t> </a:t>
+            </a:r>
+            <a:r>
+              <a:rPr lang="en-US" dirty="0" err="1">
+                <a:latin typeface="Times New Roman" panose="02020603050405020304" pitchFamily="18" charset="0"/>
+                <a:cs typeface="Times New Roman" panose="02020603050405020304" pitchFamily="18" charset="0"/>
+              </a:rPr>
+              <a:t>bị</a:t>
+            </a:r>
+            <a:r>
+              <a:rPr lang="en-US" dirty="0">
+                <a:latin typeface="Times New Roman" panose="02020603050405020304" pitchFamily="18" charset="0"/>
+                <a:cs typeface="Times New Roman" panose="02020603050405020304" pitchFamily="18" charset="0"/>
+              </a:rPr>
+              <a:t> </a:t>
+            </a:r>
+            <a:r>
+              <a:rPr lang="en-US" dirty="0" err="1">
+                <a:latin typeface="Times New Roman" panose="02020603050405020304" pitchFamily="18" charset="0"/>
+                <a:cs typeface="Times New Roman" panose="02020603050405020304" pitchFamily="18" charset="0"/>
+              </a:rPr>
+              <a:t>đóng</a:t>
+            </a:r>
+            <a:r>
+              <a:rPr lang="en-US" dirty="0">
+                <a:latin typeface="Times New Roman" panose="02020603050405020304" pitchFamily="18" charset="0"/>
+                <a:cs typeface="Times New Roman" panose="02020603050405020304" pitchFamily="18" charset="0"/>
+              </a:rPr>
+              <a:t> </a:t>
+            </a:r>
+            <a:r>
+              <a:rPr lang="en-US" dirty="0" err="1">
+                <a:latin typeface="Times New Roman" panose="02020603050405020304" pitchFamily="18" charset="0"/>
+                <a:cs typeface="Times New Roman" panose="02020603050405020304" pitchFamily="18" charset="0"/>
+              </a:rPr>
+              <a:t>cắt</a:t>
+            </a:r>
+            <a:r>
+              <a:rPr lang="en-US" dirty="0">
+                <a:latin typeface="Times New Roman" panose="02020603050405020304" pitchFamily="18" charset="0"/>
+                <a:cs typeface="Times New Roman" panose="02020603050405020304" pitchFamily="18" charset="0"/>
+              </a:rPr>
+              <a:t> </a:t>
+            </a:r>
+            <a:r>
+              <a:rPr lang="en-US" dirty="0" err="1">
+                <a:latin typeface="Times New Roman" panose="02020603050405020304" pitchFamily="18" charset="0"/>
+                <a:cs typeface="Times New Roman" panose="02020603050405020304" pitchFamily="18" charset="0"/>
+              </a:rPr>
+              <a:t>theo</a:t>
+            </a:r>
+            <a:r>
+              <a:rPr lang="en-US" dirty="0">
+                <a:latin typeface="Times New Roman" panose="02020603050405020304" pitchFamily="18" charset="0"/>
+                <a:cs typeface="Times New Roman" panose="02020603050405020304" pitchFamily="18" charset="0"/>
+              </a:rPr>
+              <a:t> </a:t>
+            </a:r>
+            <a:r>
+              <a:rPr lang="en-US" dirty="0" err="1">
+                <a:latin typeface="Times New Roman" panose="02020603050405020304" pitchFamily="18" charset="0"/>
+                <a:cs typeface="Times New Roman" panose="02020603050405020304" pitchFamily="18" charset="0"/>
+              </a:rPr>
+              <a:t>cấu</a:t>
+            </a:r>
+            <a:r>
+              <a:rPr lang="en-US" dirty="0">
+                <a:latin typeface="Times New Roman" panose="02020603050405020304" pitchFamily="18" charset="0"/>
+                <a:cs typeface="Times New Roman" panose="02020603050405020304" pitchFamily="18" charset="0"/>
+              </a:rPr>
+              <a:t> </a:t>
+            </a:r>
+            <a:r>
+              <a:rPr lang="en-US" dirty="0" err="1">
+                <a:latin typeface="Times New Roman" panose="02020603050405020304" pitchFamily="18" charset="0"/>
+                <a:cs typeface="Times New Roman" panose="02020603050405020304" pitchFamily="18" charset="0"/>
+              </a:rPr>
+              <a:t>trúc</a:t>
+            </a:r>
+            <a:r>
+              <a:rPr lang="en-US" dirty="0">
+                <a:latin typeface="Times New Roman" panose="02020603050405020304" pitchFamily="18" charset="0"/>
+                <a:cs typeface="Times New Roman" panose="02020603050405020304" pitchFamily="18" charset="0"/>
+              </a:rPr>
+              <a:t> </a:t>
+            </a:r>
+            <a:r>
+              <a:rPr lang="en-US" dirty="0" err="1">
+                <a:latin typeface="Times New Roman" panose="02020603050405020304" pitchFamily="18" charset="0"/>
+                <a:cs typeface="Times New Roman" panose="02020603050405020304" pitchFamily="18" charset="0"/>
+              </a:rPr>
+              <a:t>bản</a:t>
+            </a:r>
+            <a:r>
+              <a:rPr lang="en-US" dirty="0">
+                <a:latin typeface="Times New Roman" panose="02020603050405020304" pitchFamily="18" charset="0"/>
+                <a:cs typeface="Times New Roman" panose="02020603050405020304" pitchFamily="18" charset="0"/>
+              </a:rPr>
+              <a:t> tin</a:t>
+            </a:r>
+          </a:p>
+          <a:p>
+            <a:pPr lvl="1">
+              <a:buFont typeface="Courier New" panose="02070309020205020404" pitchFamily="49" charset="0"/>
+              <a:buChar char="o"/>
+            </a:pPr>
+            <a:r>
+              <a:rPr lang="en-US" dirty="0">
+                <a:latin typeface="Times New Roman" panose="02020603050405020304" pitchFamily="18" charset="0"/>
+                <a:cs typeface="Times New Roman" panose="02020603050405020304" pitchFamily="18" charset="0"/>
+              </a:rPr>
+              <a:t> </a:t>
+            </a:r>
+            <a:r>
+              <a:rPr lang="en-US" dirty="0" err="1">
+                <a:latin typeface="Times New Roman" panose="02020603050405020304" pitchFamily="18" charset="0"/>
+                <a:cs typeface="Times New Roman" panose="02020603050405020304" pitchFamily="18" charset="0"/>
+              </a:rPr>
+              <a:t>Cấu</a:t>
+            </a:r>
+            <a:r>
+              <a:rPr lang="en-US" dirty="0">
+                <a:latin typeface="Times New Roman" panose="02020603050405020304" pitchFamily="18" charset="0"/>
+                <a:cs typeface="Times New Roman" panose="02020603050405020304" pitchFamily="18" charset="0"/>
+              </a:rPr>
+              <a:t> </a:t>
+            </a:r>
+            <a:r>
+              <a:rPr lang="en-US" dirty="0" err="1">
+                <a:latin typeface="Times New Roman" panose="02020603050405020304" pitchFamily="18" charset="0"/>
+                <a:cs typeface="Times New Roman" panose="02020603050405020304" pitchFamily="18" charset="0"/>
+              </a:rPr>
+              <a:t>hình</a:t>
+            </a:r>
+            <a:r>
+              <a:rPr lang="en-US" dirty="0">
+                <a:latin typeface="Times New Roman" panose="02020603050405020304" pitchFamily="18" charset="0"/>
+                <a:cs typeface="Times New Roman" panose="02020603050405020304" pitchFamily="18" charset="0"/>
+              </a:rPr>
+              <a:t> </a:t>
+            </a:r>
+            <a:r>
+              <a:rPr lang="en-US" dirty="0" err="1">
+                <a:latin typeface="Times New Roman" panose="02020603050405020304" pitchFamily="18" charset="0"/>
+                <a:cs typeface="Times New Roman" panose="02020603050405020304" pitchFamily="18" charset="0"/>
+              </a:rPr>
+              <a:t>WiFi</a:t>
+            </a:r>
+            <a:r>
+              <a:rPr lang="en-US" dirty="0">
+                <a:latin typeface="Times New Roman" panose="02020603050405020304" pitchFamily="18" charset="0"/>
+                <a:cs typeface="Times New Roman" panose="02020603050405020304" pitchFamily="18" charset="0"/>
+              </a:rPr>
+              <a:t> </a:t>
+            </a:r>
+            <a:r>
+              <a:rPr lang="en-US" dirty="0" err="1">
+                <a:latin typeface="Times New Roman" panose="02020603050405020304" pitchFamily="18" charset="0"/>
+                <a:cs typeface="Times New Roman" panose="02020603050405020304" pitchFamily="18" charset="0"/>
+              </a:rPr>
+              <a:t>cho</a:t>
+            </a:r>
+            <a:r>
+              <a:rPr lang="en-US" dirty="0">
+                <a:latin typeface="Times New Roman" panose="02020603050405020304" pitchFamily="18" charset="0"/>
+                <a:cs typeface="Times New Roman" panose="02020603050405020304" pitchFamily="18" charset="0"/>
+              </a:rPr>
+              <a:t> </a:t>
+            </a:r>
+            <a:r>
+              <a:rPr lang="en-US" dirty="0" err="1">
+                <a:latin typeface="Times New Roman" panose="02020603050405020304" pitchFamily="18" charset="0"/>
+                <a:cs typeface="Times New Roman" panose="02020603050405020304" pitchFamily="18" charset="0"/>
+              </a:rPr>
+              <a:t>thiết</a:t>
+            </a:r>
+            <a:r>
+              <a:rPr lang="en-US" dirty="0">
+                <a:latin typeface="Times New Roman" panose="02020603050405020304" pitchFamily="18" charset="0"/>
+                <a:cs typeface="Times New Roman" panose="02020603050405020304" pitchFamily="18" charset="0"/>
+              </a:rPr>
+              <a:t> </a:t>
+            </a:r>
+            <a:r>
+              <a:rPr lang="en-US" dirty="0" err="1">
+                <a:latin typeface="Times New Roman" panose="02020603050405020304" pitchFamily="18" charset="0"/>
+                <a:cs typeface="Times New Roman" panose="02020603050405020304" pitchFamily="18" charset="0"/>
+              </a:rPr>
+              <a:t>bị</a:t>
+            </a:r>
+            <a:endParaRPr lang="en-US" dirty="0">
+              <a:latin typeface="Times New Roman" panose="02020603050405020304" pitchFamily="18" charset="0"/>
+              <a:cs typeface="Times New Roman" panose="02020603050405020304" pitchFamily="18" charset="0"/>
+            </a:endParaRPr>
+          </a:p>
+          <a:p>
+            <a:pPr>
+              <a:buFontTx/>
+              <a:buChar char="-"/>
+            </a:pPr>
+            <a:endParaRPr lang="en-US" dirty="0">
+              <a:latin typeface="Times New Roman" panose="02020603050405020304" pitchFamily="18" charset="0"/>
+              <a:cs typeface="Times New Roman" panose="02020603050405020304" pitchFamily="18" charset="0"/>
+            </a:endParaRPr>
+          </a:p>
+        </p:txBody>
+      </p:sp>
+      <p:sp>
+        <p:nvSpPr>
+          <p:cNvPr id="4" name="Title 3">
+            <a:extLst>
+              <a:ext uri="{FF2B5EF4-FFF2-40B4-BE49-F238E27FC236}">
+                <a16:creationId xmlns:a16="http://schemas.microsoft.com/office/drawing/2014/main" id="{52E18D06-2298-4C20-BF3D-F4536777C955}"/>
               </a:ext>
             </a:extLst>
           </p:cNvPr>
@@ -6330,41 +7625,7 @@
                 <a:latin typeface="Times New Roman" panose="02020603050405020304" pitchFamily="18" charset="0"/>
                 <a:cs typeface="Times New Roman" panose="02020603050405020304" pitchFamily="18" charset="0"/>
               </a:rPr>
-              <a:t>3. Mô hình và kết quả thu được</a:t>
-            </a:r>
-          </a:p>
-        </p:txBody>
-      </p:sp>
-      <p:sp>
-        <p:nvSpPr>
-          <p:cNvPr id="3" name="Text Placeholder 2">
-            <a:extLst>
-              <a:ext uri="{FF2B5EF4-FFF2-40B4-BE49-F238E27FC236}">
-                <a16:creationId xmlns:a16="http://schemas.microsoft.com/office/drawing/2014/main" id="{B6727247-66AD-433E-8800-8F419499CF86}"/>
-              </a:ext>
-            </a:extLst>
-          </p:cNvPr>
-          <p:cNvSpPr>
-            <a:spLocks noGrp="1"/>
-          </p:cNvSpPr>
-          <p:nvPr>
-            <p:ph type="body" sz="quarter" idx="10"/>
-          </p:nvPr>
-        </p:nvSpPr>
-        <p:spPr/>
-        <p:txBody>
-          <a:bodyPr/>
-          <a:lstStyle/>
-          <a:p>
-            <a:pPr marL="0" indent="0">
-              <a:buNone/>
-            </a:pPr>
-            <a:r>
-              <a:rPr lang="en-US">
-                <a:latin typeface="Times New Roman" panose="02020603050405020304" pitchFamily="18" charset="0"/>
-                <a:cs typeface="Times New Roman" panose="02020603050405020304" pitchFamily="18" charset="0"/>
-              </a:rPr>
-              <a:t>Hình ảnh thực tế thiết bị</a:t>
+              <a:t>2. Phân tích và thiết kế</a:t>
             </a:r>
           </a:p>
         </p:txBody>
@@ -6372,7 +7633,7 @@
     </p:spTree>
     <p:extLst>
       <p:ext uri="{BB962C8B-B14F-4D97-AF65-F5344CB8AC3E}">
-        <p14:creationId xmlns:p14="http://schemas.microsoft.com/office/powerpoint/2010/main" val="1167103189"/>
+        <p14:creationId xmlns:p14="http://schemas.microsoft.com/office/powerpoint/2010/main" val="1680069254"/>
       </p:ext>
     </p:extLst>
   </p:cSld>
@@ -6383,6 +7644,1706 @@
 </file>
 
 <file path=ppt/slides/slide21.xml><?xml version="1.0" encoding="utf-8"?>
+<p:sld xmlns:a="http://schemas.openxmlformats.org/drawingml/2006/main" xmlns:r="http://schemas.openxmlformats.org/officeDocument/2006/relationships" xmlns:p="http://schemas.openxmlformats.org/presentationml/2006/main">
+  <p:cSld>
+    <p:spTree>
+      <p:nvGrpSpPr>
+        <p:cNvPr id="1" name=""/>
+        <p:cNvGrpSpPr/>
+        <p:nvPr/>
+      </p:nvGrpSpPr>
+      <p:grpSpPr>
+        <a:xfrm>
+          <a:off x="0" y="0"/>
+          <a:ext cx="0" cy="0"/>
+          <a:chOff x="0" y="0"/>
+          <a:chExt cx="0" cy="0"/>
+        </a:xfrm>
+      </p:grpSpPr>
+      <p:sp>
+        <p:nvSpPr>
+          <p:cNvPr id="5" name="Content Placeholder 4">
+            <a:extLst>
+              <a:ext uri="{FF2B5EF4-FFF2-40B4-BE49-F238E27FC236}">
+                <a16:creationId xmlns:a16="http://schemas.microsoft.com/office/drawing/2014/main" id="{82AD3B8F-023F-4D30-80AA-BE5F44F41593}"/>
+              </a:ext>
+            </a:extLst>
+          </p:cNvPr>
+          <p:cNvSpPr>
+            <a:spLocks noGrp="1"/>
+          </p:cNvSpPr>
+          <p:nvPr>
+            <p:ph sz="quarter" idx="10"/>
+          </p:nvPr>
+        </p:nvSpPr>
+        <p:spPr/>
+        <p:txBody>
+          <a:bodyPr/>
+          <a:lstStyle/>
+          <a:p>
+            <a:pPr marL="0" indent="0">
+              <a:buNone/>
+            </a:pPr>
+            <a:r>
+              <a:rPr lang="en-US">
+                <a:latin typeface="Times New Roman" panose="02020603050405020304" pitchFamily="18" charset="0"/>
+                <a:cs typeface="Times New Roman" panose="02020603050405020304" pitchFamily="18" charset="0"/>
+              </a:rPr>
+              <a:t>2.4. Thiết kế chương trình ứng dụng điều khiển</a:t>
+            </a:r>
+          </a:p>
+          <a:p>
+            <a:pPr>
+              <a:buFontTx/>
+              <a:buChar char="-"/>
+            </a:pPr>
+            <a:r>
+              <a:rPr lang="en-US">
+                <a:latin typeface="Times New Roman" panose="02020603050405020304" pitchFamily="18" charset="0"/>
+                <a:cs typeface="Times New Roman" panose="02020603050405020304" pitchFamily="18" charset="0"/>
+              </a:rPr>
+              <a:t>Lưu đồ thuật toán:</a:t>
+            </a:r>
+          </a:p>
+        </p:txBody>
+      </p:sp>
+      <p:sp>
+        <p:nvSpPr>
+          <p:cNvPr id="4" name="Title 3">
+            <a:extLst>
+              <a:ext uri="{FF2B5EF4-FFF2-40B4-BE49-F238E27FC236}">
+                <a16:creationId xmlns:a16="http://schemas.microsoft.com/office/drawing/2014/main" id="{52E18D06-2298-4C20-BF3D-F4536777C955}"/>
+              </a:ext>
+            </a:extLst>
+          </p:cNvPr>
+          <p:cNvSpPr>
+            <a:spLocks noGrp="1"/>
+          </p:cNvSpPr>
+          <p:nvPr>
+            <p:ph type="title"/>
+          </p:nvPr>
+        </p:nvSpPr>
+        <p:spPr/>
+        <p:txBody>
+          <a:bodyPr/>
+          <a:lstStyle/>
+          <a:p>
+            <a:r>
+              <a:rPr lang="en-US">
+                <a:latin typeface="Times New Roman" panose="02020603050405020304" pitchFamily="18" charset="0"/>
+                <a:cs typeface="Times New Roman" panose="02020603050405020304" pitchFamily="18" charset="0"/>
+              </a:rPr>
+              <a:t>2. Phân tích và thiết kế</a:t>
+            </a:r>
+          </a:p>
+        </p:txBody>
+      </p:sp>
+    </p:spTree>
+    <p:extLst>
+      <p:ext uri="{BB962C8B-B14F-4D97-AF65-F5344CB8AC3E}">
+        <p14:creationId xmlns:p14="http://schemas.microsoft.com/office/powerpoint/2010/main" val="1150083193"/>
+      </p:ext>
+    </p:extLst>
+  </p:cSld>
+  <p:clrMapOvr>
+    <a:masterClrMapping/>
+  </p:clrMapOvr>
+</p:sld>
+</file>
+
+<file path=ppt/slides/slide22.xml><?xml version="1.0" encoding="utf-8"?>
+<p:sld xmlns:a="http://schemas.openxmlformats.org/drawingml/2006/main" xmlns:r="http://schemas.openxmlformats.org/officeDocument/2006/relationships" xmlns:p="http://schemas.openxmlformats.org/presentationml/2006/main">
+  <p:cSld>
+    <p:spTree>
+      <p:nvGrpSpPr>
+        <p:cNvPr id="1" name=""/>
+        <p:cNvGrpSpPr/>
+        <p:nvPr/>
+      </p:nvGrpSpPr>
+      <p:grpSpPr>
+        <a:xfrm>
+          <a:off x="0" y="0"/>
+          <a:ext cx="0" cy="0"/>
+          <a:chOff x="0" y="0"/>
+          <a:chExt cx="0" cy="0"/>
+        </a:xfrm>
+      </p:grpSpPr>
+      <p:sp>
+        <p:nvSpPr>
+          <p:cNvPr id="5" name="Content Placeholder 4">
+            <a:extLst>
+              <a:ext uri="{FF2B5EF4-FFF2-40B4-BE49-F238E27FC236}">
+                <a16:creationId xmlns:a16="http://schemas.microsoft.com/office/drawing/2014/main" id="{82AD3B8F-023F-4D30-80AA-BE5F44F41593}"/>
+              </a:ext>
+            </a:extLst>
+          </p:cNvPr>
+          <p:cNvSpPr>
+            <a:spLocks noGrp="1"/>
+          </p:cNvSpPr>
+          <p:nvPr>
+            <p:ph sz="quarter" idx="10"/>
+          </p:nvPr>
+        </p:nvSpPr>
+        <p:spPr/>
+        <p:txBody>
+          <a:bodyPr/>
+          <a:lstStyle/>
+          <a:p>
+            <a:pPr marL="0" indent="0">
+              <a:buNone/>
+            </a:pPr>
+            <a:r>
+              <a:rPr lang="en-US" dirty="0">
+                <a:latin typeface="Times New Roman" panose="02020603050405020304" pitchFamily="18" charset="0"/>
+                <a:cs typeface="Times New Roman" panose="02020603050405020304" pitchFamily="18" charset="0"/>
+              </a:rPr>
+              <a:t>2.4. </a:t>
+            </a:r>
+            <a:r>
+              <a:rPr lang="en-US" dirty="0" err="1">
+                <a:latin typeface="Times New Roman" panose="02020603050405020304" pitchFamily="18" charset="0"/>
+                <a:cs typeface="Times New Roman" panose="02020603050405020304" pitchFamily="18" charset="0"/>
+              </a:rPr>
+              <a:t>Thiết</a:t>
+            </a:r>
+            <a:r>
+              <a:rPr lang="en-US" dirty="0">
+                <a:latin typeface="Times New Roman" panose="02020603050405020304" pitchFamily="18" charset="0"/>
+                <a:cs typeface="Times New Roman" panose="02020603050405020304" pitchFamily="18" charset="0"/>
+              </a:rPr>
+              <a:t> </a:t>
+            </a:r>
+            <a:r>
+              <a:rPr lang="en-US" dirty="0" err="1">
+                <a:latin typeface="Times New Roman" panose="02020603050405020304" pitchFamily="18" charset="0"/>
+                <a:cs typeface="Times New Roman" panose="02020603050405020304" pitchFamily="18" charset="0"/>
+              </a:rPr>
+              <a:t>kế</a:t>
+            </a:r>
+            <a:r>
+              <a:rPr lang="en-US" dirty="0">
+                <a:latin typeface="Times New Roman" panose="02020603050405020304" pitchFamily="18" charset="0"/>
+                <a:cs typeface="Times New Roman" panose="02020603050405020304" pitchFamily="18" charset="0"/>
+              </a:rPr>
+              <a:t> </a:t>
+            </a:r>
+            <a:r>
+              <a:rPr lang="en-US" dirty="0" err="1">
+                <a:latin typeface="Times New Roman" panose="02020603050405020304" pitchFamily="18" charset="0"/>
+                <a:cs typeface="Times New Roman" panose="02020603050405020304" pitchFamily="18" charset="0"/>
+              </a:rPr>
+              <a:t>chương</a:t>
+            </a:r>
+            <a:r>
+              <a:rPr lang="en-US" dirty="0">
+                <a:latin typeface="Times New Roman" panose="02020603050405020304" pitchFamily="18" charset="0"/>
+                <a:cs typeface="Times New Roman" panose="02020603050405020304" pitchFamily="18" charset="0"/>
+              </a:rPr>
+              <a:t> </a:t>
+            </a:r>
+            <a:r>
+              <a:rPr lang="en-US" dirty="0" err="1">
+                <a:latin typeface="Times New Roman" panose="02020603050405020304" pitchFamily="18" charset="0"/>
+                <a:cs typeface="Times New Roman" panose="02020603050405020304" pitchFamily="18" charset="0"/>
+              </a:rPr>
+              <a:t>trình</a:t>
+            </a:r>
+            <a:r>
+              <a:rPr lang="en-US" dirty="0">
+                <a:latin typeface="Times New Roman" panose="02020603050405020304" pitchFamily="18" charset="0"/>
+                <a:cs typeface="Times New Roman" panose="02020603050405020304" pitchFamily="18" charset="0"/>
+              </a:rPr>
+              <a:t> </a:t>
+            </a:r>
+            <a:r>
+              <a:rPr lang="en-US" dirty="0" err="1">
+                <a:latin typeface="Times New Roman" panose="02020603050405020304" pitchFamily="18" charset="0"/>
+                <a:cs typeface="Times New Roman" panose="02020603050405020304" pitchFamily="18" charset="0"/>
+              </a:rPr>
+              <a:t>ứng</a:t>
+            </a:r>
+            <a:r>
+              <a:rPr lang="en-US" dirty="0">
+                <a:latin typeface="Times New Roman" panose="02020603050405020304" pitchFamily="18" charset="0"/>
+                <a:cs typeface="Times New Roman" panose="02020603050405020304" pitchFamily="18" charset="0"/>
+              </a:rPr>
+              <a:t> </a:t>
+            </a:r>
+            <a:r>
+              <a:rPr lang="en-US" dirty="0" err="1">
+                <a:latin typeface="Times New Roman" panose="02020603050405020304" pitchFamily="18" charset="0"/>
+                <a:cs typeface="Times New Roman" panose="02020603050405020304" pitchFamily="18" charset="0"/>
+              </a:rPr>
+              <a:t>dụng</a:t>
+            </a:r>
+            <a:r>
+              <a:rPr lang="en-US" dirty="0">
+                <a:latin typeface="Times New Roman" panose="02020603050405020304" pitchFamily="18" charset="0"/>
+                <a:cs typeface="Times New Roman" panose="02020603050405020304" pitchFamily="18" charset="0"/>
+              </a:rPr>
+              <a:t> </a:t>
+            </a:r>
+            <a:r>
+              <a:rPr lang="en-US" dirty="0" err="1">
+                <a:latin typeface="Times New Roman" panose="02020603050405020304" pitchFamily="18" charset="0"/>
+                <a:cs typeface="Times New Roman" panose="02020603050405020304" pitchFamily="18" charset="0"/>
+              </a:rPr>
+              <a:t>điều</a:t>
+            </a:r>
+            <a:r>
+              <a:rPr lang="en-US" dirty="0">
+                <a:latin typeface="Times New Roman" panose="02020603050405020304" pitchFamily="18" charset="0"/>
+                <a:cs typeface="Times New Roman" panose="02020603050405020304" pitchFamily="18" charset="0"/>
+              </a:rPr>
+              <a:t> </a:t>
+            </a:r>
+            <a:r>
+              <a:rPr lang="en-US" dirty="0" err="1">
+                <a:latin typeface="Times New Roman" panose="02020603050405020304" pitchFamily="18" charset="0"/>
+                <a:cs typeface="Times New Roman" panose="02020603050405020304" pitchFamily="18" charset="0"/>
+              </a:rPr>
+              <a:t>khiển</a:t>
+            </a:r>
+            <a:endParaRPr lang="en-US" dirty="0">
+              <a:latin typeface="Times New Roman" panose="02020603050405020304" pitchFamily="18" charset="0"/>
+              <a:cs typeface="Times New Roman" panose="02020603050405020304" pitchFamily="18" charset="0"/>
+            </a:endParaRPr>
+          </a:p>
+          <a:p>
+            <a:pPr>
+              <a:buFontTx/>
+              <a:buChar char="-"/>
+            </a:pPr>
+            <a:r>
+              <a:rPr lang="en-US" dirty="0" err="1">
+                <a:latin typeface="Times New Roman" panose="02020603050405020304" pitchFamily="18" charset="0"/>
+                <a:cs typeface="Times New Roman" panose="02020603050405020304" pitchFamily="18" charset="0"/>
+              </a:rPr>
+              <a:t>Xây</a:t>
+            </a:r>
+            <a:r>
+              <a:rPr lang="en-US" dirty="0">
+                <a:latin typeface="Times New Roman" panose="02020603050405020304" pitchFamily="18" charset="0"/>
+                <a:cs typeface="Times New Roman" panose="02020603050405020304" pitchFamily="18" charset="0"/>
+              </a:rPr>
+              <a:t> </a:t>
+            </a:r>
+            <a:r>
+              <a:rPr lang="en-US" dirty="0" err="1">
+                <a:latin typeface="Times New Roman" panose="02020603050405020304" pitchFamily="18" charset="0"/>
+                <a:cs typeface="Times New Roman" panose="02020603050405020304" pitchFamily="18" charset="0"/>
+              </a:rPr>
+              <a:t>dựng</a:t>
+            </a:r>
+            <a:r>
+              <a:rPr lang="en-US" dirty="0">
+                <a:latin typeface="Times New Roman" panose="02020603050405020304" pitchFamily="18" charset="0"/>
+                <a:cs typeface="Times New Roman" panose="02020603050405020304" pitchFamily="18" charset="0"/>
+              </a:rPr>
+              <a:t> </a:t>
+            </a:r>
+            <a:r>
+              <a:rPr lang="en-US" dirty="0" err="1">
+                <a:latin typeface="Times New Roman" panose="02020603050405020304" pitchFamily="18" charset="0"/>
+                <a:cs typeface="Times New Roman" panose="02020603050405020304" pitchFamily="18" charset="0"/>
+              </a:rPr>
+              <a:t>giao</a:t>
+            </a:r>
+            <a:r>
+              <a:rPr lang="en-US" dirty="0">
+                <a:latin typeface="Times New Roman" panose="02020603050405020304" pitchFamily="18" charset="0"/>
+                <a:cs typeface="Times New Roman" panose="02020603050405020304" pitchFamily="18" charset="0"/>
+              </a:rPr>
+              <a:t> </a:t>
+            </a:r>
+            <a:r>
+              <a:rPr lang="en-US" dirty="0" err="1">
+                <a:latin typeface="Times New Roman" panose="02020603050405020304" pitchFamily="18" charset="0"/>
+                <a:cs typeface="Times New Roman" panose="02020603050405020304" pitchFamily="18" charset="0"/>
+              </a:rPr>
+              <a:t>diện</a:t>
+            </a:r>
+            <a:r>
+              <a:rPr lang="en-US" dirty="0">
+                <a:latin typeface="Times New Roman" panose="02020603050405020304" pitchFamily="18" charset="0"/>
+                <a:cs typeface="Times New Roman" panose="02020603050405020304" pitchFamily="18" charset="0"/>
+              </a:rPr>
+              <a:t> </a:t>
+            </a:r>
+            <a:r>
+              <a:rPr lang="en-US" dirty="0" err="1">
+                <a:latin typeface="Times New Roman" panose="02020603050405020304" pitchFamily="18" charset="0"/>
+                <a:cs typeface="Times New Roman" panose="02020603050405020304" pitchFamily="18" charset="0"/>
+              </a:rPr>
+              <a:t>cho</a:t>
+            </a:r>
+            <a:r>
+              <a:rPr lang="en-US" dirty="0">
+                <a:latin typeface="Times New Roman" panose="02020603050405020304" pitchFamily="18" charset="0"/>
+                <a:cs typeface="Times New Roman" panose="02020603050405020304" pitchFamily="18" charset="0"/>
+              </a:rPr>
+              <a:t> </a:t>
+            </a:r>
+            <a:r>
+              <a:rPr lang="en-US" dirty="0" err="1">
+                <a:latin typeface="Times New Roman" panose="02020603050405020304" pitchFamily="18" charset="0"/>
+                <a:cs typeface="Times New Roman" panose="02020603050405020304" pitchFamily="18" charset="0"/>
+              </a:rPr>
+              <a:t>chương</a:t>
+            </a:r>
+            <a:r>
+              <a:rPr lang="en-US" dirty="0">
+                <a:latin typeface="Times New Roman" panose="02020603050405020304" pitchFamily="18" charset="0"/>
+                <a:cs typeface="Times New Roman" panose="02020603050405020304" pitchFamily="18" charset="0"/>
+              </a:rPr>
+              <a:t> </a:t>
+            </a:r>
+            <a:r>
+              <a:rPr lang="en-US" dirty="0" err="1">
+                <a:latin typeface="Times New Roman" panose="02020603050405020304" pitchFamily="18" charset="0"/>
+                <a:cs typeface="Times New Roman" panose="02020603050405020304" pitchFamily="18" charset="0"/>
+              </a:rPr>
+              <a:t>trình</a:t>
+            </a:r>
+            <a:r>
+              <a:rPr lang="en-US" dirty="0">
+                <a:latin typeface="Times New Roman" panose="02020603050405020304" pitchFamily="18" charset="0"/>
+                <a:cs typeface="Times New Roman" panose="02020603050405020304" pitchFamily="18" charset="0"/>
+              </a:rPr>
+              <a:t>:</a:t>
+            </a:r>
+          </a:p>
+          <a:p>
+            <a:pPr lvl="1"/>
+            <a:r>
+              <a:rPr lang="en-US" dirty="0">
+                <a:latin typeface="Times New Roman" panose="02020603050405020304" pitchFamily="18" charset="0"/>
+                <a:cs typeface="Times New Roman" panose="02020603050405020304" pitchFamily="18" charset="0"/>
+              </a:rPr>
+              <a:t>Giao </a:t>
+            </a:r>
+            <a:r>
+              <a:rPr lang="en-US" dirty="0" err="1">
+                <a:latin typeface="Times New Roman" panose="02020603050405020304" pitchFamily="18" charset="0"/>
+                <a:cs typeface="Times New Roman" panose="02020603050405020304" pitchFamily="18" charset="0"/>
+              </a:rPr>
+              <a:t>diện</a:t>
+            </a:r>
+            <a:r>
+              <a:rPr lang="en-US" dirty="0">
+                <a:latin typeface="Times New Roman" panose="02020603050405020304" pitchFamily="18" charset="0"/>
+                <a:cs typeface="Times New Roman" panose="02020603050405020304" pitchFamily="18" charset="0"/>
+              </a:rPr>
+              <a:t> </a:t>
+            </a:r>
+            <a:r>
+              <a:rPr lang="en-US" dirty="0" err="1">
+                <a:latin typeface="Times New Roman" panose="02020603050405020304" pitchFamily="18" charset="0"/>
+                <a:cs typeface="Times New Roman" panose="02020603050405020304" pitchFamily="18" charset="0"/>
+              </a:rPr>
+              <a:t>dạng</a:t>
+            </a:r>
+            <a:r>
+              <a:rPr lang="en-US" dirty="0">
+                <a:latin typeface="Times New Roman" panose="02020603050405020304" pitchFamily="18" charset="0"/>
+                <a:cs typeface="Times New Roman" panose="02020603050405020304" pitchFamily="18" charset="0"/>
+              </a:rPr>
+              <a:t> </a:t>
+            </a:r>
+            <a:r>
+              <a:rPr lang="en-US" dirty="0" err="1">
+                <a:latin typeface="Times New Roman" panose="02020603050405020304" pitchFamily="18" charset="0"/>
+                <a:cs typeface="Times New Roman" panose="02020603050405020304" pitchFamily="18" charset="0"/>
+              </a:rPr>
+              <a:t>lưới</a:t>
+            </a:r>
+            <a:r>
+              <a:rPr lang="en-US" dirty="0">
+                <a:latin typeface="Times New Roman" panose="02020603050405020304" pitchFamily="18" charset="0"/>
+                <a:cs typeface="Times New Roman" panose="02020603050405020304" pitchFamily="18" charset="0"/>
+              </a:rPr>
+              <a:t>					</a:t>
+            </a:r>
+            <a:r>
+              <a:rPr lang="en-US" dirty="0">
+                <a:latin typeface="Times New Roman" panose="02020603050405020304" pitchFamily="18" charset="0"/>
+                <a:cs typeface="Times New Roman" panose="02020603050405020304" pitchFamily="18" charset="0"/>
+                <a:sym typeface="Wingdings 2" panose="05020102010507070707" pitchFamily="18" charset="2"/>
+              </a:rPr>
+              <a:t> </a:t>
+            </a:r>
+            <a:r>
+              <a:rPr lang="en-US" dirty="0" err="1">
+                <a:latin typeface="Times New Roman" panose="02020603050405020304" pitchFamily="18" charset="0"/>
+                <a:cs typeface="Times New Roman" panose="02020603050405020304" pitchFamily="18" charset="0"/>
+              </a:rPr>
+              <a:t>Cửa</a:t>
+            </a:r>
+            <a:r>
+              <a:rPr lang="en-US" dirty="0">
+                <a:latin typeface="Times New Roman" panose="02020603050405020304" pitchFamily="18" charset="0"/>
+                <a:cs typeface="Times New Roman" panose="02020603050405020304" pitchFamily="18" charset="0"/>
+              </a:rPr>
+              <a:t> </a:t>
+            </a:r>
+            <a:r>
+              <a:rPr lang="en-US" dirty="0" err="1">
+                <a:latin typeface="Times New Roman" panose="02020603050405020304" pitchFamily="18" charset="0"/>
+                <a:cs typeface="Times New Roman" panose="02020603050405020304" pitchFamily="18" charset="0"/>
+              </a:rPr>
+              <a:t>sổ</a:t>
+            </a:r>
+            <a:r>
+              <a:rPr lang="en-US" dirty="0">
+                <a:latin typeface="Times New Roman" panose="02020603050405020304" pitchFamily="18" charset="0"/>
+                <a:cs typeface="Times New Roman" panose="02020603050405020304" pitchFamily="18" charset="0"/>
+              </a:rPr>
+              <a:t> </a:t>
+            </a:r>
+            <a:r>
+              <a:rPr lang="en-US" dirty="0" err="1">
+                <a:latin typeface="Times New Roman" panose="02020603050405020304" pitchFamily="18" charset="0"/>
+                <a:cs typeface="Times New Roman" panose="02020603050405020304" pitchFamily="18" charset="0"/>
+              </a:rPr>
+              <a:t>thông</a:t>
+            </a:r>
+            <a:r>
+              <a:rPr lang="en-US" dirty="0">
+                <a:latin typeface="Times New Roman" panose="02020603050405020304" pitchFamily="18" charset="0"/>
+                <a:cs typeface="Times New Roman" panose="02020603050405020304" pitchFamily="18" charset="0"/>
+              </a:rPr>
+              <a:t> </a:t>
+            </a:r>
+            <a:r>
+              <a:rPr lang="en-US" dirty="0" err="1">
+                <a:latin typeface="Times New Roman" panose="02020603050405020304" pitchFamily="18" charset="0"/>
+                <a:cs typeface="Times New Roman" panose="02020603050405020304" pitchFamily="18" charset="0"/>
+              </a:rPr>
+              <a:t>báo</a:t>
+            </a:r>
+            <a:endParaRPr lang="en-US" dirty="0">
+              <a:latin typeface="Times New Roman" panose="02020603050405020304" pitchFamily="18" charset="0"/>
+              <a:cs typeface="Times New Roman" panose="02020603050405020304" pitchFamily="18" charset="0"/>
+            </a:endParaRPr>
+          </a:p>
+        </p:txBody>
+      </p:sp>
+      <p:sp>
+        <p:nvSpPr>
+          <p:cNvPr id="4" name="Title 3">
+            <a:extLst>
+              <a:ext uri="{FF2B5EF4-FFF2-40B4-BE49-F238E27FC236}">
+                <a16:creationId xmlns:a16="http://schemas.microsoft.com/office/drawing/2014/main" id="{52E18D06-2298-4C20-BF3D-F4536777C955}"/>
+              </a:ext>
+            </a:extLst>
+          </p:cNvPr>
+          <p:cNvSpPr>
+            <a:spLocks noGrp="1"/>
+          </p:cNvSpPr>
+          <p:nvPr>
+            <p:ph type="title"/>
+          </p:nvPr>
+        </p:nvSpPr>
+        <p:spPr/>
+        <p:txBody>
+          <a:bodyPr/>
+          <a:lstStyle/>
+          <a:p>
+            <a:r>
+              <a:rPr lang="en-US">
+                <a:latin typeface="Times New Roman" panose="02020603050405020304" pitchFamily="18" charset="0"/>
+                <a:cs typeface="Times New Roman" panose="02020603050405020304" pitchFamily="18" charset="0"/>
+              </a:rPr>
+              <a:t>2. Phân tích và thiết kế</a:t>
+            </a:r>
+          </a:p>
+        </p:txBody>
+      </p:sp>
+      <p:graphicFrame>
+        <p:nvGraphicFramePr>
+          <p:cNvPr id="2" name="Table 2">
+            <a:extLst>
+              <a:ext uri="{FF2B5EF4-FFF2-40B4-BE49-F238E27FC236}">
+                <a16:creationId xmlns:a16="http://schemas.microsoft.com/office/drawing/2014/main" id="{36D06FF2-8DD7-42B4-AEF9-ADD7DCF2F275}"/>
+              </a:ext>
+            </a:extLst>
+          </p:cNvPr>
+          <p:cNvGraphicFramePr>
+            <a:graphicFrameLocks noGrp="1"/>
+          </p:cNvGraphicFramePr>
+          <p:nvPr>
+            <p:extLst>
+              <p:ext uri="{D42A27DB-BD31-4B8C-83A1-F6EECF244321}">
+                <p14:modId xmlns:p14="http://schemas.microsoft.com/office/powerpoint/2010/main" val="1208488470"/>
+              </p:ext>
+            </p:extLst>
+          </p:nvPr>
+        </p:nvGraphicFramePr>
+        <p:xfrm>
+          <a:off x="338736" y="2552073"/>
+          <a:ext cx="5936566" cy="3159160"/>
+        </p:xfrm>
+        <a:graphic>
+          <a:graphicData uri="http://schemas.openxmlformats.org/drawingml/2006/table">
+            <a:tbl>
+              <a:tblPr firstRow="1" bandRow="1">
+                <a:effectLst/>
+                <a:tableStyleId>{5C22544A-7EE6-4342-B048-85BDC9FD1C3A}</a:tableStyleId>
+              </a:tblPr>
+              <a:tblGrid>
+                <a:gridCol w="2968283">
+                  <a:extLst>
+                    <a:ext uri="{9D8B030D-6E8A-4147-A177-3AD203B41FA5}">
+                      <a16:colId xmlns:a16="http://schemas.microsoft.com/office/drawing/2014/main" val="3526800874"/>
+                    </a:ext>
+                  </a:extLst>
+                </a:gridCol>
+                <a:gridCol w="2968283">
+                  <a:extLst>
+                    <a:ext uri="{9D8B030D-6E8A-4147-A177-3AD203B41FA5}">
+                      <a16:colId xmlns:a16="http://schemas.microsoft.com/office/drawing/2014/main" val="2601548562"/>
+                    </a:ext>
+                  </a:extLst>
+                </a:gridCol>
+              </a:tblGrid>
+              <a:tr h="515026">
+                <a:tc gridSpan="2">
+                  <a:txBody>
+                    <a:bodyPr/>
+                    <a:lstStyle/>
+                    <a:p>
+                      <a:pPr algn="ctr"/>
+                      <a:r>
+                        <a:rPr lang="en-US" sz="2400" b="0" dirty="0" err="1">
+                          <a:solidFill>
+                            <a:schemeClr val="tx1"/>
+                          </a:solidFill>
+                          <a:latin typeface="Times New Roman" panose="02020603050405020304" pitchFamily="18" charset="0"/>
+                          <a:cs typeface="Times New Roman" panose="02020603050405020304" pitchFamily="18" charset="0"/>
+                        </a:rPr>
+                        <a:t>Thông</a:t>
+                      </a:r>
+                      <a:r>
+                        <a:rPr lang="en-US" sz="2400" b="0" dirty="0">
+                          <a:solidFill>
+                            <a:schemeClr val="tx1"/>
+                          </a:solidFill>
+                          <a:latin typeface="Times New Roman" panose="02020603050405020304" pitchFamily="18" charset="0"/>
+                          <a:cs typeface="Times New Roman" panose="02020603050405020304" pitchFamily="18" charset="0"/>
+                        </a:rPr>
+                        <a:t> tin </a:t>
+                      </a:r>
+                      <a:r>
+                        <a:rPr lang="en-US" sz="2400" b="0" dirty="0" err="1">
+                          <a:solidFill>
+                            <a:schemeClr val="tx1"/>
+                          </a:solidFill>
+                          <a:latin typeface="Times New Roman" panose="02020603050405020304" pitchFamily="18" charset="0"/>
+                          <a:cs typeface="Times New Roman" panose="02020603050405020304" pitchFamily="18" charset="0"/>
+                        </a:rPr>
+                        <a:t>chương</a:t>
+                      </a:r>
+                      <a:r>
+                        <a:rPr lang="en-US" sz="2400" b="0" dirty="0">
+                          <a:solidFill>
+                            <a:schemeClr val="tx1"/>
+                          </a:solidFill>
+                          <a:latin typeface="Times New Roman" panose="02020603050405020304" pitchFamily="18" charset="0"/>
+                          <a:cs typeface="Times New Roman" panose="02020603050405020304" pitchFamily="18" charset="0"/>
+                        </a:rPr>
+                        <a:t> </a:t>
+                      </a:r>
+                      <a:r>
+                        <a:rPr lang="en-US" sz="2400" b="0" dirty="0" err="1">
+                          <a:solidFill>
+                            <a:schemeClr val="tx1"/>
+                          </a:solidFill>
+                          <a:latin typeface="Times New Roman" panose="02020603050405020304" pitchFamily="18" charset="0"/>
+                          <a:cs typeface="Times New Roman" panose="02020603050405020304" pitchFamily="18" charset="0"/>
+                        </a:rPr>
+                        <a:t>trình</a:t>
+                      </a:r>
+                      <a:endParaRPr lang="en-US" sz="2400" b="0" dirty="0">
+                        <a:solidFill>
+                          <a:schemeClr val="tx1"/>
+                        </a:solidFill>
+                        <a:latin typeface="Times New Roman" panose="02020603050405020304" pitchFamily="18" charset="0"/>
+                        <a:cs typeface="Times New Roman" panose="02020603050405020304" pitchFamily="18" charset="0"/>
+                      </a:endParaRPr>
+                    </a:p>
+                  </a:txBody>
+                  <a:tcPr>
+                    <a:lnL w="12700" cap="flat" cmpd="sng" algn="ctr">
+                      <a:solidFill>
+                        <a:schemeClr val="tx1"/>
+                      </a:solidFill>
+                      <a:prstDash val="solid"/>
+                      <a:round/>
+                      <a:headEnd type="none" w="med" len="med"/>
+                      <a:tailEnd type="none" w="med" len="med"/>
+                    </a:lnL>
+                    <a:lnR w="12700" cap="flat" cmpd="sng" algn="ctr">
+                      <a:solidFill>
+                        <a:schemeClr val="tx1"/>
+                      </a:solidFill>
+                      <a:prstDash val="solid"/>
+                      <a:round/>
+                      <a:headEnd type="none" w="med" len="med"/>
+                      <a:tailEnd type="none" w="med" len="med"/>
+                    </a:lnR>
+                    <a:lnT w="12700" cap="flat" cmpd="sng" algn="ctr">
+                      <a:solidFill>
+                        <a:schemeClr val="tx1"/>
+                      </a:solidFill>
+                      <a:prstDash val="solid"/>
+                      <a:round/>
+                      <a:headEnd type="none" w="med" len="med"/>
+                      <a:tailEnd type="none" w="med" len="med"/>
+                    </a:lnT>
+                    <a:lnB w="12700" cap="flat" cmpd="sng" algn="ctr">
+                      <a:solidFill>
+                        <a:schemeClr val="tx1"/>
+                      </a:solidFill>
+                      <a:prstDash val="solid"/>
+                      <a:round/>
+                      <a:headEnd type="none" w="med" len="med"/>
+                      <a:tailEnd type="none" w="med" len="med"/>
+                    </a:lnB>
+                    <a:lnTlToBr w="12700" cmpd="sng">
+                      <a:noFill/>
+                      <a:prstDash val="solid"/>
+                    </a:lnTlToBr>
+                    <a:lnBlToTr w="12700" cmpd="sng">
+                      <a:noFill/>
+                      <a:prstDash val="solid"/>
+                    </a:lnBlToTr>
+                    <a:solidFill>
+                      <a:schemeClr val="bg1"/>
+                    </a:solidFill>
+                  </a:tcPr>
+                </a:tc>
+                <a:tc hMerge="1">
+                  <a:txBody>
+                    <a:bodyPr/>
+                    <a:lstStyle/>
+                    <a:p>
+                      <a:endParaRPr lang="en-US" dirty="0"/>
+                    </a:p>
+                  </a:txBody>
+                  <a:tcPr>
+                    <a:lnL w="12700" cap="flat" cmpd="sng" algn="ctr">
+                      <a:solidFill>
+                        <a:schemeClr val="tx1"/>
+                      </a:solidFill>
+                      <a:prstDash val="solid"/>
+                      <a:round/>
+                      <a:headEnd type="none" w="med" len="med"/>
+                      <a:tailEnd type="none" w="med" len="med"/>
+                    </a:lnL>
+                    <a:lnR w="12700" cap="flat" cmpd="sng" algn="ctr">
+                      <a:solidFill>
+                        <a:schemeClr val="tx1"/>
+                      </a:solidFill>
+                      <a:prstDash val="solid"/>
+                      <a:round/>
+                      <a:headEnd type="none" w="med" len="med"/>
+                      <a:tailEnd type="none" w="med" len="med"/>
+                    </a:lnR>
+                    <a:lnT w="12700" cap="flat" cmpd="sng" algn="ctr">
+                      <a:solidFill>
+                        <a:schemeClr val="tx1"/>
+                      </a:solidFill>
+                      <a:prstDash val="solid"/>
+                      <a:round/>
+                      <a:headEnd type="none" w="med" len="med"/>
+                      <a:tailEnd type="none" w="med" len="med"/>
+                    </a:lnT>
+                    <a:lnB w="12700" cap="flat" cmpd="sng" algn="ctr">
+                      <a:solidFill>
+                        <a:schemeClr val="tx1"/>
+                      </a:solidFill>
+                      <a:prstDash val="solid"/>
+                      <a:round/>
+                      <a:headEnd type="none" w="med" len="med"/>
+                      <a:tailEnd type="none" w="med" len="med"/>
+                    </a:lnB>
+                    <a:lnTlToBr w="12700" cmpd="sng">
+                      <a:noFill/>
+                      <a:prstDash val="solid"/>
+                    </a:lnTlToBr>
+                    <a:lnBlToTr w="12700" cmpd="sng">
+                      <a:noFill/>
+                      <a:prstDash val="solid"/>
+                    </a:lnBlToTr>
+                    <a:solidFill>
+                      <a:schemeClr val="bg1"/>
+                    </a:solidFill>
+                  </a:tcPr>
+                </a:tc>
+                <a:extLst>
+                  <a:ext uri="{0D108BD9-81ED-4DB2-BD59-A6C34878D82A}">
+                    <a16:rowId xmlns:a16="http://schemas.microsoft.com/office/drawing/2014/main" val="119793136"/>
+                  </a:ext>
+                </a:extLst>
+              </a:tr>
+              <a:tr h="881378">
+                <a:tc>
+                  <a:txBody>
+                    <a:bodyPr/>
+                    <a:lstStyle/>
+                    <a:p>
+                      <a:pPr algn="ctr"/>
+                      <a:r>
+                        <a:rPr lang="en-US" sz="2400" dirty="0" err="1">
+                          <a:latin typeface="Times New Roman" panose="02020603050405020304" pitchFamily="18" charset="0"/>
+                          <a:cs typeface="Times New Roman" panose="02020603050405020304" pitchFamily="18" charset="0"/>
+                        </a:rPr>
+                        <a:t>Nút</a:t>
+                      </a:r>
+                      <a:r>
+                        <a:rPr lang="en-US" sz="2400" dirty="0">
+                          <a:latin typeface="Times New Roman" panose="02020603050405020304" pitchFamily="18" charset="0"/>
+                          <a:cs typeface="Times New Roman" panose="02020603050405020304" pitchFamily="18" charset="0"/>
+                        </a:rPr>
+                        <a:t> </a:t>
+                      </a:r>
+                      <a:r>
+                        <a:rPr lang="en-US" sz="2400" dirty="0" err="1">
+                          <a:latin typeface="Times New Roman" panose="02020603050405020304" pitchFamily="18" charset="0"/>
+                          <a:cs typeface="Times New Roman" panose="02020603050405020304" pitchFamily="18" charset="0"/>
+                        </a:rPr>
+                        <a:t>nhấn</a:t>
+                      </a:r>
+                      <a:r>
+                        <a:rPr lang="en-US" sz="2400" dirty="0">
+                          <a:latin typeface="Times New Roman" panose="02020603050405020304" pitchFamily="18" charset="0"/>
+                          <a:cs typeface="Times New Roman" panose="02020603050405020304" pitchFamily="18" charset="0"/>
+                        </a:rPr>
+                        <a:t> 1</a:t>
+                      </a:r>
+                    </a:p>
+                  </a:txBody>
+                  <a:tcPr>
+                    <a:lnL w="12700" cap="flat" cmpd="sng" algn="ctr">
+                      <a:solidFill>
+                        <a:schemeClr val="tx1"/>
+                      </a:solidFill>
+                      <a:prstDash val="solid"/>
+                      <a:round/>
+                      <a:headEnd type="none" w="med" len="med"/>
+                      <a:tailEnd type="none" w="med" len="med"/>
+                    </a:lnL>
+                    <a:lnR w="12700" cap="flat" cmpd="sng" algn="ctr">
+                      <a:solidFill>
+                        <a:schemeClr val="tx1"/>
+                      </a:solidFill>
+                      <a:prstDash val="solid"/>
+                      <a:round/>
+                      <a:headEnd type="none" w="med" len="med"/>
+                      <a:tailEnd type="none" w="med" len="med"/>
+                    </a:lnR>
+                    <a:lnT w="12700" cap="flat" cmpd="sng" algn="ctr">
+                      <a:solidFill>
+                        <a:schemeClr val="tx1"/>
+                      </a:solidFill>
+                      <a:prstDash val="solid"/>
+                      <a:round/>
+                      <a:headEnd type="none" w="med" len="med"/>
+                      <a:tailEnd type="none" w="med" len="med"/>
+                    </a:lnT>
+                    <a:lnB w="12700" cap="flat" cmpd="sng" algn="ctr">
+                      <a:solidFill>
+                        <a:schemeClr val="tx1"/>
+                      </a:solidFill>
+                      <a:prstDash val="solid"/>
+                      <a:round/>
+                      <a:headEnd type="none" w="med" len="med"/>
+                      <a:tailEnd type="none" w="med" len="med"/>
+                    </a:lnB>
+                    <a:lnTlToBr w="12700" cmpd="sng">
+                      <a:noFill/>
+                      <a:prstDash val="solid"/>
+                    </a:lnTlToBr>
+                    <a:lnBlToTr w="12700" cmpd="sng">
+                      <a:noFill/>
+                      <a:prstDash val="solid"/>
+                    </a:lnBlToTr>
+                    <a:solidFill>
+                      <a:schemeClr val="bg1"/>
+                    </a:solidFill>
+                  </a:tcPr>
+                </a:tc>
+                <a:tc>
+                  <a:txBody>
+                    <a:bodyPr/>
+                    <a:lstStyle/>
+                    <a:p>
+                      <a:pPr algn="ctr"/>
+                      <a:r>
+                        <a:rPr lang="en-US" sz="2400" dirty="0" err="1">
+                          <a:latin typeface="Times New Roman" panose="02020603050405020304" pitchFamily="18" charset="0"/>
+                          <a:cs typeface="Times New Roman" panose="02020603050405020304" pitchFamily="18" charset="0"/>
+                        </a:rPr>
+                        <a:t>Nút</a:t>
+                      </a:r>
+                      <a:r>
+                        <a:rPr lang="en-US" sz="2400" dirty="0">
+                          <a:latin typeface="Times New Roman" panose="02020603050405020304" pitchFamily="18" charset="0"/>
+                          <a:cs typeface="Times New Roman" panose="02020603050405020304" pitchFamily="18" charset="0"/>
+                        </a:rPr>
+                        <a:t> </a:t>
+                      </a:r>
+                      <a:r>
+                        <a:rPr lang="en-US" sz="2400" dirty="0" err="1">
+                          <a:latin typeface="Times New Roman" panose="02020603050405020304" pitchFamily="18" charset="0"/>
+                          <a:cs typeface="Times New Roman" panose="02020603050405020304" pitchFamily="18" charset="0"/>
+                        </a:rPr>
+                        <a:t>nhấn</a:t>
+                      </a:r>
+                      <a:r>
+                        <a:rPr lang="en-US" sz="2400" dirty="0">
+                          <a:latin typeface="Times New Roman" panose="02020603050405020304" pitchFamily="18" charset="0"/>
+                          <a:cs typeface="Times New Roman" panose="02020603050405020304" pitchFamily="18" charset="0"/>
+                        </a:rPr>
+                        <a:t> 2</a:t>
+                      </a:r>
+                    </a:p>
+                  </a:txBody>
+                  <a:tcPr>
+                    <a:lnL w="12700" cap="flat" cmpd="sng" algn="ctr">
+                      <a:solidFill>
+                        <a:schemeClr val="tx1"/>
+                      </a:solidFill>
+                      <a:prstDash val="solid"/>
+                      <a:round/>
+                      <a:headEnd type="none" w="med" len="med"/>
+                      <a:tailEnd type="none" w="med" len="med"/>
+                    </a:lnL>
+                    <a:lnR w="12700" cap="flat" cmpd="sng" algn="ctr">
+                      <a:solidFill>
+                        <a:schemeClr val="tx1"/>
+                      </a:solidFill>
+                      <a:prstDash val="solid"/>
+                      <a:round/>
+                      <a:headEnd type="none" w="med" len="med"/>
+                      <a:tailEnd type="none" w="med" len="med"/>
+                    </a:lnR>
+                    <a:lnT w="12700" cap="flat" cmpd="sng" algn="ctr">
+                      <a:solidFill>
+                        <a:schemeClr val="tx1"/>
+                      </a:solidFill>
+                      <a:prstDash val="solid"/>
+                      <a:round/>
+                      <a:headEnd type="none" w="med" len="med"/>
+                      <a:tailEnd type="none" w="med" len="med"/>
+                    </a:lnT>
+                    <a:lnB w="12700" cap="flat" cmpd="sng" algn="ctr">
+                      <a:solidFill>
+                        <a:schemeClr val="tx1"/>
+                      </a:solidFill>
+                      <a:prstDash val="solid"/>
+                      <a:round/>
+                      <a:headEnd type="none" w="med" len="med"/>
+                      <a:tailEnd type="none" w="med" len="med"/>
+                    </a:lnB>
+                    <a:lnTlToBr w="12700" cmpd="sng">
+                      <a:noFill/>
+                      <a:prstDash val="solid"/>
+                    </a:lnTlToBr>
+                    <a:lnBlToTr w="12700" cmpd="sng">
+                      <a:noFill/>
+                      <a:prstDash val="solid"/>
+                    </a:lnBlToTr>
+                    <a:solidFill>
+                      <a:schemeClr val="bg1"/>
+                    </a:solidFill>
+                  </a:tcPr>
+                </a:tc>
+                <a:extLst>
+                  <a:ext uri="{0D108BD9-81ED-4DB2-BD59-A6C34878D82A}">
+                    <a16:rowId xmlns:a16="http://schemas.microsoft.com/office/drawing/2014/main" val="3347503159"/>
+                  </a:ext>
+                </a:extLst>
+              </a:tr>
+              <a:tr h="881378">
+                <a:tc>
+                  <a:txBody>
+                    <a:bodyPr/>
+                    <a:lstStyle/>
+                    <a:p>
+                      <a:pPr algn="ctr"/>
+                      <a:r>
+                        <a:rPr lang="en-US" sz="2400" dirty="0" err="1">
+                          <a:latin typeface="Times New Roman" panose="02020603050405020304" pitchFamily="18" charset="0"/>
+                          <a:cs typeface="Times New Roman" panose="02020603050405020304" pitchFamily="18" charset="0"/>
+                        </a:rPr>
+                        <a:t>Nút</a:t>
+                      </a:r>
+                      <a:r>
+                        <a:rPr lang="en-US" sz="2400" dirty="0">
+                          <a:latin typeface="Times New Roman" panose="02020603050405020304" pitchFamily="18" charset="0"/>
+                          <a:cs typeface="Times New Roman" panose="02020603050405020304" pitchFamily="18" charset="0"/>
+                        </a:rPr>
+                        <a:t> </a:t>
+                      </a:r>
+                      <a:r>
+                        <a:rPr lang="en-US" sz="2400" dirty="0" err="1">
+                          <a:latin typeface="Times New Roman" panose="02020603050405020304" pitchFamily="18" charset="0"/>
+                          <a:cs typeface="Times New Roman" panose="02020603050405020304" pitchFamily="18" charset="0"/>
+                        </a:rPr>
+                        <a:t>nhấn</a:t>
+                      </a:r>
+                      <a:r>
+                        <a:rPr lang="en-US" sz="2400" dirty="0">
+                          <a:latin typeface="Times New Roman" panose="02020603050405020304" pitchFamily="18" charset="0"/>
+                          <a:cs typeface="Times New Roman" panose="02020603050405020304" pitchFamily="18" charset="0"/>
+                        </a:rPr>
+                        <a:t> 3</a:t>
+                      </a:r>
+                    </a:p>
+                  </a:txBody>
+                  <a:tcPr>
+                    <a:lnL w="12700" cap="flat" cmpd="sng" algn="ctr">
+                      <a:solidFill>
+                        <a:schemeClr val="tx1"/>
+                      </a:solidFill>
+                      <a:prstDash val="solid"/>
+                      <a:round/>
+                      <a:headEnd type="none" w="med" len="med"/>
+                      <a:tailEnd type="none" w="med" len="med"/>
+                    </a:lnL>
+                    <a:lnR w="12700" cap="flat" cmpd="sng" algn="ctr">
+                      <a:solidFill>
+                        <a:schemeClr val="tx1"/>
+                      </a:solidFill>
+                      <a:prstDash val="solid"/>
+                      <a:round/>
+                      <a:headEnd type="none" w="med" len="med"/>
+                      <a:tailEnd type="none" w="med" len="med"/>
+                    </a:lnR>
+                    <a:lnT w="12700" cap="flat" cmpd="sng" algn="ctr">
+                      <a:solidFill>
+                        <a:schemeClr val="tx1"/>
+                      </a:solidFill>
+                      <a:prstDash val="solid"/>
+                      <a:round/>
+                      <a:headEnd type="none" w="med" len="med"/>
+                      <a:tailEnd type="none" w="med" len="med"/>
+                    </a:lnT>
+                    <a:lnB w="12700" cap="flat" cmpd="sng" algn="ctr">
+                      <a:solidFill>
+                        <a:schemeClr val="tx1"/>
+                      </a:solidFill>
+                      <a:prstDash val="solid"/>
+                      <a:round/>
+                      <a:headEnd type="none" w="med" len="med"/>
+                      <a:tailEnd type="none" w="med" len="med"/>
+                    </a:lnB>
+                    <a:lnTlToBr w="12700" cmpd="sng">
+                      <a:noFill/>
+                      <a:prstDash val="solid"/>
+                    </a:lnTlToBr>
+                    <a:lnBlToTr w="12700" cmpd="sng">
+                      <a:noFill/>
+                      <a:prstDash val="solid"/>
+                    </a:lnBlToTr>
+                    <a:solidFill>
+                      <a:schemeClr val="bg1"/>
+                    </a:solidFill>
+                  </a:tcPr>
+                </a:tc>
+                <a:tc>
+                  <a:txBody>
+                    <a:bodyPr/>
+                    <a:lstStyle/>
+                    <a:p>
+                      <a:pPr algn="ctr"/>
+                      <a:r>
+                        <a:rPr lang="en-US" sz="2400" dirty="0" err="1">
+                          <a:latin typeface="Times New Roman" panose="02020603050405020304" pitchFamily="18" charset="0"/>
+                          <a:cs typeface="Times New Roman" panose="02020603050405020304" pitchFamily="18" charset="0"/>
+                        </a:rPr>
+                        <a:t>Nút</a:t>
+                      </a:r>
+                      <a:r>
+                        <a:rPr lang="en-US" sz="2400" dirty="0">
+                          <a:latin typeface="Times New Roman" panose="02020603050405020304" pitchFamily="18" charset="0"/>
+                          <a:cs typeface="Times New Roman" panose="02020603050405020304" pitchFamily="18" charset="0"/>
+                        </a:rPr>
+                        <a:t> </a:t>
+                      </a:r>
+                      <a:r>
+                        <a:rPr lang="en-US" sz="2400" dirty="0" err="1">
+                          <a:latin typeface="Times New Roman" panose="02020603050405020304" pitchFamily="18" charset="0"/>
+                          <a:cs typeface="Times New Roman" panose="02020603050405020304" pitchFamily="18" charset="0"/>
+                        </a:rPr>
+                        <a:t>nhấn</a:t>
+                      </a:r>
+                      <a:r>
+                        <a:rPr lang="en-US" sz="2400" dirty="0">
+                          <a:latin typeface="Times New Roman" panose="02020603050405020304" pitchFamily="18" charset="0"/>
+                          <a:cs typeface="Times New Roman" panose="02020603050405020304" pitchFamily="18" charset="0"/>
+                        </a:rPr>
+                        <a:t> 4</a:t>
+                      </a:r>
+                    </a:p>
+                  </a:txBody>
+                  <a:tcPr>
+                    <a:lnL w="12700" cap="flat" cmpd="sng" algn="ctr">
+                      <a:solidFill>
+                        <a:schemeClr val="tx1"/>
+                      </a:solidFill>
+                      <a:prstDash val="solid"/>
+                      <a:round/>
+                      <a:headEnd type="none" w="med" len="med"/>
+                      <a:tailEnd type="none" w="med" len="med"/>
+                    </a:lnL>
+                    <a:lnR w="12700" cap="flat" cmpd="sng" algn="ctr">
+                      <a:solidFill>
+                        <a:schemeClr val="tx1"/>
+                      </a:solidFill>
+                      <a:prstDash val="solid"/>
+                      <a:round/>
+                      <a:headEnd type="none" w="med" len="med"/>
+                      <a:tailEnd type="none" w="med" len="med"/>
+                    </a:lnR>
+                    <a:lnT w="12700" cap="flat" cmpd="sng" algn="ctr">
+                      <a:solidFill>
+                        <a:schemeClr val="tx1"/>
+                      </a:solidFill>
+                      <a:prstDash val="solid"/>
+                      <a:round/>
+                      <a:headEnd type="none" w="med" len="med"/>
+                      <a:tailEnd type="none" w="med" len="med"/>
+                    </a:lnT>
+                    <a:lnB w="12700" cap="flat" cmpd="sng" algn="ctr">
+                      <a:solidFill>
+                        <a:schemeClr val="tx1"/>
+                      </a:solidFill>
+                      <a:prstDash val="solid"/>
+                      <a:round/>
+                      <a:headEnd type="none" w="med" len="med"/>
+                      <a:tailEnd type="none" w="med" len="med"/>
+                    </a:lnB>
+                    <a:lnTlToBr w="12700" cmpd="sng">
+                      <a:noFill/>
+                      <a:prstDash val="solid"/>
+                    </a:lnTlToBr>
+                    <a:lnBlToTr w="12700" cmpd="sng">
+                      <a:noFill/>
+                      <a:prstDash val="solid"/>
+                    </a:lnBlToTr>
+                    <a:solidFill>
+                      <a:schemeClr val="bg1"/>
+                    </a:solidFill>
+                  </a:tcPr>
+                </a:tc>
+                <a:extLst>
+                  <a:ext uri="{0D108BD9-81ED-4DB2-BD59-A6C34878D82A}">
+                    <a16:rowId xmlns:a16="http://schemas.microsoft.com/office/drawing/2014/main" val="794499155"/>
+                  </a:ext>
+                </a:extLst>
+              </a:tr>
+              <a:tr h="881378">
+                <a:tc gridSpan="2">
+                  <a:txBody>
+                    <a:bodyPr/>
+                    <a:lstStyle/>
+                    <a:p>
+                      <a:pPr algn="ctr"/>
+                      <a:r>
+                        <a:rPr lang="en-US" sz="2400" dirty="0" err="1">
+                          <a:latin typeface="Times New Roman" panose="02020603050405020304" pitchFamily="18" charset="0"/>
+                          <a:cs typeface="Times New Roman" panose="02020603050405020304" pitchFamily="18" charset="0"/>
+                        </a:rPr>
+                        <a:t>Nút</a:t>
+                      </a:r>
+                      <a:r>
+                        <a:rPr lang="en-US" sz="2400" dirty="0">
+                          <a:latin typeface="Times New Roman" panose="02020603050405020304" pitchFamily="18" charset="0"/>
+                          <a:cs typeface="Times New Roman" panose="02020603050405020304" pitchFamily="18" charset="0"/>
+                        </a:rPr>
+                        <a:t> </a:t>
+                      </a:r>
+                      <a:r>
+                        <a:rPr lang="en-US" sz="2400" dirty="0" err="1">
+                          <a:latin typeface="Times New Roman" panose="02020603050405020304" pitchFamily="18" charset="0"/>
+                          <a:cs typeface="Times New Roman" panose="02020603050405020304" pitchFamily="18" charset="0"/>
+                        </a:rPr>
+                        <a:t>cấu</a:t>
+                      </a:r>
+                      <a:r>
+                        <a:rPr lang="en-US" sz="2400" dirty="0">
+                          <a:latin typeface="Times New Roman" panose="02020603050405020304" pitchFamily="18" charset="0"/>
+                          <a:cs typeface="Times New Roman" panose="02020603050405020304" pitchFamily="18" charset="0"/>
+                        </a:rPr>
+                        <a:t> </a:t>
+                      </a:r>
+                      <a:r>
+                        <a:rPr lang="en-US" sz="2400" dirty="0" err="1">
+                          <a:latin typeface="Times New Roman" panose="02020603050405020304" pitchFamily="18" charset="0"/>
+                          <a:cs typeface="Times New Roman" panose="02020603050405020304" pitchFamily="18" charset="0"/>
+                        </a:rPr>
+                        <a:t>hình</a:t>
+                      </a:r>
+                      <a:r>
+                        <a:rPr lang="en-US" sz="2400" dirty="0">
+                          <a:latin typeface="Times New Roman" panose="02020603050405020304" pitchFamily="18" charset="0"/>
+                          <a:cs typeface="Times New Roman" panose="02020603050405020304" pitchFamily="18" charset="0"/>
+                        </a:rPr>
+                        <a:t> </a:t>
+                      </a:r>
+                      <a:r>
+                        <a:rPr lang="en-US" sz="2400" dirty="0" err="1">
+                          <a:latin typeface="Times New Roman" panose="02020603050405020304" pitchFamily="18" charset="0"/>
+                          <a:cs typeface="Times New Roman" panose="02020603050405020304" pitchFamily="18" charset="0"/>
+                        </a:rPr>
+                        <a:t>WiFi</a:t>
+                      </a:r>
+                      <a:endParaRPr lang="en-US" sz="2400" dirty="0">
+                        <a:latin typeface="Times New Roman" panose="02020603050405020304" pitchFamily="18" charset="0"/>
+                        <a:cs typeface="Times New Roman" panose="02020603050405020304" pitchFamily="18" charset="0"/>
+                      </a:endParaRPr>
+                    </a:p>
+                  </a:txBody>
+                  <a:tcPr>
+                    <a:lnL w="12700" cap="flat" cmpd="sng" algn="ctr">
+                      <a:solidFill>
+                        <a:schemeClr val="tx1"/>
+                      </a:solidFill>
+                      <a:prstDash val="solid"/>
+                      <a:round/>
+                      <a:headEnd type="none" w="med" len="med"/>
+                      <a:tailEnd type="none" w="med" len="med"/>
+                    </a:lnL>
+                    <a:lnR w="12700" cap="flat" cmpd="sng" algn="ctr">
+                      <a:solidFill>
+                        <a:schemeClr val="tx1"/>
+                      </a:solidFill>
+                      <a:prstDash val="solid"/>
+                      <a:round/>
+                      <a:headEnd type="none" w="med" len="med"/>
+                      <a:tailEnd type="none" w="med" len="med"/>
+                    </a:lnR>
+                    <a:lnT w="12700" cap="flat" cmpd="sng" algn="ctr">
+                      <a:solidFill>
+                        <a:schemeClr val="tx1"/>
+                      </a:solidFill>
+                      <a:prstDash val="solid"/>
+                      <a:round/>
+                      <a:headEnd type="none" w="med" len="med"/>
+                      <a:tailEnd type="none" w="med" len="med"/>
+                    </a:lnT>
+                    <a:lnB w="12700" cap="flat" cmpd="sng" algn="ctr">
+                      <a:solidFill>
+                        <a:schemeClr val="tx1"/>
+                      </a:solidFill>
+                      <a:prstDash val="solid"/>
+                      <a:round/>
+                      <a:headEnd type="none" w="med" len="med"/>
+                      <a:tailEnd type="none" w="med" len="med"/>
+                    </a:lnB>
+                    <a:lnTlToBr w="12700" cmpd="sng">
+                      <a:noFill/>
+                      <a:prstDash val="solid"/>
+                    </a:lnTlToBr>
+                    <a:lnBlToTr w="12700" cmpd="sng">
+                      <a:noFill/>
+                      <a:prstDash val="solid"/>
+                    </a:lnBlToTr>
+                    <a:solidFill>
+                      <a:schemeClr val="bg1"/>
+                    </a:solidFill>
+                  </a:tcPr>
+                </a:tc>
+                <a:tc hMerge="1">
+                  <a:txBody>
+                    <a:bodyPr/>
+                    <a:lstStyle/>
+                    <a:p>
+                      <a:endParaRPr lang="en-US" sz="2400" dirty="0">
+                        <a:latin typeface="Times New Roman" panose="02020603050405020304" pitchFamily="18" charset="0"/>
+                        <a:cs typeface="Times New Roman" panose="02020603050405020304" pitchFamily="18" charset="0"/>
+                      </a:endParaRPr>
+                    </a:p>
+                  </a:txBody>
+                  <a:tcPr>
+                    <a:lnL w="12700" cap="flat" cmpd="sng" algn="ctr">
+                      <a:solidFill>
+                        <a:schemeClr val="tx1"/>
+                      </a:solidFill>
+                      <a:prstDash val="solid"/>
+                      <a:round/>
+                      <a:headEnd type="none" w="med" len="med"/>
+                      <a:tailEnd type="none" w="med" len="med"/>
+                    </a:lnL>
+                    <a:lnR w="12700" cap="flat" cmpd="sng" algn="ctr">
+                      <a:solidFill>
+                        <a:schemeClr val="tx1"/>
+                      </a:solidFill>
+                      <a:prstDash val="solid"/>
+                      <a:round/>
+                      <a:headEnd type="none" w="med" len="med"/>
+                      <a:tailEnd type="none" w="med" len="med"/>
+                    </a:lnR>
+                    <a:lnT w="12700" cap="flat" cmpd="sng" algn="ctr">
+                      <a:solidFill>
+                        <a:schemeClr val="tx1"/>
+                      </a:solidFill>
+                      <a:prstDash val="solid"/>
+                      <a:round/>
+                      <a:headEnd type="none" w="med" len="med"/>
+                      <a:tailEnd type="none" w="med" len="med"/>
+                    </a:lnT>
+                    <a:lnB w="12700" cap="flat" cmpd="sng" algn="ctr">
+                      <a:solidFill>
+                        <a:schemeClr val="tx1"/>
+                      </a:solidFill>
+                      <a:prstDash val="solid"/>
+                      <a:round/>
+                      <a:headEnd type="none" w="med" len="med"/>
+                      <a:tailEnd type="none" w="med" len="med"/>
+                    </a:lnB>
+                    <a:lnTlToBr w="12700" cmpd="sng">
+                      <a:noFill/>
+                      <a:prstDash val="solid"/>
+                    </a:lnTlToBr>
+                    <a:lnBlToTr w="12700" cmpd="sng">
+                      <a:noFill/>
+                      <a:prstDash val="solid"/>
+                    </a:lnBlToTr>
+                    <a:solidFill>
+                      <a:schemeClr val="bg1"/>
+                    </a:solidFill>
+                  </a:tcPr>
+                </a:tc>
+                <a:extLst>
+                  <a:ext uri="{0D108BD9-81ED-4DB2-BD59-A6C34878D82A}">
+                    <a16:rowId xmlns:a16="http://schemas.microsoft.com/office/drawing/2014/main" val="221982828"/>
+                  </a:ext>
+                </a:extLst>
+              </a:tr>
+            </a:tbl>
+          </a:graphicData>
+        </a:graphic>
+      </p:graphicFrame>
+      <p:graphicFrame>
+        <p:nvGraphicFramePr>
+          <p:cNvPr id="3" name="Table 5">
+            <a:extLst>
+              <a:ext uri="{FF2B5EF4-FFF2-40B4-BE49-F238E27FC236}">
+                <a16:creationId xmlns:a16="http://schemas.microsoft.com/office/drawing/2014/main" id="{D9EF875C-27EC-4988-BAAC-1E89CD25B54A}"/>
+              </a:ext>
+            </a:extLst>
+          </p:cNvPr>
+          <p:cNvGraphicFramePr>
+            <a:graphicFrameLocks noGrp="1"/>
+          </p:cNvGraphicFramePr>
+          <p:nvPr>
+            <p:extLst>
+              <p:ext uri="{D42A27DB-BD31-4B8C-83A1-F6EECF244321}">
+                <p14:modId xmlns:p14="http://schemas.microsoft.com/office/powerpoint/2010/main" val="76297242"/>
+              </p:ext>
+            </p:extLst>
+          </p:nvPr>
+        </p:nvGraphicFramePr>
+        <p:xfrm>
+          <a:off x="7427741" y="3217253"/>
+          <a:ext cx="3642751" cy="1828800"/>
+        </p:xfrm>
+        <a:graphic>
+          <a:graphicData uri="http://schemas.openxmlformats.org/drawingml/2006/table">
+            <a:tbl>
+              <a:tblPr firstRow="1" bandRow="1">
+                <a:tableStyleId>{5C22544A-7EE6-4342-B048-85BDC9FD1C3A}</a:tableStyleId>
+              </a:tblPr>
+              <a:tblGrid>
+                <a:gridCol w="3642751">
+                  <a:extLst>
+                    <a:ext uri="{9D8B030D-6E8A-4147-A177-3AD203B41FA5}">
+                      <a16:colId xmlns:a16="http://schemas.microsoft.com/office/drawing/2014/main" val="1714484541"/>
+                    </a:ext>
+                  </a:extLst>
+                </a:gridCol>
+              </a:tblGrid>
+              <a:tr h="370840">
+                <a:tc>
+                  <a:txBody>
+                    <a:bodyPr/>
+                    <a:lstStyle/>
+                    <a:p>
+                      <a:pPr algn="ctr"/>
+                      <a:r>
+                        <a:rPr lang="en-US" sz="2400" b="0" dirty="0" err="1">
+                          <a:solidFill>
+                            <a:schemeClr val="tx1"/>
+                          </a:solidFill>
+                          <a:latin typeface="Times New Roman" panose="02020603050405020304" pitchFamily="18" charset="0"/>
+                          <a:cs typeface="Times New Roman" panose="02020603050405020304" pitchFamily="18" charset="0"/>
+                        </a:rPr>
+                        <a:t>Thông</a:t>
+                      </a:r>
+                      <a:r>
+                        <a:rPr lang="en-US" sz="2400" b="0" dirty="0">
+                          <a:solidFill>
+                            <a:schemeClr val="tx1"/>
+                          </a:solidFill>
+                          <a:latin typeface="Times New Roman" panose="02020603050405020304" pitchFamily="18" charset="0"/>
+                          <a:cs typeface="Times New Roman" panose="02020603050405020304" pitchFamily="18" charset="0"/>
+                        </a:rPr>
+                        <a:t> tin </a:t>
+                      </a:r>
+                      <a:r>
+                        <a:rPr lang="en-US" sz="2400" b="0" dirty="0" err="1">
+                          <a:solidFill>
+                            <a:schemeClr val="tx1"/>
+                          </a:solidFill>
+                          <a:latin typeface="Times New Roman" panose="02020603050405020304" pitchFamily="18" charset="0"/>
+                          <a:cs typeface="Times New Roman" panose="02020603050405020304" pitchFamily="18" charset="0"/>
+                        </a:rPr>
+                        <a:t>thông</a:t>
+                      </a:r>
+                      <a:r>
+                        <a:rPr lang="en-US" sz="2400" b="0" dirty="0">
+                          <a:solidFill>
+                            <a:schemeClr val="tx1"/>
+                          </a:solidFill>
+                          <a:latin typeface="Times New Roman" panose="02020603050405020304" pitchFamily="18" charset="0"/>
+                          <a:cs typeface="Times New Roman" panose="02020603050405020304" pitchFamily="18" charset="0"/>
+                        </a:rPr>
+                        <a:t> </a:t>
+                      </a:r>
+                      <a:r>
+                        <a:rPr lang="en-US" sz="2400" b="0" dirty="0" err="1">
+                          <a:solidFill>
+                            <a:schemeClr val="tx1"/>
+                          </a:solidFill>
+                          <a:latin typeface="Times New Roman" panose="02020603050405020304" pitchFamily="18" charset="0"/>
+                          <a:cs typeface="Times New Roman" panose="02020603050405020304" pitchFamily="18" charset="0"/>
+                        </a:rPr>
+                        <a:t>báo</a:t>
+                      </a:r>
+                      <a:endParaRPr lang="en-US" sz="2400" b="0" dirty="0">
+                        <a:solidFill>
+                          <a:schemeClr val="tx1"/>
+                        </a:solidFill>
+                        <a:latin typeface="Times New Roman" panose="02020603050405020304" pitchFamily="18" charset="0"/>
+                        <a:cs typeface="Times New Roman" panose="02020603050405020304" pitchFamily="18" charset="0"/>
+                      </a:endParaRPr>
+                    </a:p>
+                  </a:txBody>
+                  <a:tcPr>
+                    <a:lnL w="12700" cap="flat" cmpd="sng" algn="ctr">
+                      <a:solidFill>
+                        <a:schemeClr val="tx1"/>
+                      </a:solidFill>
+                      <a:prstDash val="solid"/>
+                      <a:round/>
+                      <a:headEnd type="none" w="med" len="med"/>
+                      <a:tailEnd type="none" w="med" len="med"/>
+                    </a:lnL>
+                    <a:lnR w="12700" cap="flat" cmpd="sng" algn="ctr">
+                      <a:solidFill>
+                        <a:schemeClr val="tx1"/>
+                      </a:solidFill>
+                      <a:prstDash val="solid"/>
+                      <a:round/>
+                      <a:headEnd type="none" w="med" len="med"/>
+                      <a:tailEnd type="none" w="med" len="med"/>
+                    </a:lnR>
+                    <a:lnT w="12700" cap="flat" cmpd="sng" algn="ctr">
+                      <a:solidFill>
+                        <a:schemeClr val="tx1"/>
+                      </a:solidFill>
+                      <a:prstDash val="solid"/>
+                      <a:round/>
+                      <a:headEnd type="none" w="med" len="med"/>
+                      <a:tailEnd type="none" w="med" len="med"/>
+                    </a:lnT>
+                    <a:lnB w="12700" cap="flat" cmpd="sng" algn="ctr">
+                      <a:solidFill>
+                        <a:schemeClr val="tx1"/>
+                      </a:solidFill>
+                      <a:prstDash val="solid"/>
+                      <a:round/>
+                      <a:headEnd type="none" w="med" len="med"/>
+                      <a:tailEnd type="none" w="med" len="med"/>
+                    </a:lnB>
+                    <a:solidFill>
+                      <a:schemeClr val="bg1"/>
+                    </a:solidFill>
+                  </a:tcPr>
+                </a:tc>
+                <a:extLst>
+                  <a:ext uri="{0D108BD9-81ED-4DB2-BD59-A6C34878D82A}">
+                    <a16:rowId xmlns:a16="http://schemas.microsoft.com/office/drawing/2014/main" val="1392696490"/>
+                  </a:ext>
+                </a:extLst>
+              </a:tr>
+              <a:tr h="370840">
+                <a:tc>
+                  <a:txBody>
+                    <a:bodyPr/>
+                    <a:lstStyle/>
+                    <a:p>
+                      <a:pPr algn="ctr"/>
+                      <a:r>
+                        <a:rPr lang="en-US" sz="2400" dirty="0" err="1">
+                          <a:latin typeface="Times New Roman" panose="02020603050405020304" pitchFamily="18" charset="0"/>
+                          <a:cs typeface="Times New Roman" panose="02020603050405020304" pitchFamily="18" charset="0"/>
+                        </a:rPr>
+                        <a:t>Nút</a:t>
+                      </a:r>
+                      <a:r>
+                        <a:rPr lang="en-US" sz="2400" dirty="0">
+                          <a:latin typeface="Times New Roman" panose="02020603050405020304" pitchFamily="18" charset="0"/>
+                          <a:cs typeface="Times New Roman" panose="02020603050405020304" pitchFamily="18" charset="0"/>
+                        </a:rPr>
+                        <a:t> </a:t>
+                      </a:r>
+                      <a:r>
+                        <a:rPr lang="en-US" sz="2400" dirty="0" err="1">
+                          <a:latin typeface="Times New Roman" panose="02020603050405020304" pitchFamily="18" charset="0"/>
+                          <a:cs typeface="Times New Roman" panose="02020603050405020304" pitchFamily="18" charset="0"/>
+                        </a:rPr>
+                        <a:t>nhấn</a:t>
+                      </a:r>
+                      <a:endParaRPr lang="en-US" sz="2400" dirty="0">
+                        <a:latin typeface="Times New Roman" panose="02020603050405020304" pitchFamily="18" charset="0"/>
+                        <a:cs typeface="Times New Roman" panose="02020603050405020304" pitchFamily="18" charset="0"/>
+                      </a:endParaRPr>
+                    </a:p>
+                  </a:txBody>
+                  <a:tcPr>
+                    <a:lnL w="12700" cap="flat" cmpd="sng" algn="ctr">
+                      <a:solidFill>
+                        <a:schemeClr val="tx1"/>
+                      </a:solidFill>
+                      <a:prstDash val="solid"/>
+                      <a:round/>
+                      <a:headEnd type="none" w="med" len="med"/>
+                      <a:tailEnd type="none" w="med" len="med"/>
+                    </a:lnL>
+                    <a:lnR w="12700" cap="flat" cmpd="sng" algn="ctr">
+                      <a:solidFill>
+                        <a:schemeClr val="tx1"/>
+                      </a:solidFill>
+                      <a:prstDash val="solid"/>
+                      <a:round/>
+                      <a:headEnd type="none" w="med" len="med"/>
+                      <a:tailEnd type="none" w="med" len="med"/>
+                    </a:lnR>
+                    <a:lnT w="12700" cap="flat" cmpd="sng" algn="ctr">
+                      <a:solidFill>
+                        <a:schemeClr val="tx1"/>
+                      </a:solidFill>
+                      <a:prstDash val="solid"/>
+                      <a:round/>
+                      <a:headEnd type="none" w="med" len="med"/>
+                      <a:tailEnd type="none" w="med" len="med"/>
+                    </a:lnT>
+                    <a:lnB w="12700" cap="flat" cmpd="sng" algn="ctr">
+                      <a:solidFill>
+                        <a:schemeClr val="tx1"/>
+                      </a:solidFill>
+                      <a:prstDash val="solid"/>
+                      <a:round/>
+                      <a:headEnd type="none" w="med" len="med"/>
+                      <a:tailEnd type="none" w="med" len="med"/>
+                    </a:lnB>
+                    <a:solidFill>
+                      <a:schemeClr val="bg1"/>
+                    </a:solidFill>
+                  </a:tcPr>
+                </a:tc>
+                <a:extLst>
+                  <a:ext uri="{0D108BD9-81ED-4DB2-BD59-A6C34878D82A}">
+                    <a16:rowId xmlns:a16="http://schemas.microsoft.com/office/drawing/2014/main" val="3073771927"/>
+                  </a:ext>
+                </a:extLst>
+              </a:tr>
+              <a:tr h="370840">
+                <a:tc>
+                  <a:txBody>
+                    <a:bodyPr/>
+                    <a:lstStyle/>
+                    <a:p>
+                      <a:pPr algn="ctr"/>
+                      <a:r>
+                        <a:rPr lang="en-US" sz="2400" dirty="0" err="1">
+                          <a:latin typeface="Times New Roman" panose="02020603050405020304" pitchFamily="18" charset="0"/>
+                          <a:cs typeface="Times New Roman" panose="02020603050405020304" pitchFamily="18" charset="0"/>
+                        </a:rPr>
+                        <a:t>Nút</a:t>
+                      </a:r>
+                      <a:r>
+                        <a:rPr lang="en-US" sz="2400" dirty="0">
+                          <a:latin typeface="Times New Roman" panose="02020603050405020304" pitchFamily="18" charset="0"/>
+                          <a:cs typeface="Times New Roman" panose="02020603050405020304" pitchFamily="18" charset="0"/>
+                        </a:rPr>
+                        <a:t> </a:t>
+                      </a:r>
+                      <a:r>
+                        <a:rPr lang="en-US" sz="2400" dirty="0" err="1">
+                          <a:latin typeface="Times New Roman" panose="02020603050405020304" pitchFamily="18" charset="0"/>
+                          <a:cs typeface="Times New Roman" panose="02020603050405020304" pitchFamily="18" charset="0"/>
+                        </a:rPr>
+                        <a:t>nhấn</a:t>
+                      </a:r>
+                      <a:endParaRPr lang="en-US" sz="2400" dirty="0">
+                        <a:latin typeface="Times New Roman" panose="02020603050405020304" pitchFamily="18" charset="0"/>
+                        <a:cs typeface="Times New Roman" panose="02020603050405020304" pitchFamily="18" charset="0"/>
+                      </a:endParaRPr>
+                    </a:p>
+                  </a:txBody>
+                  <a:tcPr>
+                    <a:lnL w="12700" cap="flat" cmpd="sng" algn="ctr">
+                      <a:solidFill>
+                        <a:schemeClr val="tx1"/>
+                      </a:solidFill>
+                      <a:prstDash val="solid"/>
+                      <a:round/>
+                      <a:headEnd type="none" w="med" len="med"/>
+                      <a:tailEnd type="none" w="med" len="med"/>
+                    </a:lnL>
+                    <a:lnR w="12700" cap="flat" cmpd="sng" algn="ctr">
+                      <a:solidFill>
+                        <a:schemeClr val="tx1"/>
+                      </a:solidFill>
+                      <a:prstDash val="solid"/>
+                      <a:round/>
+                      <a:headEnd type="none" w="med" len="med"/>
+                      <a:tailEnd type="none" w="med" len="med"/>
+                    </a:lnR>
+                    <a:lnT w="12700" cap="flat" cmpd="sng" algn="ctr">
+                      <a:solidFill>
+                        <a:schemeClr val="tx1"/>
+                      </a:solidFill>
+                      <a:prstDash val="solid"/>
+                      <a:round/>
+                      <a:headEnd type="none" w="med" len="med"/>
+                      <a:tailEnd type="none" w="med" len="med"/>
+                    </a:lnT>
+                    <a:lnB w="12700" cap="flat" cmpd="sng" algn="ctr">
+                      <a:solidFill>
+                        <a:schemeClr val="tx1"/>
+                      </a:solidFill>
+                      <a:prstDash val="solid"/>
+                      <a:round/>
+                      <a:headEnd type="none" w="med" len="med"/>
+                      <a:tailEnd type="none" w="med" len="med"/>
+                    </a:lnB>
+                    <a:solidFill>
+                      <a:schemeClr val="bg1"/>
+                    </a:solidFill>
+                  </a:tcPr>
+                </a:tc>
+                <a:extLst>
+                  <a:ext uri="{0D108BD9-81ED-4DB2-BD59-A6C34878D82A}">
+                    <a16:rowId xmlns:a16="http://schemas.microsoft.com/office/drawing/2014/main" val="2696152367"/>
+                  </a:ext>
+                </a:extLst>
+              </a:tr>
+              <a:tr h="370840">
+                <a:tc>
+                  <a:txBody>
+                    <a:bodyPr/>
+                    <a:lstStyle/>
+                    <a:p>
+                      <a:pPr algn="ctr"/>
+                      <a:r>
+                        <a:rPr lang="en-US" sz="2400" dirty="0" err="1">
+                          <a:latin typeface="Times New Roman" panose="02020603050405020304" pitchFamily="18" charset="0"/>
+                          <a:cs typeface="Times New Roman" panose="02020603050405020304" pitchFamily="18" charset="0"/>
+                        </a:rPr>
+                        <a:t>Nút</a:t>
+                      </a:r>
+                      <a:r>
+                        <a:rPr lang="en-US" sz="2400" dirty="0">
+                          <a:latin typeface="Times New Roman" panose="02020603050405020304" pitchFamily="18" charset="0"/>
+                          <a:cs typeface="Times New Roman" panose="02020603050405020304" pitchFamily="18" charset="0"/>
+                        </a:rPr>
+                        <a:t> </a:t>
+                      </a:r>
+                      <a:r>
+                        <a:rPr lang="en-US" sz="2400" dirty="0" err="1">
+                          <a:latin typeface="Times New Roman" panose="02020603050405020304" pitchFamily="18" charset="0"/>
+                          <a:cs typeface="Times New Roman" panose="02020603050405020304" pitchFamily="18" charset="0"/>
+                        </a:rPr>
+                        <a:t>nhấn</a:t>
+                      </a:r>
+                      <a:endParaRPr lang="en-US" sz="2400" dirty="0">
+                        <a:latin typeface="Times New Roman" panose="02020603050405020304" pitchFamily="18" charset="0"/>
+                        <a:cs typeface="Times New Roman" panose="02020603050405020304" pitchFamily="18" charset="0"/>
+                      </a:endParaRPr>
+                    </a:p>
+                  </a:txBody>
+                  <a:tcPr>
+                    <a:lnL w="12700" cap="flat" cmpd="sng" algn="ctr">
+                      <a:solidFill>
+                        <a:schemeClr val="tx1"/>
+                      </a:solidFill>
+                      <a:prstDash val="solid"/>
+                      <a:round/>
+                      <a:headEnd type="none" w="med" len="med"/>
+                      <a:tailEnd type="none" w="med" len="med"/>
+                    </a:lnL>
+                    <a:lnR w="12700" cap="flat" cmpd="sng" algn="ctr">
+                      <a:solidFill>
+                        <a:schemeClr val="tx1"/>
+                      </a:solidFill>
+                      <a:prstDash val="solid"/>
+                      <a:round/>
+                      <a:headEnd type="none" w="med" len="med"/>
+                      <a:tailEnd type="none" w="med" len="med"/>
+                    </a:lnR>
+                    <a:lnT w="12700" cap="flat" cmpd="sng" algn="ctr">
+                      <a:solidFill>
+                        <a:schemeClr val="tx1"/>
+                      </a:solidFill>
+                      <a:prstDash val="solid"/>
+                      <a:round/>
+                      <a:headEnd type="none" w="med" len="med"/>
+                      <a:tailEnd type="none" w="med" len="med"/>
+                    </a:lnT>
+                    <a:lnB w="12700" cap="flat" cmpd="sng" algn="ctr">
+                      <a:solidFill>
+                        <a:schemeClr val="tx1"/>
+                      </a:solidFill>
+                      <a:prstDash val="solid"/>
+                      <a:round/>
+                      <a:headEnd type="none" w="med" len="med"/>
+                      <a:tailEnd type="none" w="med" len="med"/>
+                    </a:lnB>
+                    <a:solidFill>
+                      <a:schemeClr val="bg1"/>
+                    </a:solidFill>
+                  </a:tcPr>
+                </a:tc>
+                <a:extLst>
+                  <a:ext uri="{0D108BD9-81ED-4DB2-BD59-A6C34878D82A}">
+                    <a16:rowId xmlns:a16="http://schemas.microsoft.com/office/drawing/2014/main" val="4229960651"/>
+                  </a:ext>
+                </a:extLst>
+              </a:tr>
+            </a:tbl>
+          </a:graphicData>
+        </a:graphic>
+      </p:graphicFrame>
+    </p:spTree>
+    <p:extLst>
+      <p:ext uri="{BB962C8B-B14F-4D97-AF65-F5344CB8AC3E}">
+        <p14:creationId xmlns:p14="http://schemas.microsoft.com/office/powerpoint/2010/main" val="2258938354"/>
+      </p:ext>
+    </p:extLst>
+  </p:cSld>
+  <p:clrMapOvr>
+    <a:masterClrMapping/>
+  </p:clrMapOvr>
+</p:sld>
+</file>
+
+<file path=ppt/slides/slide23.xml><?xml version="1.0" encoding="utf-8"?>
 <p:sld xmlns:a="http://schemas.openxmlformats.org/drawingml/2006/main" xmlns:r="http://schemas.openxmlformats.org/officeDocument/2006/relationships" xmlns:p="http://schemas.openxmlformats.org/presentationml/2006/main">
   <p:cSld>
     <p:spTree>
@@ -6459,6 +9420,101 @@
                 <a:latin typeface="Times New Roman" panose="02020603050405020304" pitchFamily="18" charset="0"/>
                 <a:cs typeface="Times New Roman" panose="02020603050405020304" pitchFamily="18" charset="0"/>
               </a:rPr>
+              <a:t>Hình ảnh thực tế thiết bị</a:t>
+            </a:r>
+          </a:p>
+        </p:txBody>
+      </p:sp>
+    </p:spTree>
+    <p:extLst>
+      <p:ext uri="{BB962C8B-B14F-4D97-AF65-F5344CB8AC3E}">
+        <p14:creationId xmlns:p14="http://schemas.microsoft.com/office/powerpoint/2010/main" val="1167103189"/>
+      </p:ext>
+    </p:extLst>
+  </p:cSld>
+  <p:clrMapOvr>
+    <a:masterClrMapping/>
+  </p:clrMapOvr>
+</p:sld>
+</file>
+
+<file path=ppt/slides/slide24.xml><?xml version="1.0" encoding="utf-8"?>
+<p:sld xmlns:a="http://schemas.openxmlformats.org/drawingml/2006/main" xmlns:r="http://schemas.openxmlformats.org/officeDocument/2006/relationships" xmlns:p="http://schemas.openxmlformats.org/presentationml/2006/main">
+  <p:cSld>
+    <p:spTree>
+      <p:nvGrpSpPr>
+        <p:cNvPr id="1" name=""/>
+        <p:cNvGrpSpPr/>
+        <p:nvPr/>
+      </p:nvGrpSpPr>
+      <p:grpSpPr>
+        <a:xfrm>
+          <a:off x="0" y="0"/>
+          <a:ext cx="0" cy="0"/>
+          <a:chOff x="0" y="0"/>
+          <a:chExt cx="0" cy="0"/>
+        </a:xfrm>
+      </p:grpSpPr>
+      <p:sp>
+        <p:nvSpPr>
+          <p:cNvPr id="2" name="Title 1">
+            <a:extLst>
+              <a:ext uri="{FF2B5EF4-FFF2-40B4-BE49-F238E27FC236}">
+                <a16:creationId xmlns:a16="http://schemas.microsoft.com/office/drawing/2014/main" id="{8B65ABA9-3A9F-4099-8578-57D4D650E31B}"/>
+              </a:ext>
+            </a:extLst>
+          </p:cNvPr>
+          <p:cNvSpPr>
+            <a:spLocks noGrp="1"/>
+          </p:cNvSpPr>
+          <p:nvPr>
+            <p:ph type="title"/>
+          </p:nvPr>
+        </p:nvSpPr>
+        <p:spPr/>
+        <p:txBody>
+          <a:bodyPr/>
+          <a:lstStyle/>
+          <a:p>
+            <a:r>
+              <a:rPr lang="en-US">
+                <a:latin typeface="Times New Roman" panose="02020603050405020304" pitchFamily="18" charset="0"/>
+                <a:cs typeface="Times New Roman" panose="02020603050405020304" pitchFamily="18" charset="0"/>
+              </a:rPr>
+              <a:t>3. Mô hình và kết quả thu được</a:t>
+            </a:r>
+          </a:p>
+        </p:txBody>
+      </p:sp>
+      <p:sp>
+        <p:nvSpPr>
+          <p:cNvPr id="3" name="Text Placeholder 2">
+            <a:extLst>
+              <a:ext uri="{FF2B5EF4-FFF2-40B4-BE49-F238E27FC236}">
+                <a16:creationId xmlns:a16="http://schemas.microsoft.com/office/drawing/2014/main" id="{B6727247-66AD-433E-8800-8F419499CF86}"/>
+              </a:ext>
+            </a:extLst>
+          </p:cNvPr>
+          <p:cNvSpPr>
+            <a:spLocks noGrp="1"/>
+          </p:cNvSpPr>
+          <p:nvPr>
+            <p:ph type="body" sz="quarter" idx="10"/>
+          </p:nvPr>
+        </p:nvSpPr>
+        <p:spPr/>
+        <p:txBody>
+          <a:bodyPr/>
+          <a:lstStyle/>
+          <a:p>
+            <a:pPr marL="0" indent="0">
+              <a:buNone/>
+            </a:pPr>
+            <a:r>
+              <a:rPr lang="en-US">
+                <a:latin typeface="Times New Roman" panose="02020603050405020304" pitchFamily="18" charset="0"/>
+                <a:cs typeface="Times New Roman" panose="02020603050405020304" pitchFamily="18" charset="0"/>
+              </a:rPr>
               <a:t>Giao diện ứng dụng điều khiển</a:t>
             </a:r>
           </a:p>
@@ -6477,7 +9533,7 @@
 </p:sld>
 </file>
 
-<file path=ppt/slides/slide22.xml><?xml version="1.0" encoding="utf-8"?>
+<file path=ppt/slides/slide25.xml><?xml version="1.0" encoding="utf-8"?>
 <p:sld xmlns:a="http://schemas.openxmlformats.org/drawingml/2006/main" xmlns:r="http://schemas.openxmlformats.org/officeDocument/2006/relationships" xmlns:p="http://schemas.openxmlformats.org/presentationml/2006/main">
   <p:cSld>
     <p:spTree>
@@ -6571,7 +9627,7 @@
 </p:sld>
 </file>
 
-<file path=ppt/slides/slide23.xml><?xml version="1.0" encoding="utf-8"?>
+<file path=ppt/slides/slide26.xml><?xml version="1.0" encoding="utf-8"?>
 <p:sld xmlns:a="http://schemas.openxmlformats.org/drawingml/2006/main" xmlns:r="http://schemas.openxmlformats.org/officeDocument/2006/relationships" xmlns:p="http://schemas.openxmlformats.org/presentationml/2006/main">
   <p:cSld>
     <p:spTree>
@@ -9907,7 +12963,12 @@
             <p:ph sz="quarter" idx="10"/>
           </p:nvPr>
         </p:nvSpPr>
-        <p:spPr/>
+        <p:spPr>
+          <a:xfrm>
+            <a:off x="338736" y="1058844"/>
+            <a:ext cx="6188673" cy="4909124"/>
+          </a:xfrm>
+        </p:spPr>
         <p:txBody>
           <a:bodyPr/>
           <a:lstStyle/>
@@ -9967,6 +13028,53 @@
           </a:p>
         </p:txBody>
       </p:sp>
+      <p:pic>
+        <p:nvPicPr>
+          <p:cNvPr id="1026" name="Picture 2" descr="Triac 25A 800V Type BTA24-800BWRG, Grieder Elektronik Bauteile AG">
+            <a:extLst>
+              <a:ext uri="{FF2B5EF4-FFF2-40B4-BE49-F238E27FC236}">
+                <a16:creationId xmlns:a16="http://schemas.microsoft.com/office/drawing/2014/main" id="{468F2475-8A21-47E2-BDAA-5DC3104C98B3}"/>
+              </a:ext>
+            </a:extLst>
+          </p:cNvPr>
+          <p:cNvPicPr>
+            <a:picLocks noChangeAspect="1" noChangeArrowheads="1"/>
+          </p:cNvPicPr>
+          <p:nvPr/>
+        </p:nvPicPr>
+        <p:blipFill>
+          <a:blip r:embed="rId2">
+            <a:extLst>
+              <a:ext uri="{28A0092B-C50C-407E-A947-70E740481C1C}">
+                <a14:useLocalDpi xmlns:a14="http://schemas.microsoft.com/office/drawing/2010/main" val="0"/>
+              </a:ext>
+            </a:extLst>
+          </a:blip>
+          <a:srcRect/>
+          <a:stretch>
+            <a:fillRect/>
+          </a:stretch>
+        </p:blipFill>
+        <p:spPr bwMode="auto">
+          <a:xfrm>
+            <a:off x="6703923" y="1408653"/>
+            <a:ext cx="5050867" cy="4040694"/>
+          </a:xfrm>
+          <a:prstGeom prst="rect">
+            <a:avLst/>
+          </a:prstGeom>
+          <a:noFill/>
+          <a:extLst>
+            <a:ext uri="{909E8E84-426E-40DD-AFC4-6F175D3DCCD1}">
+              <a14:hiddenFill xmlns:a14="http://schemas.microsoft.com/office/drawing/2010/main">
+                <a:solidFill>
+                  <a:srgbClr val="FFFFFF"/>
+                </a:solidFill>
+              </a14:hiddenFill>
+            </a:ext>
+          </a:extLst>
+        </p:spPr>
+      </p:pic>
     </p:spTree>
     <p:extLst>
       <p:ext uri="{BB962C8B-B14F-4D97-AF65-F5344CB8AC3E}">
@@ -10013,7 +13121,12 @@
             <p:ph sz="quarter" idx="10"/>
           </p:nvPr>
         </p:nvSpPr>
-        <p:spPr/>
+        <p:spPr>
+          <a:xfrm>
+            <a:off x="338736" y="1058844"/>
+            <a:ext cx="6273079" cy="4909124"/>
+          </a:xfrm>
+        </p:spPr>
         <p:txBody>
           <a:bodyPr/>
           <a:lstStyle/>
@@ -10022,13 +13135,55 @@
               <a:buNone/>
             </a:pPr>
             <a:r>
-              <a:rPr lang="en-US">
-                <a:latin typeface="Times New Roman" panose="02020603050405020304" pitchFamily="18" charset="0"/>
-                <a:cs typeface="Times New Roman" panose="02020603050405020304" pitchFamily="18" charset="0"/>
-              </a:rPr>
-              <a:t>IC lái Triac (Triac Driver)</a:t>
-            </a:r>
-            <a:endParaRPr lang="vi-VN">
+              <a:rPr lang="en-US" dirty="0">
+                <a:latin typeface="Times New Roman" panose="02020603050405020304" pitchFamily="18" charset="0"/>
+                <a:cs typeface="Times New Roman" panose="02020603050405020304" pitchFamily="18" charset="0"/>
+              </a:rPr>
+              <a:t>IC </a:t>
+            </a:r>
+            <a:r>
+              <a:rPr lang="en-US" dirty="0" err="1">
+                <a:latin typeface="Times New Roman" panose="02020603050405020304" pitchFamily="18" charset="0"/>
+                <a:cs typeface="Times New Roman" panose="02020603050405020304" pitchFamily="18" charset="0"/>
+              </a:rPr>
+              <a:t>lái</a:t>
+            </a:r>
+            <a:r>
+              <a:rPr lang="en-US" dirty="0">
+                <a:latin typeface="Times New Roman" panose="02020603050405020304" pitchFamily="18" charset="0"/>
+                <a:cs typeface="Times New Roman" panose="02020603050405020304" pitchFamily="18" charset="0"/>
+              </a:rPr>
+              <a:t> </a:t>
+            </a:r>
+            <a:r>
+              <a:rPr lang="en-US" dirty="0" err="1">
+                <a:latin typeface="Times New Roman" panose="02020603050405020304" pitchFamily="18" charset="0"/>
+                <a:cs typeface="Times New Roman" panose="02020603050405020304" pitchFamily="18" charset="0"/>
+              </a:rPr>
+              <a:t>Triac</a:t>
+            </a:r>
+            <a:r>
+              <a:rPr lang="en-US" dirty="0">
+                <a:latin typeface="Times New Roman" panose="02020603050405020304" pitchFamily="18" charset="0"/>
+                <a:cs typeface="Times New Roman" panose="02020603050405020304" pitchFamily="18" charset="0"/>
+              </a:rPr>
+              <a:t> (</a:t>
+            </a:r>
+            <a:r>
+              <a:rPr lang="en-US" dirty="0" err="1">
+                <a:latin typeface="Times New Roman" panose="02020603050405020304" pitchFamily="18" charset="0"/>
+                <a:cs typeface="Times New Roman" panose="02020603050405020304" pitchFamily="18" charset="0"/>
+              </a:rPr>
+              <a:t>Triac</a:t>
+            </a:r>
+            <a:r>
+              <a:rPr lang="en-US" dirty="0">
+                <a:latin typeface="Times New Roman" panose="02020603050405020304" pitchFamily="18" charset="0"/>
+                <a:cs typeface="Times New Roman" panose="02020603050405020304" pitchFamily="18" charset="0"/>
+              </a:rPr>
+              <a:t> Driver)</a:t>
+            </a:r>
+            <a:endParaRPr lang="vi-VN" dirty="0">
               <a:latin typeface="Times New Roman" panose="02020603050405020304" pitchFamily="18" charset="0"/>
               <a:cs typeface="Times New Roman" panose="02020603050405020304" pitchFamily="18" charset="0"/>
             </a:endParaRPr>
@@ -10066,6 +13221,53 @@
           </a:p>
         </p:txBody>
       </p:sp>
+      <p:pic>
+        <p:nvPicPr>
+          <p:cNvPr id="2050" name="Picture 2" descr="MOC3020 DIP6 chất lượng - Linh Kiện 3M | ChợTrờiHN.vn | Linh Kiện Điện Tử 3M">
+            <a:extLst>
+              <a:ext uri="{FF2B5EF4-FFF2-40B4-BE49-F238E27FC236}">
+                <a16:creationId xmlns:a16="http://schemas.microsoft.com/office/drawing/2014/main" id="{50417EC7-F25E-4C40-A63F-E9D363131FF9}"/>
+              </a:ext>
+            </a:extLst>
+          </p:cNvPr>
+          <p:cNvPicPr>
+            <a:picLocks noChangeAspect="1" noChangeArrowheads="1"/>
+          </p:cNvPicPr>
+          <p:nvPr/>
+        </p:nvPicPr>
+        <p:blipFill>
+          <a:blip r:embed="rId2">
+            <a:extLst>
+              <a:ext uri="{28A0092B-C50C-407E-A947-70E740481C1C}">
+                <a14:useLocalDpi xmlns:a14="http://schemas.microsoft.com/office/drawing/2010/main" val="0"/>
+              </a:ext>
+            </a:extLst>
+          </a:blip>
+          <a:srcRect/>
+          <a:stretch>
+            <a:fillRect/>
+          </a:stretch>
+        </p:blipFill>
+        <p:spPr bwMode="auto">
+          <a:xfrm>
+            <a:off x="6096000" y="1501879"/>
+            <a:ext cx="5781363" cy="3854242"/>
+          </a:xfrm>
+          <a:prstGeom prst="rect">
+            <a:avLst/>
+          </a:prstGeom>
+          <a:noFill/>
+          <a:extLst>
+            <a:ext uri="{909E8E84-426E-40DD-AFC4-6F175D3DCCD1}">
+              <a14:hiddenFill xmlns:a14="http://schemas.microsoft.com/office/drawing/2010/main">
+                <a:solidFill>
+                  <a:srgbClr val="FFFFFF"/>
+                </a:solidFill>
+              </a14:hiddenFill>
+            </a:ext>
+          </a:extLst>
+        </p:spPr>
+      </p:pic>
     </p:spTree>
     <p:extLst>
       <p:ext uri="{BB962C8B-B14F-4D97-AF65-F5344CB8AC3E}">
@@ -11088,6 +14290,12 @@
 </file>
 
 <file path=customXml/item1.xml><?xml version="1.0" encoding="utf-8"?>
+<p:properties xmlns:p="http://schemas.microsoft.com/office/2006/metadata/properties" xmlns:xsi="http://www.w3.org/2001/XMLSchema-instance" xmlns:pc="http://schemas.microsoft.com/office/infopath/2007/PartnerControls">
+  <documentManagement/>
+</p:properties>
+</file>
+
+<file path=customXml/item2.xml><?xml version="1.0" encoding="utf-8"?>
 <ct:contentTypeSchema xmlns:ct="http://schemas.microsoft.com/office/2006/metadata/contentType" xmlns:ma="http://schemas.microsoft.com/office/2006/metadata/properties/metaAttributes" ct:_="" ma:_="" ma:contentTypeName="Document" ma:contentTypeID="0x01010029FB87B201BB164AA8F0D7E07FC18253" ma:contentTypeVersion="12" ma:contentTypeDescription="Create a new document." ma:contentTypeScope="" ma:versionID="ec75d641dd128f4ad30853614c3b4998">
   <xsd:schema xmlns:xsd="http://www.w3.org/2001/XMLSchema" xmlns:xs="http://www.w3.org/2001/XMLSchema" xmlns:p="http://schemas.microsoft.com/office/2006/metadata/properties" xmlns:ns2="c070d92c-e005-4177-a1a8-b2208be38bba" xmlns:ns3="c72df4cc-d2de-4b7e-8388-06b9b73bb217" targetNamespace="http://schemas.microsoft.com/office/2006/metadata/properties" ma:root="true" ma:fieldsID="0bd5079f3866d8fa0d2cfeac6b7a2082" ns2:_="" ns3:_="">
     <xsd:import namespace="c070d92c-e005-4177-a1a8-b2208be38bba"/>
@@ -11304,12 +14512,6 @@
 </ct:contentTypeSchema>
 </file>
 
-<file path=customXml/item2.xml><?xml version="1.0" encoding="utf-8"?>
-<p:properties xmlns:p="http://schemas.microsoft.com/office/2006/metadata/properties" xmlns:xsi="http://www.w3.org/2001/XMLSchema-instance" xmlns:pc="http://schemas.microsoft.com/office/infopath/2007/PartnerControls">
-  <documentManagement/>
-</p:properties>
-</file>
-
 <file path=customXml/item3.xml><?xml version="1.0" encoding="utf-8"?>
 <?mso-contentType ?>
 <FormTemplates xmlns="http://schemas.microsoft.com/sharepoint/v3/contenttype/forms">
@@ -11320,6 +14522,15 @@
 </file>
 
 <file path=customXml/itemProps1.xml><?xml version="1.0" encoding="utf-8"?>
+<ds:datastoreItem xmlns:ds="http://schemas.openxmlformats.org/officeDocument/2006/customXml" ds:itemID="{5666771F-238C-409E-B1DF-70481BFDE8AE}">
+  <ds:schemaRefs>
+    <ds:schemaRef ds:uri="http://schemas.microsoft.com/office/2006/metadata/properties"/>
+    <ds:schemaRef ds:uri="http://schemas.microsoft.com/office/infopath/2007/PartnerControls"/>
+  </ds:schemaRefs>
+</ds:datastoreItem>
+</file>
+
+<file path=customXml/itemProps2.xml><?xml version="1.0" encoding="utf-8"?>
 <ds:datastoreItem xmlns:ds="http://schemas.openxmlformats.org/officeDocument/2006/customXml" ds:itemID="{D2294227-C537-4C56-90F1-0A24B92707E6}">
   <ds:schemaRefs>
     <ds:schemaRef ds:uri="http://schemas.microsoft.com/office/2006/metadata/contentType"/>
@@ -11338,15 +14549,6 @@
 </ds:datastoreItem>
 </file>
 
-<file path=customXml/itemProps2.xml><?xml version="1.0" encoding="utf-8"?>
-<ds:datastoreItem xmlns:ds="http://schemas.openxmlformats.org/officeDocument/2006/customXml" ds:itemID="{5666771F-238C-409E-B1DF-70481BFDE8AE}">
-  <ds:schemaRefs>
-    <ds:schemaRef ds:uri="http://schemas.microsoft.com/office/2006/metadata/properties"/>
-    <ds:schemaRef ds:uri="http://schemas.microsoft.com/office/infopath/2007/PartnerControls"/>
-  </ds:schemaRefs>
-</ds:datastoreItem>
-</file>
-
 <file path=customXml/itemProps3.xml><?xml version="1.0" encoding="utf-8"?>
 <ds:datastoreItem xmlns:ds="http://schemas.openxmlformats.org/officeDocument/2006/customXml" ds:itemID="{69128D4C-6F8B-42B2-A3A4-DC1405FCC7A7}">
   <ds:schemaRefs>

</xml_diff>

<commit_message>
210119: update bao cao va pcb
</commit_message>
<xml_diff>
--- a/documents/20210111_NguyenTuanAnh_ppt.pptx
+++ b/documents/20210111_NguyenTuanAnh_ppt.pptx
@@ -256,7 +256,7 @@
           <a:p>
             <a:fld id="{C8EC4C12-44DC-4AF1-91BC-D6BFF5E34312}" type="datetimeFigureOut">
               <a:rPr lang="vi-VN" smtClean="0"/>
-              <a:t>14/01/2021</a:t>
+              <a:t>19/01/2021</a:t>
             </a:fld>
             <a:endParaRPr lang="vi-VN"/>
           </a:p>
@@ -3291,19 +3291,23 @@
               <a:t> </a:t>
             </a:r>
             <a:r>
-              <a:rPr lang="en-US" dirty="0" err="1">
+              <a:rPr lang="en-US" err="1">
                 <a:latin typeface="Times New Roman" panose="02020603050405020304" pitchFamily="18" charset="0"/>
                 <a:cs typeface="Times New Roman" panose="02020603050405020304" pitchFamily="18" charset="0"/>
               </a:rPr>
               <a:t>người</a:t>
             </a:r>
             <a:r>
-              <a:rPr lang="en-US" dirty="0">
-                <a:latin typeface="Times New Roman" panose="02020603050405020304" pitchFamily="18" charset="0"/>
-                <a:cs typeface="Times New Roman" panose="02020603050405020304" pitchFamily="18" charset="0"/>
-              </a:rPr>
-              <a:t> dung</a:t>
-            </a:r>
+              <a:rPr lang="en-US">
+                <a:latin typeface="Times New Roman" panose="02020603050405020304" pitchFamily="18" charset="0"/>
+                <a:cs typeface="Times New Roman" panose="02020603050405020304" pitchFamily="18" charset="0"/>
+              </a:rPr>
+              <a:t> dùng</a:t>
+            </a:r>
+            <a:endParaRPr lang="en-US" dirty="0">
+              <a:latin typeface="Times New Roman" panose="02020603050405020304" pitchFamily="18" charset="0"/>
+              <a:cs typeface="Times New Roman" panose="02020603050405020304" pitchFamily="18" charset="0"/>
+            </a:endParaRPr>
           </a:p>
           <a:p>
             <a:pPr lvl="1">
@@ -5001,6 +5005,42 @@
           </a:p>
         </p:txBody>
       </p:sp>
+      <p:pic>
+        <p:nvPicPr>
+          <p:cNvPr id="3" name="Picture 2" descr="Diagram&#10;&#10;Description automatically generated">
+            <a:extLst>
+              <a:ext uri="{FF2B5EF4-FFF2-40B4-BE49-F238E27FC236}">
+                <a16:creationId xmlns:a16="http://schemas.microsoft.com/office/drawing/2014/main" id="{C6DF8470-2175-49E9-B77D-C2F822FA1519}"/>
+              </a:ext>
+            </a:extLst>
+          </p:cNvPr>
+          <p:cNvPicPr>
+            <a:picLocks noChangeAspect="1"/>
+          </p:cNvPicPr>
+          <p:nvPr/>
+        </p:nvPicPr>
+        <p:blipFill>
+          <a:blip r:embed="rId3">
+            <a:extLst>
+              <a:ext uri="{28A0092B-C50C-407E-A947-70E740481C1C}">
+                <a14:useLocalDpi xmlns:a14="http://schemas.microsoft.com/office/drawing/2010/main" val="0"/>
+              </a:ext>
+            </a:extLst>
+          </a:blip>
+          <a:stretch>
+            <a:fillRect/>
+          </a:stretch>
+        </p:blipFill>
+        <p:spPr>
+          <a:xfrm>
+            <a:off x="3899971" y="1468046"/>
+            <a:ext cx="6389783" cy="4842055"/>
+          </a:xfrm>
+          <a:prstGeom prst="rect">
+            <a:avLst/>
+          </a:prstGeom>
+        </p:spPr>
+      </p:pic>
     </p:spTree>
     <p:extLst>
       <p:ext uri="{BB962C8B-B14F-4D97-AF65-F5344CB8AC3E}">
@@ -5263,6 +5303,42 @@
           </a:p>
         </p:txBody>
       </p:sp>
+      <p:pic>
+        <p:nvPicPr>
+          <p:cNvPr id="3" name="Picture 2" descr="Diagram&#10;&#10;Description automatically generated">
+            <a:extLst>
+              <a:ext uri="{FF2B5EF4-FFF2-40B4-BE49-F238E27FC236}">
+                <a16:creationId xmlns:a16="http://schemas.microsoft.com/office/drawing/2014/main" id="{66F068DC-D3FF-4548-B21F-51C7C45264FE}"/>
+              </a:ext>
+            </a:extLst>
+          </p:cNvPr>
+          <p:cNvPicPr>
+            <a:picLocks noChangeAspect="1"/>
+          </p:cNvPicPr>
+          <p:nvPr/>
+        </p:nvPicPr>
+        <p:blipFill>
+          <a:blip r:embed="rId3">
+            <a:extLst>
+              <a:ext uri="{28A0092B-C50C-407E-A947-70E740481C1C}">
+                <a14:useLocalDpi xmlns:a14="http://schemas.microsoft.com/office/drawing/2010/main" val="0"/>
+              </a:ext>
+            </a:extLst>
+          </a:blip>
+          <a:stretch>
+            <a:fillRect/>
+          </a:stretch>
+        </p:blipFill>
+        <p:spPr>
+          <a:xfrm>
+            <a:off x="3794516" y="1595383"/>
+            <a:ext cx="5272365" cy="4801618"/>
+          </a:xfrm>
+          <a:prstGeom prst="rect">
+            <a:avLst/>
+          </a:prstGeom>
+        </p:spPr>
+      </p:pic>
     </p:spTree>
     <p:extLst>
       <p:ext uri="{BB962C8B-B14F-4D97-AF65-F5344CB8AC3E}">
@@ -5567,6 +5643,42 @@
           </a:p>
         </p:txBody>
       </p:sp>
+      <p:pic>
+        <p:nvPicPr>
+          <p:cNvPr id="3" name="Picture 2" descr="Diagram&#10;&#10;Description automatically generated">
+            <a:extLst>
+              <a:ext uri="{FF2B5EF4-FFF2-40B4-BE49-F238E27FC236}">
+                <a16:creationId xmlns:a16="http://schemas.microsoft.com/office/drawing/2014/main" id="{4AF62B5D-6EF2-40C4-868D-0C39F567C8CE}"/>
+              </a:ext>
+            </a:extLst>
+          </p:cNvPr>
+          <p:cNvPicPr>
+            <a:picLocks noChangeAspect="1"/>
+          </p:cNvPicPr>
+          <p:nvPr/>
+        </p:nvPicPr>
+        <p:blipFill>
+          <a:blip r:embed="rId3">
+            <a:extLst>
+              <a:ext uri="{28A0092B-C50C-407E-A947-70E740481C1C}">
+                <a14:useLocalDpi xmlns:a14="http://schemas.microsoft.com/office/drawing/2010/main" val="0"/>
+              </a:ext>
+            </a:extLst>
+          </a:blip>
+          <a:stretch>
+            <a:fillRect/>
+          </a:stretch>
+        </p:blipFill>
+        <p:spPr>
+          <a:xfrm>
+            <a:off x="4402292" y="1447409"/>
+            <a:ext cx="4657487" cy="4904475"/>
+          </a:xfrm>
+          <a:prstGeom prst="rect">
+            <a:avLst/>
+          </a:prstGeom>
+        </p:spPr>
+      </p:pic>
     </p:spTree>
     <p:extLst>
       <p:ext uri="{BB962C8B-B14F-4D97-AF65-F5344CB8AC3E}">
@@ -5892,10 +6004,10 @@
       </p:sp>
       <p:pic>
         <p:nvPicPr>
-          <p:cNvPr id="3" name="Picture 2">
+          <p:cNvPr id="6" name="Picture 5" descr="Diagram&#10;&#10;Description automatically generated">
             <a:extLst>
               <a:ext uri="{FF2B5EF4-FFF2-40B4-BE49-F238E27FC236}">
-                <a16:creationId xmlns:a16="http://schemas.microsoft.com/office/drawing/2014/main" id="{2049E1E0-22B3-467E-ADB4-62721597D0DF}"/>
+                <a16:creationId xmlns:a16="http://schemas.microsoft.com/office/drawing/2014/main" id="{7B6CB88B-35A7-4CB8-83A4-C6B749F5C524}"/>
               </a:ext>
             </a:extLst>
           </p:cNvPr>
@@ -5905,15 +6017,21 @@
           <p:nvPr/>
         </p:nvPicPr>
         <p:blipFill>
-          <a:blip r:embed="rId3"/>
+          <a:blip r:embed="rId3">
+            <a:extLst>
+              <a:ext uri="{28A0092B-C50C-407E-A947-70E740481C1C}">
+                <a14:useLocalDpi xmlns:a14="http://schemas.microsoft.com/office/drawing/2010/main" val="0"/>
+              </a:ext>
+            </a:extLst>
+          </a:blip>
           <a:stretch>
             <a:fillRect/>
           </a:stretch>
         </p:blipFill>
         <p:spPr>
           <a:xfrm>
-            <a:off x="7170087" y="1732231"/>
-            <a:ext cx="4219575" cy="3562350"/>
+            <a:off x="3925972" y="2292841"/>
+            <a:ext cx="4106770" cy="3675127"/>
           </a:xfrm>
           <a:prstGeom prst="rect">
             <a:avLst/>
@@ -6224,6 +6342,42 @@
           </a:p>
         </p:txBody>
       </p:sp>
+      <p:pic>
+        <p:nvPicPr>
+          <p:cNvPr id="3" name="Picture 2" descr="Diagram&#10;&#10;Description automatically generated">
+            <a:extLst>
+              <a:ext uri="{FF2B5EF4-FFF2-40B4-BE49-F238E27FC236}">
+                <a16:creationId xmlns:a16="http://schemas.microsoft.com/office/drawing/2014/main" id="{C870C303-0C38-4DC0-95CD-E7721B68E8CF}"/>
+              </a:ext>
+            </a:extLst>
+          </p:cNvPr>
+          <p:cNvPicPr>
+            <a:picLocks noChangeAspect="1"/>
+          </p:cNvPicPr>
+          <p:nvPr/>
+        </p:nvPicPr>
+        <p:blipFill>
+          <a:blip r:embed="rId3">
+            <a:extLst>
+              <a:ext uri="{28A0092B-C50C-407E-A947-70E740481C1C}">
+                <a14:useLocalDpi xmlns:a14="http://schemas.microsoft.com/office/drawing/2010/main" val="0"/>
+              </a:ext>
+            </a:extLst>
+          </a:blip>
+          <a:stretch>
+            <a:fillRect/>
+          </a:stretch>
+        </p:blipFill>
+        <p:spPr>
+          <a:xfrm>
+            <a:off x="7814631" y="1058844"/>
+            <a:ext cx="2708030" cy="5344257"/>
+          </a:xfrm>
+          <a:prstGeom prst="rect">
+            <a:avLst/>
+          </a:prstGeom>
+        </p:spPr>
+      </p:pic>
     </p:spTree>
     <p:extLst>
       <p:ext uri="{BB962C8B-B14F-4D97-AF65-F5344CB8AC3E}">
@@ -7651,7 +7805,12 @@
             <p:ph sz="quarter" idx="10"/>
           </p:nvPr>
         </p:nvSpPr>
-        <p:spPr/>
+        <p:spPr>
+          <a:xfrm>
+            <a:off x="338736" y="1058844"/>
+            <a:ext cx="7009515" cy="4909124"/>
+          </a:xfrm>
+        </p:spPr>
         <p:txBody>
           <a:bodyPr/>
           <a:lstStyle/>
@@ -7678,6 +7837,46 @@
                 <a:cs typeface="Times New Roman" panose="02020603050405020304" pitchFamily="18" charset="0"/>
               </a:rPr>
               <a:t>Lưu đồ thuật toán:</a:t>
+            </a:r>
+          </a:p>
+          <a:p>
+            <a:pPr>
+              <a:buFontTx/>
+              <a:buChar char="-"/>
+            </a:pPr>
+            <a:r>
+              <a:rPr lang="en-US">
+                <a:latin typeface="Times New Roman" panose="02020603050405020304" pitchFamily="18" charset="0"/>
+                <a:cs typeface="Times New Roman" panose="02020603050405020304" pitchFamily="18" charset="0"/>
+              </a:rPr>
+              <a:t>Các lớp của ứng dụng điều khiển:</a:t>
+            </a:r>
+          </a:p>
+          <a:p>
+            <a:r>
+              <a:rPr lang="en-US">
+                <a:latin typeface="Times New Roman" panose="02020603050405020304" pitchFamily="18" charset="0"/>
+                <a:cs typeface="Times New Roman" panose="02020603050405020304" pitchFamily="18" charset="0"/>
+              </a:rPr>
+              <a:t>Lớp logic chính của ứng dụng</a:t>
+            </a:r>
+          </a:p>
+          <a:p>
+            <a:r>
+              <a:rPr lang="en-US">
+                <a:latin typeface="Times New Roman" panose="02020603050405020304" pitchFamily="18" charset="0"/>
+                <a:cs typeface="Times New Roman" panose="02020603050405020304" pitchFamily="18" charset="0"/>
+              </a:rPr>
+              <a:t>Lớp giao diện dạng lưới</a:t>
+            </a:r>
+          </a:p>
+          <a:p>
+            <a:r>
+              <a:rPr lang="en-US">
+                <a:latin typeface="Times New Roman" panose="02020603050405020304" pitchFamily="18" charset="0"/>
+                <a:cs typeface="Times New Roman" panose="02020603050405020304" pitchFamily="18" charset="0"/>
+              </a:rPr>
+              <a:t>Lớp giao diện cửa sổ thông báo</a:t>
             </a:r>
           </a:p>
         </p:txBody>
@@ -7698,7 +7897,12 @@
             <p:ph type="title"/>
           </p:nvPr>
         </p:nvSpPr>
-        <p:spPr/>
+        <p:spPr>
+          <a:xfrm>
+            <a:off x="338736" y="88019"/>
+            <a:ext cx="11514528" cy="436098"/>
+          </a:xfrm>
+        </p:spPr>
         <p:txBody>
           <a:bodyPr/>
           <a:lstStyle/>
@@ -7713,6 +7917,36 @@
           </a:p>
         </p:txBody>
       </p:sp>
+      <p:pic>
+        <p:nvPicPr>
+          <p:cNvPr id="9" name="Picture 8">
+            <a:extLst>
+              <a:ext uri="{FF2B5EF4-FFF2-40B4-BE49-F238E27FC236}">
+                <a16:creationId xmlns:a16="http://schemas.microsoft.com/office/drawing/2014/main" id="{AC34B164-2C2A-41D4-820D-872D78BA5A1B}"/>
+              </a:ext>
+            </a:extLst>
+          </p:cNvPr>
+          <p:cNvPicPr>
+            <a:picLocks noChangeAspect="1"/>
+          </p:cNvPicPr>
+          <p:nvPr/>
+        </p:nvPicPr>
+        <p:blipFill>
+          <a:blip r:embed="rId2"/>
+          <a:stretch>
+            <a:fillRect/>
+          </a:stretch>
+        </p:blipFill>
+        <p:spPr>
+          <a:xfrm>
+            <a:off x="7285822" y="1570144"/>
+            <a:ext cx="3716242" cy="4397824"/>
+          </a:xfrm>
+          <a:prstGeom prst="rect">
+            <a:avLst/>
+          </a:prstGeom>
+        </p:spPr>
+      </p:pic>
     </p:spTree>
     <p:extLst>
       <p:ext uri="{BB962C8B-B14F-4D97-AF65-F5344CB8AC3E}">
@@ -9400,6 +9634,42 @@
           </a:p>
         </p:txBody>
       </p:sp>
+      <p:pic>
+        <p:nvPicPr>
+          <p:cNvPr id="5" name="Picture 4" descr="A picture containing electronics, circuit&#10;&#10;Description automatically generated">
+            <a:extLst>
+              <a:ext uri="{FF2B5EF4-FFF2-40B4-BE49-F238E27FC236}">
+                <a16:creationId xmlns:a16="http://schemas.microsoft.com/office/drawing/2014/main" id="{89893CB8-F2DD-490C-9B7B-A1CB16F591F5}"/>
+              </a:ext>
+            </a:extLst>
+          </p:cNvPr>
+          <p:cNvPicPr>
+            <a:picLocks noChangeAspect="1"/>
+          </p:cNvPicPr>
+          <p:nvPr/>
+        </p:nvPicPr>
+        <p:blipFill>
+          <a:blip r:embed="rId2">
+            <a:extLst>
+              <a:ext uri="{28A0092B-C50C-407E-A947-70E740481C1C}">
+                <a14:useLocalDpi xmlns:a14="http://schemas.microsoft.com/office/drawing/2010/main" val="0"/>
+              </a:ext>
+            </a:extLst>
+          </a:blip>
+          <a:stretch>
+            <a:fillRect/>
+          </a:stretch>
+        </p:blipFill>
+        <p:spPr>
+          <a:xfrm>
+            <a:off x="3203419" y="1487517"/>
+            <a:ext cx="5783963" cy="4337973"/>
+          </a:xfrm>
+          <a:prstGeom prst="rect">
+            <a:avLst/>
+          </a:prstGeom>
+        </p:spPr>
+      </p:pic>
     </p:spTree>
     <p:extLst>
       <p:ext uri="{BB962C8B-B14F-4D97-AF65-F5344CB8AC3E}">
@@ -9495,6 +9765,78 @@
           </a:p>
         </p:txBody>
       </p:sp>
+      <p:pic>
+        <p:nvPicPr>
+          <p:cNvPr id="7" name="Picture 6" descr="Chart, treemap chart&#10;&#10;Description automatically generated">
+            <a:extLst>
+              <a:ext uri="{FF2B5EF4-FFF2-40B4-BE49-F238E27FC236}">
+                <a16:creationId xmlns:a16="http://schemas.microsoft.com/office/drawing/2014/main" id="{C02583C3-4E97-4BFB-AEC2-2D1F71E8F039}"/>
+              </a:ext>
+            </a:extLst>
+          </p:cNvPr>
+          <p:cNvPicPr>
+            <a:picLocks noChangeAspect="1"/>
+          </p:cNvPicPr>
+          <p:nvPr/>
+        </p:nvPicPr>
+        <p:blipFill>
+          <a:blip r:embed="rId2">
+            <a:extLst>
+              <a:ext uri="{28A0092B-C50C-407E-A947-70E740481C1C}">
+                <a14:useLocalDpi xmlns:a14="http://schemas.microsoft.com/office/drawing/2010/main" val="0"/>
+              </a:ext>
+            </a:extLst>
+          </a:blip>
+          <a:stretch>
+            <a:fillRect/>
+          </a:stretch>
+        </p:blipFill>
+        <p:spPr>
+          <a:xfrm>
+            <a:off x="1325524" y="1619479"/>
+            <a:ext cx="2563431" cy="4557210"/>
+          </a:xfrm>
+          <a:prstGeom prst="rect">
+            <a:avLst/>
+          </a:prstGeom>
+        </p:spPr>
+      </p:pic>
+      <p:pic>
+        <p:nvPicPr>
+          <p:cNvPr id="9" name="Picture 8" descr="Graphical user interface, application&#10;&#10;Description automatically generated">
+            <a:extLst>
+              <a:ext uri="{FF2B5EF4-FFF2-40B4-BE49-F238E27FC236}">
+                <a16:creationId xmlns:a16="http://schemas.microsoft.com/office/drawing/2014/main" id="{33EE5BA3-2664-4E4D-8725-EC8872BEDC9E}"/>
+              </a:ext>
+            </a:extLst>
+          </p:cNvPr>
+          <p:cNvPicPr>
+            <a:picLocks noChangeAspect="1"/>
+          </p:cNvPicPr>
+          <p:nvPr/>
+        </p:nvPicPr>
+        <p:blipFill>
+          <a:blip r:embed="rId3">
+            <a:extLst>
+              <a:ext uri="{28A0092B-C50C-407E-A947-70E740481C1C}">
+                <a14:useLocalDpi xmlns:a14="http://schemas.microsoft.com/office/drawing/2010/main" val="0"/>
+              </a:ext>
+            </a:extLst>
+          </a:blip>
+          <a:stretch>
+            <a:fillRect/>
+          </a:stretch>
+        </p:blipFill>
+        <p:spPr>
+          <a:xfrm>
+            <a:off x="4220917" y="1680123"/>
+            <a:ext cx="7632347" cy="4291100"/>
+          </a:xfrm>
+          <a:prstGeom prst="rect">
+            <a:avLst/>
+          </a:prstGeom>
+        </p:spPr>
+      </p:pic>
     </p:spTree>
     <p:extLst>
       <p:ext uri="{BB962C8B-B14F-4D97-AF65-F5344CB8AC3E}">
@@ -9585,7 +9927,29 @@
           <a:bodyPr/>
           <a:lstStyle/>
           <a:p>
-            <a:endParaRPr lang="vi-VN"/>
+            <a:pPr marL="0" indent="0">
+              <a:buNone/>
+            </a:pPr>
+            <a:r>
+              <a:rPr lang="en-US">
+                <a:latin typeface="Times New Roman" panose="02020603050405020304" pitchFamily="18" charset="0"/>
+                <a:cs typeface="Times New Roman" panose="02020603050405020304" pitchFamily="18" charset="0"/>
+              </a:rPr>
+              <a:t>Kết quả đồ án</a:t>
+            </a:r>
+          </a:p>
+          <a:p>
+            <a:r>
+              <a:rPr lang="en-US">
+                <a:latin typeface="Times New Roman" panose="02020603050405020304" pitchFamily="18" charset="0"/>
+                <a:cs typeface="Times New Roman" panose="02020603050405020304" pitchFamily="18" charset="0"/>
+              </a:rPr>
+              <a:t>Hoàn thành</a:t>
+            </a:r>
+            <a:endParaRPr lang="vi-VN">
+              <a:latin typeface="Times New Roman" panose="02020603050405020304" pitchFamily="18" charset="0"/>
+              <a:cs typeface="Times New Roman" panose="02020603050405020304" pitchFamily="18" charset="0"/>
+            </a:endParaRPr>
           </a:p>
         </p:txBody>
       </p:sp>
@@ -12952,18 +13316,45 @@
               <a:buNone/>
             </a:pPr>
             <a:r>
-              <a:rPr lang="en-US" dirty="0" err="1">
+              <a:rPr lang="en-US" err="1">
                 <a:latin typeface="Times New Roman" panose="02020603050405020304" pitchFamily="18" charset="0"/>
                 <a:cs typeface="Times New Roman" panose="02020603050405020304" pitchFamily="18" charset="0"/>
               </a:rPr>
               <a:t>Triac</a:t>
             </a:r>
             <a:r>
-              <a:rPr lang="en-US" dirty="0">
-                <a:latin typeface="Times New Roman" panose="02020603050405020304" pitchFamily="18" charset="0"/>
-                <a:cs typeface="Times New Roman" panose="02020603050405020304" pitchFamily="18" charset="0"/>
-              </a:rPr>
-              <a:t>: </a:t>
+              <a:rPr lang="en-US">
+                <a:latin typeface="Times New Roman" panose="02020603050405020304" pitchFamily="18" charset="0"/>
+                <a:cs typeface="Times New Roman" panose="02020603050405020304" pitchFamily="18" charset="0"/>
+              </a:rPr>
+              <a:t>:</a:t>
+            </a:r>
+          </a:p>
+          <a:p>
+            <a:r>
+              <a:rPr lang="en-US">
+                <a:latin typeface="Times New Roman" panose="02020603050405020304" pitchFamily="18" charset="0"/>
+                <a:cs typeface="Times New Roman" panose="02020603050405020304" pitchFamily="18" charset="0"/>
+              </a:rPr>
+              <a:t>Nguyên lý hoạt động</a:t>
+            </a:r>
+          </a:p>
+          <a:p>
+            <a:r>
+              <a:rPr lang="en-US">
+                <a:latin typeface="Times New Roman" panose="02020603050405020304" pitchFamily="18" charset="0"/>
+                <a:cs typeface="Times New Roman" panose="02020603050405020304" pitchFamily="18" charset="0"/>
+              </a:rPr>
+              <a:t>Đặc điểm</a:t>
+            </a:r>
+          </a:p>
+          <a:p>
+            <a:r>
+              <a:rPr lang="en-US">
+                <a:latin typeface="Times New Roman" panose="02020603050405020304" pitchFamily="18" charset="0"/>
+                <a:cs typeface="Times New Roman" panose="02020603050405020304" pitchFamily="18" charset="0"/>
+              </a:rPr>
+              <a:t>Cách điều khiển </a:t>
             </a:r>
             <a:endParaRPr lang="vi-VN" dirty="0">
               <a:latin typeface="Times New Roman" panose="02020603050405020304" pitchFamily="18" charset="0"/>
@@ -13156,7 +13547,41 @@
                 <a:latin typeface="Times New Roman" panose="02020603050405020304" pitchFamily="18" charset="0"/>
                 <a:cs typeface="Times New Roman" panose="02020603050405020304" pitchFamily="18" charset="0"/>
               </a:rPr>
-              <a:t> Driver)</a:t>
+              <a:t> </a:t>
+            </a:r>
+            <a:r>
+              <a:rPr lang="en-US">
+                <a:latin typeface="Times New Roman" panose="02020603050405020304" pitchFamily="18" charset="0"/>
+                <a:cs typeface="Times New Roman" panose="02020603050405020304" pitchFamily="18" charset="0"/>
+              </a:rPr>
+              <a:t>Driver)</a:t>
+            </a:r>
+          </a:p>
+          <a:p>
+            <a:r>
+              <a:rPr lang="en-US">
+                <a:latin typeface="Times New Roman" panose="02020603050405020304" pitchFamily="18" charset="0"/>
+                <a:cs typeface="Times New Roman" panose="02020603050405020304" pitchFamily="18" charset="0"/>
+              </a:rPr>
+              <a:t>Nguyên lý hoạt động</a:t>
+            </a:r>
+          </a:p>
+          <a:p>
+            <a:r>
+              <a:rPr lang="en-US">
+                <a:latin typeface="Times New Roman" panose="02020603050405020304" pitchFamily="18" charset="0"/>
+                <a:cs typeface="Times New Roman" panose="02020603050405020304" pitchFamily="18" charset="0"/>
+              </a:rPr>
+              <a:t>Đặc điểm</a:t>
+            </a:r>
+          </a:p>
+          <a:p>
+            <a:r>
+              <a:rPr lang="en-US">
+                <a:latin typeface="Times New Roman" panose="02020603050405020304" pitchFamily="18" charset="0"/>
+                <a:cs typeface="Times New Roman" panose="02020603050405020304" pitchFamily="18" charset="0"/>
+              </a:rPr>
+              <a:t>Cách điều khiển</a:t>
             </a:r>
             <a:endParaRPr lang="vi-VN" dirty="0">
               <a:latin typeface="Times New Roman" panose="02020603050405020304" pitchFamily="18" charset="0"/>
@@ -13330,22 +13755,19 @@
                 <a:latin typeface="Times New Roman" panose="02020603050405020304" pitchFamily="18" charset="0"/>
                 <a:cs typeface="Times New Roman" panose="02020603050405020304" pitchFamily="18" charset="0"/>
               </a:rPr>
-              <a:t>Broker, Client </a:t>
-            </a:r>
-            <a:r>
-              <a:rPr lang="en-US" dirty="0" err="1">
-                <a:latin typeface="Times New Roman" panose="02020603050405020304" pitchFamily="18" charset="0"/>
-                <a:cs typeface="Times New Roman" panose="02020603050405020304" pitchFamily="18" charset="0"/>
-              </a:rPr>
-              <a:t>và</a:t>
-            </a:r>
-            <a:r>
-              <a:rPr lang="en-US" dirty="0">
-                <a:latin typeface="Times New Roman" panose="02020603050405020304" pitchFamily="18" charset="0"/>
-                <a:cs typeface="Times New Roman" panose="02020603050405020304" pitchFamily="18" charset="0"/>
-              </a:rPr>
-              <a:t> Topic </a:t>
-            </a:r>
+              <a:t>Broker</a:t>
+            </a:r>
+            <a:r>
+              <a:rPr lang="en-US">
+                <a:latin typeface="Times New Roman" panose="02020603050405020304" pitchFamily="18" charset="0"/>
+                <a:cs typeface="Times New Roman" panose="02020603050405020304" pitchFamily="18" charset="0"/>
+              </a:rPr>
+              <a:t>, Client</a:t>
+            </a:r>
+            <a:endParaRPr lang="en-US" dirty="0">
+              <a:latin typeface="Times New Roman" panose="02020603050405020304" pitchFamily="18" charset="0"/>
+              <a:cs typeface="Times New Roman" panose="02020603050405020304" pitchFamily="18" charset="0"/>
+            </a:endParaRPr>
           </a:p>
           <a:p>
             <a:r>
@@ -13381,7 +13803,7 @@
                 <a:latin typeface="Times New Roman" panose="02020603050405020304" pitchFamily="18" charset="0"/>
                 <a:cs typeface="Times New Roman" panose="02020603050405020304" pitchFamily="18" charset="0"/>
               </a:rPr>
-              <a:t>/Subscribe</a:t>
+              <a:t>/Subscribe và Topic</a:t>
             </a:r>
           </a:p>
           <a:p>
@@ -14069,6 +14491,12 @@
 </file>
 
 <file path=customXml/item1.xml><?xml version="1.0" encoding="utf-8"?>
+<p:properties xmlns:p="http://schemas.microsoft.com/office/2006/metadata/properties" xmlns:xsi="http://www.w3.org/2001/XMLSchema-instance" xmlns:pc="http://schemas.microsoft.com/office/infopath/2007/PartnerControls">
+  <documentManagement/>
+</p:properties>
+</file>
+
+<file path=customXml/item2.xml><?xml version="1.0" encoding="utf-8"?>
 <ct:contentTypeSchema xmlns:ct="http://schemas.microsoft.com/office/2006/metadata/contentType" xmlns:ma="http://schemas.microsoft.com/office/2006/metadata/properties/metaAttributes" ct:_="" ma:_="" ma:contentTypeName="Document" ma:contentTypeID="0x01010029FB87B201BB164AA8F0D7E07FC18253" ma:contentTypeVersion="12" ma:contentTypeDescription="Create a new document." ma:contentTypeScope="" ma:versionID="ec75d641dd128f4ad30853614c3b4998">
   <xsd:schema xmlns:xsd="http://www.w3.org/2001/XMLSchema" xmlns:xs="http://www.w3.org/2001/XMLSchema" xmlns:p="http://schemas.microsoft.com/office/2006/metadata/properties" xmlns:ns2="c070d92c-e005-4177-a1a8-b2208be38bba" xmlns:ns3="c72df4cc-d2de-4b7e-8388-06b9b73bb217" targetNamespace="http://schemas.microsoft.com/office/2006/metadata/properties" ma:root="true" ma:fieldsID="0bd5079f3866d8fa0d2cfeac6b7a2082" ns2:_="" ns3:_="">
     <xsd:import namespace="c070d92c-e005-4177-a1a8-b2208be38bba"/>
@@ -14285,12 +14713,6 @@
 </ct:contentTypeSchema>
 </file>
 
-<file path=customXml/item2.xml><?xml version="1.0" encoding="utf-8"?>
-<p:properties xmlns:p="http://schemas.microsoft.com/office/2006/metadata/properties" xmlns:xsi="http://www.w3.org/2001/XMLSchema-instance" xmlns:pc="http://schemas.microsoft.com/office/infopath/2007/PartnerControls">
-  <documentManagement/>
-</p:properties>
-</file>
-
 <file path=customXml/item3.xml><?xml version="1.0" encoding="utf-8"?>
 <?mso-contentType ?>
 <FormTemplates xmlns="http://schemas.microsoft.com/sharepoint/v3/contenttype/forms">
@@ -14301,6 +14723,15 @@
 </file>
 
 <file path=customXml/itemProps1.xml><?xml version="1.0" encoding="utf-8"?>
+<ds:datastoreItem xmlns:ds="http://schemas.openxmlformats.org/officeDocument/2006/customXml" ds:itemID="{5666771F-238C-409E-B1DF-70481BFDE8AE}">
+  <ds:schemaRefs>
+    <ds:schemaRef ds:uri="http://schemas.microsoft.com/office/2006/metadata/properties"/>
+    <ds:schemaRef ds:uri="http://schemas.microsoft.com/office/infopath/2007/PartnerControls"/>
+  </ds:schemaRefs>
+</ds:datastoreItem>
+</file>
+
+<file path=customXml/itemProps2.xml><?xml version="1.0" encoding="utf-8"?>
 <ds:datastoreItem xmlns:ds="http://schemas.openxmlformats.org/officeDocument/2006/customXml" ds:itemID="{D2294227-C537-4C56-90F1-0A24B92707E6}">
   <ds:schemaRefs>
     <ds:schemaRef ds:uri="http://schemas.microsoft.com/office/2006/metadata/contentType"/>
@@ -14319,15 +14750,6 @@
 </ds:datastoreItem>
 </file>
 
-<file path=customXml/itemProps2.xml><?xml version="1.0" encoding="utf-8"?>
-<ds:datastoreItem xmlns:ds="http://schemas.openxmlformats.org/officeDocument/2006/customXml" ds:itemID="{5666771F-238C-409E-B1DF-70481BFDE8AE}">
-  <ds:schemaRefs>
-    <ds:schemaRef ds:uri="http://schemas.microsoft.com/office/2006/metadata/properties"/>
-    <ds:schemaRef ds:uri="http://schemas.microsoft.com/office/infopath/2007/PartnerControls"/>
-  </ds:schemaRefs>
-</ds:datastoreItem>
-</file>
-
 <file path=customXml/itemProps3.xml><?xml version="1.0" encoding="utf-8"?>
 <ds:datastoreItem xmlns:ds="http://schemas.openxmlformats.org/officeDocument/2006/customXml" ds:itemID="{69128D4C-6F8B-42B2-A3A4-DC1405FCC7A7}">
   <ds:schemaRefs>

</xml_diff>